<commit_message>
Updated iteration schedule for slides
with dates and task until iteration 5
</commit_message>
<xml_diff>
--- a/presentations/PM Review - Week 7.pptx
+++ b/presentations/PM Review - Week 7.pptx
@@ -118,6 +118,11 @@
       </a:defRPr>
     </a:lvl9pPr>
   </p:defaultTextStyle>
+  <p:extLst>
+    <p:ext uri="{EFAFB233-063F-42B5-8137-9DF3F51BA10A}">
+      <p15:sldGuideLst xmlns:p15="http://schemas.microsoft.com/office/powerpoint/2012/main"/>
+    </p:ext>
+  </p:extLst>
 </p:presentation>
 </file>
 
@@ -7239,14 +7244,14 @@
             <p:ph idx="1"/>
             <p:extLst>
               <p:ext uri="{D42A27DB-BD31-4B8C-83A1-F6EECF244321}">
-                <p14:modId xmlns:p14="http://schemas.microsoft.com/office/powerpoint/2010/main" val="927216155"/>
+                <p14:modId xmlns:p14="http://schemas.microsoft.com/office/powerpoint/2010/main" val="4075286289"/>
               </p:ext>
             </p:extLst>
           </p:nvPr>
         </p:nvGraphicFramePr>
         <p:xfrm>
           <a:off x="5678906" y="801688"/>
-          <a:ext cx="5717761" cy="2667000"/>
+          <a:ext cx="5717761" cy="4937760"/>
         </p:xfrm>
         <a:graphic>
           <a:graphicData uri="http://schemas.openxmlformats.org/drawingml/2006/table">
@@ -7381,6 +7386,10 @@
                     <a:bodyPr/>
                     <a:lstStyle/>
                     <a:p>
+                      <a:r>
+                        <a:rPr lang="en-US" dirty="0"/>
+                        <a:t>Monday of Week 5</a:t>
+                      </a:r>
                       <a:endParaRPr lang="en-SG" dirty="0"/>
                     </a:p>
                   </a:txBody>
@@ -7391,6 +7400,10 @@
                     <a:bodyPr/>
                     <a:lstStyle/>
                     <a:p>
+                      <a:r>
+                        <a:rPr lang="en-US" dirty="0"/>
+                        <a:t>Sunday of Week 6 (end)</a:t>
+                      </a:r>
                       <a:endParaRPr lang="en-SG" dirty="0"/>
                     </a:p>
                   </a:txBody>
@@ -7422,6 +7435,10 @@
                     <a:bodyPr/>
                     <a:lstStyle/>
                     <a:p>
+                      <a:r>
+                        <a:rPr lang="en-US" dirty="0"/>
+                        <a:t>Drop bid, Slides for PM review, Web service, Update bid </a:t>
+                      </a:r>
                       <a:endParaRPr lang="en-SG" dirty="0"/>
                     </a:p>
                   </a:txBody>
@@ -7432,6 +7449,10 @@
                     <a:bodyPr/>
                     <a:lstStyle/>
                     <a:p>
+                      <a:r>
+                        <a:rPr lang="en-US" dirty="0"/>
+                        <a:t>Monday of Week 7 </a:t>
+                      </a:r>
                       <a:endParaRPr lang="en-SG" dirty="0"/>
                     </a:p>
                   </a:txBody>
@@ -7442,6 +7463,10 @@
                     <a:bodyPr/>
                     <a:lstStyle/>
                     <a:p>
+                      <a:r>
+                        <a:rPr lang="en-US" dirty="0"/>
+                        <a:t>Sunday of Week 8  </a:t>
+                      </a:r>
                       <a:endParaRPr lang="en-SG" dirty="0"/>
                     </a:p>
                   </a:txBody>
@@ -7459,7 +7484,11 @@
                     <a:bodyPr/>
                     <a:lstStyle/>
                     <a:p>
-                      <a:endParaRPr lang="en-SG"/>
+                      <a:r>
+                        <a:rPr lang="en-US" dirty="0"/>
+                        <a:t>3</a:t>
+                      </a:r>
+                      <a:endParaRPr lang="en-SG" dirty="0"/>
                     </a:p>
                   </a:txBody>
                   <a:tcPr/>
@@ -7469,7 +7498,11 @@
                     <a:bodyPr/>
                     <a:lstStyle/>
                     <a:p>
-                      <a:endParaRPr lang="en-SG"/>
+                      <a:r>
+                        <a:rPr lang="en-US" dirty="0"/>
+                        <a:t>Rounds, Drop section, Dumping</a:t>
+                      </a:r>
+                      <a:endParaRPr lang="en-SG" dirty="0"/>
                     </a:p>
                   </a:txBody>
                   <a:tcPr/>
@@ -7479,7 +7512,11 @@
                     <a:bodyPr/>
                     <a:lstStyle/>
                     <a:p>
-                      <a:endParaRPr lang="en-SG"/>
+                      <a:r>
+                        <a:rPr lang="en-US" dirty="0"/>
+                        <a:t>Monday of Week 9</a:t>
+                      </a:r>
+                      <a:endParaRPr lang="en-SG" dirty="0"/>
                     </a:p>
                   </a:txBody>
                   <a:tcPr/>
@@ -7489,7 +7526,11 @@
                     <a:bodyPr/>
                     <a:lstStyle/>
                     <a:p>
-                      <a:endParaRPr lang="en-SG"/>
+                      <a:r>
+                        <a:rPr lang="en-US" dirty="0"/>
+                        <a:t>Sunday of Week 10</a:t>
+                      </a:r>
+                      <a:endParaRPr lang="en-SG" dirty="0"/>
                     </a:p>
                   </a:txBody>
                   <a:tcPr/>
@@ -7506,16 +7547,10 @@
                     <a:bodyPr/>
                     <a:lstStyle/>
                     <a:p>
-                      <a:endParaRPr lang="en-SG"/>
-                    </a:p>
-                  </a:txBody>
-                  <a:tcPr/>
-                </a:tc>
-                <a:tc>
-                  <a:txBody>
-                    <a:bodyPr/>
-                    <a:lstStyle/>
-                    <a:p>
+                      <a:r>
+                        <a:rPr lang="en-US" dirty="0"/>
+                        <a:t>4</a:t>
+                      </a:r>
                       <a:endParaRPr lang="en-SG" dirty="0"/>
                     </a:p>
                   </a:txBody>
@@ -7526,6 +7561,10 @@
                     <a:bodyPr/>
                     <a:lstStyle/>
                     <a:p>
+                      <a:r>
+                        <a:rPr lang="en-US" dirty="0"/>
+                        <a:t>Deploying to AWS, UAT, Check UAT results, testing, debugging, redeploy</a:t>
+                      </a:r>
                       <a:endParaRPr lang="en-SG" dirty="0"/>
                     </a:p>
                   </a:txBody>
@@ -7536,6 +7575,24 @@
                     <a:bodyPr/>
                     <a:lstStyle/>
                     <a:p>
+                      <a:r>
+                        <a:rPr lang="en-US" dirty="0"/>
+                        <a:t>Monday of Week 11</a:t>
+                      </a:r>
+                      <a:endParaRPr lang="en-SG" dirty="0"/>
+                    </a:p>
+                  </a:txBody>
+                  <a:tcPr/>
+                </a:tc>
+                <a:tc>
+                  <a:txBody>
+                    <a:bodyPr/>
+                    <a:lstStyle/>
+                    <a:p>
+                      <a:r>
+                        <a:rPr lang="en-US" dirty="0"/>
+                        <a:t>Sunday of Week 12</a:t>
+                      </a:r>
                       <a:endParaRPr lang="en-SG" dirty="0"/>
                     </a:p>
                   </a:txBody>
@@ -7544,6 +7601,69 @@
                 <a:extLst>
                   <a:ext uri="{0D108BD9-81ED-4DB2-BD59-A6C34878D82A}">
                     <a16:rowId xmlns:a16="http://schemas.microsoft.com/office/drawing/2014/main" val="2001957646"/>
+                  </a:ext>
+                </a:extLst>
+              </a:tr>
+              <a:tr h="370840">
+                <a:tc>
+                  <a:txBody>
+                    <a:bodyPr/>
+                    <a:lstStyle/>
+                    <a:p>
+                      <a:r>
+                        <a:rPr lang="en-US" dirty="0"/>
+                        <a:t>5</a:t>
+                      </a:r>
+                      <a:endParaRPr lang="en-SG" dirty="0"/>
+                    </a:p>
+                  </a:txBody>
+                  <a:tcPr/>
+                </a:tc>
+                <a:tc>
+                  <a:txBody>
+                    <a:bodyPr/>
+                    <a:lstStyle/>
+                    <a:p>
+                      <a:r>
+                        <a:rPr lang="en-US" dirty="0"/>
+                        <a:t>Prepare Final presentation slides</a:t>
+                      </a:r>
+                      <a:endParaRPr lang="en-SG" dirty="0"/>
+                    </a:p>
+                  </a:txBody>
+                  <a:tcPr/>
+                </a:tc>
+                <a:tc>
+                  <a:txBody>
+                    <a:bodyPr/>
+                    <a:lstStyle/>
+                    <a:p>
+                      <a:r>
+                        <a:rPr lang="en-US" dirty="0"/>
+                        <a:t>Monday of Week 13</a:t>
+                      </a:r>
+                      <a:endParaRPr lang="en-SG" dirty="0"/>
+                    </a:p>
+                  </a:txBody>
+                  <a:tcPr/>
+                </a:tc>
+                <a:tc>
+                  <a:txBody>
+                    <a:bodyPr/>
+                    <a:lstStyle/>
+                    <a:p>
+                      <a:r>
+                        <a:rPr lang="en-US" dirty="0"/>
+                        <a:t>Sunday of Week 14</a:t>
+                      </a:r>
+                      <a:endParaRPr lang="en-SG" dirty="0"/>
+                    </a:p>
+                  </a:txBody>
+                  <a:tcPr/>
+                </a:tc>
+                <a:extLst>
+                  <a:ext uri="{0D108BD9-81ED-4DB2-BD59-A6C34878D82A}">
+                    <a16:rowId xmlns:a16="http://schemas.microsoft.com/office/drawing/2014/main" val="177270563"/>
                   </a:ext>
                 </a:extLst>
               </a:tr>

</xml_diff>

<commit_message>
Update PM Review slides
Include critical path diagram
</commit_message>
<xml_diff>
--- a/presentations/PM Review - Week 7.pptx
+++ b/presentations/PM Review - Week 7.pptx
@@ -208,7 +208,7 @@
           <a:p>
             <a:fld id="{EBB640CE-D8D8-4D01-B935-C4EF548B9BED}" type="datetimeFigureOut">
               <a:rPr lang="en-SG" smtClean="0"/>
-              <a:t>1/10/2019</a:t>
+              <a:t>2/10/2019</a:t>
             </a:fld>
             <a:endParaRPr lang="en-SG"/>
           </a:p>
@@ -625,7 +625,7 @@
           <a:p>
             <a:fld id="{A5DD6795-6237-4751-AF39-03266F874185}" type="slidenum">
               <a:rPr lang="en-SG" smtClean="0"/>
-              <a:t>10</a:t>
+              <a:t>8</a:t>
             </a:fld>
             <a:endParaRPr lang="en-SG"/>
           </a:p>
@@ -634,7 +634,7 @@
     </p:spTree>
     <p:extLst>
       <p:ext uri="{BB962C8B-B14F-4D97-AF65-F5344CB8AC3E}">
-        <p14:creationId xmlns:p14="http://schemas.microsoft.com/office/powerpoint/2010/main" val="2206007641"/>
+        <p14:creationId xmlns:p14="http://schemas.microsoft.com/office/powerpoint/2010/main" val="3586095038"/>
       </p:ext>
     </p:extLst>
   </p:cSld>
@@ -709,6 +709,90 @@
           <a:p>
             <a:fld id="{A5DD6795-6237-4751-AF39-03266F874185}" type="slidenum">
               <a:rPr lang="en-SG" smtClean="0"/>
+              <a:t>10</a:t>
+            </a:fld>
+            <a:endParaRPr lang="en-SG"/>
+          </a:p>
+        </p:txBody>
+      </p:sp>
+    </p:spTree>
+    <p:extLst>
+      <p:ext uri="{BB962C8B-B14F-4D97-AF65-F5344CB8AC3E}">
+        <p14:creationId xmlns:p14="http://schemas.microsoft.com/office/powerpoint/2010/main" val="2206007641"/>
+      </p:ext>
+    </p:extLst>
+  </p:cSld>
+  <p:clrMapOvr>
+    <a:masterClrMapping/>
+  </p:clrMapOvr>
+</p:notes>
+</file>
+
+<file path=ppt/notesSlides/notesSlide4.xml><?xml version="1.0" encoding="utf-8"?>
+<p:notes xmlns:a="http://schemas.openxmlformats.org/drawingml/2006/main" xmlns:r="http://schemas.openxmlformats.org/officeDocument/2006/relationships" xmlns:p="http://schemas.openxmlformats.org/presentationml/2006/main">
+  <p:cSld>
+    <p:spTree>
+      <p:nvGrpSpPr>
+        <p:cNvPr id="1" name=""/>
+        <p:cNvGrpSpPr/>
+        <p:nvPr/>
+      </p:nvGrpSpPr>
+      <p:grpSpPr>
+        <a:xfrm>
+          <a:off x="0" y="0"/>
+          <a:ext cx="0" cy="0"/>
+          <a:chOff x="0" y="0"/>
+          <a:chExt cx="0" cy="0"/>
+        </a:xfrm>
+      </p:grpSpPr>
+      <p:sp>
+        <p:nvSpPr>
+          <p:cNvPr id="2" name="Slide Image Placeholder 1"/>
+          <p:cNvSpPr>
+            <a:spLocks noGrp="1" noRot="1" noChangeAspect="1"/>
+          </p:cNvSpPr>
+          <p:nvPr>
+            <p:ph type="sldImg"/>
+          </p:nvPr>
+        </p:nvSpPr>
+        <p:spPr/>
+      </p:sp>
+      <p:sp>
+        <p:nvSpPr>
+          <p:cNvPr id="3" name="Notes Placeholder 2"/>
+          <p:cNvSpPr>
+            <a:spLocks noGrp="1"/>
+          </p:cNvSpPr>
+          <p:nvPr>
+            <p:ph type="body" idx="1"/>
+          </p:nvPr>
+        </p:nvSpPr>
+        <p:spPr/>
+        <p:txBody>
+          <a:bodyPr/>
+          <a:lstStyle/>
+          <a:p>
+            <a:endParaRPr lang="en-SG" dirty="0"/>
+          </a:p>
+        </p:txBody>
+      </p:sp>
+      <p:sp>
+        <p:nvSpPr>
+          <p:cNvPr id="4" name="Slide Number Placeholder 3"/>
+          <p:cNvSpPr>
+            <a:spLocks noGrp="1"/>
+          </p:cNvSpPr>
+          <p:nvPr>
+            <p:ph type="sldNum" sz="quarter" idx="5"/>
+          </p:nvPr>
+        </p:nvSpPr>
+        <p:spPr/>
+        <p:txBody>
+          <a:bodyPr/>
+          <a:lstStyle/>
+          <a:p>
+            <a:fld id="{A5DD6795-6237-4751-AF39-03266F874185}" type="slidenum">
+              <a:rPr lang="en-SG" smtClean="0"/>
               <a:t>11</a:t>
             </a:fld>
             <a:endParaRPr lang="en-SG"/>
@@ -728,7 +812,7 @@
 </p:notes>
 </file>
 
-<file path=ppt/notesSlides/notesSlide4.xml><?xml version="1.0" encoding="utf-8"?>
+<file path=ppt/notesSlides/notesSlide5.xml><?xml version="1.0" encoding="utf-8"?>
 <p:notes xmlns:a="http://schemas.openxmlformats.org/drawingml/2006/main" xmlns:r="http://schemas.openxmlformats.org/officeDocument/2006/relationships" xmlns:p="http://schemas.openxmlformats.org/presentationml/2006/main">
   <p:cSld>
     <p:spTree>
@@ -961,7 +1045,7 @@
           <a:p>
             <a:fld id="{252E13F7-EC1C-475E-BD1E-2E4B637D13C2}" type="datetimeFigureOut">
               <a:rPr lang="en-SG" smtClean="0"/>
-              <a:t>1/10/2019</a:t>
+              <a:t>2/10/2019</a:t>
             </a:fld>
             <a:endParaRPr lang="en-SG"/>
           </a:p>
@@ -1161,7 +1245,7 @@
           <a:p>
             <a:fld id="{252E13F7-EC1C-475E-BD1E-2E4B637D13C2}" type="datetimeFigureOut">
               <a:rPr lang="en-SG" smtClean="0"/>
-              <a:t>1/10/2019</a:t>
+              <a:t>2/10/2019</a:t>
             </a:fld>
             <a:endParaRPr lang="en-SG"/>
           </a:p>
@@ -1371,7 +1455,7 @@
           <a:p>
             <a:fld id="{252E13F7-EC1C-475E-BD1E-2E4B637D13C2}" type="datetimeFigureOut">
               <a:rPr lang="en-SG" smtClean="0"/>
-              <a:t>1/10/2019</a:t>
+              <a:t>2/10/2019</a:t>
             </a:fld>
             <a:endParaRPr lang="en-SG"/>
           </a:p>
@@ -1571,7 +1655,7 @@
           <a:p>
             <a:fld id="{252E13F7-EC1C-475E-BD1E-2E4B637D13C2}" type="datetimeFigureOut">
               <a:rPr lang="en-SG" smtClean="0"/>
-              <a:t>1/10/2019</a:t>
+              <a:t>2/10/2019</a:t>
             </a:fld>
             <a:endParaRPr lang="en-SG"/>
           </a:p>
@@ -1847,7 +1931,7 @@
           <a:p>
             <a:fld id="{252E13F7-EC1C-475E-BD1E-2E4B637D13C2}" type="datetimeFigureOut">
               <a:rPr lang="en-SG" smtClean="0"/>
-              <a:t>1/10/2019</a:t>
+              <a:t>2/10/2019</a:t>
             </a:fld>
             <a:endParaRPr lang="en-SG"/>
           </a:p>
@@ -2115,7 +2199,7 @@
           <a:p>
             <a:fld id="{252E13F7-EC1C-475E-BD1E-2E4B637D13C2}" type="datetimeFigureOut">
               <a:rPr lang="en-SG" smtClean="0"/>
-              <a:t>1/10/2019</a:t>
+              <a:t>2/10/2019</a:t>
             </a:fld>
             <a:endParaRPr lang="en-SG"/>
           </a:p>
@@ -2530,7 +2614,7 @@
           <a:p>
             <a:fld id="{252E13F7-EC1C-475E-BD1E-2E4B637D13C2}" type="datetimeFigureOut">
               <a:rPr lang="en-SG" smtClean="0"/>
-              <a:t>1/10/2019</a:t>
+              <a:t>2/10/2019</a:t>
             </a:fld>
             <a:endParaRPr lang="en-SG"/>
           </a:p>
@@ -2672,7 +2756,7 @@
           <a:p>
             <a:fld id="{252E13F7-EC1C-475E-BD1E-2E4B637D13C2}" type="datetimeFigureOut">
               <a:rPr lang="en-SG" smtClean="0"/>
-              <a:t>1/10/2019</a:t>
+              <a:t>2/10/2019</a:t>
             </a:fld>
             <a:endParaRPr lang="en-SG"/>
           </a:p>
@@ -2785,7 +2869,7 @@
           <a:p>
             <a:fld id="{252E13F7-EC1C-475E-BD1E-2E4B637D13C2}" type="datetimeFigureOut">
               <a:rPr lang="en-SG" smtClean="0"/>
-              <a:t>1/10/2019</a:t>
+              <a:t>2/10/2019</a:t>
             </a:fld>
             <a:endParaRPr lang="en-SG"/>
           </a:p>
@@ -3098,7 +3182,7 @@
           <a:p>
             <a:fld id="{252E13F7-EC1C-475E-BD1E-2E4B637D13C2}" type="datetimeFigureOut">
               <a:rPr lang="en-SG" smtClean="0"/>
-              <a:t>1/10/2019</a:t>
+              <a:t>2/10/2019</a:t>
             </a:fld>
             <a:endParaRPr lang="en-SG"/>
           </a:p>
@@ -3387,7 +3471,7 @@
           <a:p>
             <a:fld id="{252E13F7-EC1C-475E-BD1E-2E4B637D13C2}" type="datetimeFigureOut">
               <a:rPr lang="en-SG" smtClean="0"/>
-              <a:t>1/10/2019</a:t>
+              <a:t>2/10/2019</a:t>
             </a:fld>
             <a:endParaRPr lang="en-SG"/>
           </a:p>
@@ -3630,7 +3714,7 @@
           <a:p>
             <a:fld id="{252E13F7-EC1C-475E-BD1E-2E4B637D13C2}" type="datetimeFigureOut">
               <a:rPr lang="en-SG" smtClean="0"/>
-              <a:t>1/10/2019</a:t>
+              <a:t>2/10/2019</a:t>
             </a:fld>
             <a:endParaRPr lang="en-SG"/>
           </a:p>
@@ -9135,7 +9219,7 @@
           </p:nvPr>
         </p:nvPicPr>
         <p:blipFill>
-          <a:blip r:embed="rId2">
+          <a:blip r:embed="rId3">
             <a:extLst>
               <a:ext uri="{28A0092B-C50C-407E-A947-70E740481C1C}">
                 <a14:useLocalDpi xmlns:a14="http://schemas.microsoft.com/office/drawing/2010/main" val="0"/>
@@ -9203,37 +9287,1349 @@
       </p:sp>
       <p:sp>
         <p:nvSpPr>
-          <p:cNvPr id="3" name="Content Placeholder 2">
-            <a:extLst>
-              <a:ext uri="{FF2B5EF4-FFF2-40B4-BE49-F238E27FC236}">
-                <a16:creationId xmlns:a16="http://schemas.microsoft.com/office/drawing/2014/main" id="{76F2EC96-DEB1-44FA-9D73-067E76647246}"/>
-              </a:ext>
-            </a:extLst>
-          </p:cNvPr>
-          <p:cNvSpPr>
-            <a:spLocks noGrp="1"/>
-          </p:cNvSpPr>
-          <p:nvPr>
-            <p:ph idx="1"/>
-          </p:nvPr>
+          <p:cNvPr id="4" name="Rectangle 3">
+            <a:extLst>
+              <a:ext uri="{FF2B5EF4-FFF2-40B4-BE49-F238E27FC236}">
+                <a16:creationId xmlns:a16="http://schemas.microsoft.com/office/drawing/2014/main" id="{A778672D-FA5C-4A72-8959-346F60B3535C}"/>
+              </a:ext>
+            </a:extLst>
+          </p:cNvPr>
+          <p:cNvSpPr/>
+          <p:nvPr/>
         </p:nvSpPr>
         <p:spPr>
           <a:xfrm>
-            <a:off x="1179226" y="3092970"/>
-            <a:ext cx="9833548" cy="2693976"/>
-          </a:xfrm>
-        </p:spPr>
-        <p:txBody>
-          <a:bodyPr>
-            <a:normAutofit/>
+            <a:off x="1556771" y="2913615"/>
+            <a:ext cx="1154542" cy="700586"/>
+          </a:xfrm>
+          <a:prstGeom prst="rect">
+            <a:avLst/>
+          </a:prstGeom>
+        </p:spPr>
+        <p:style>
+          <a:lnRef idx="2">
+            <a:schemeClr val="accent1">
+              <a:shade val="50000"/>
+            </a:schemeClr>
+          </a:lnRef>
+          <a:fillRef idx="1">
+            <a:schemeClr val="accent1"/>
+          </a:fillRef>
+          <a:effectRef idx="0">
+            <a:schemeClr val="accent1"/>
+          </a:effectRef>
+          <a:fontRef idx="minor">
+            <a:schemeClr val="lt1"/>
+          </a:fontRef>
+        </p:style>
+        <p:txBody>
+          <a:bodyPr rtlCol="0" anchor="ctr"/>
+          <a:lstStyle/>
+          <a:p>
+            <a:pPr algn="ctr"/>
+            <a:r>
+              <a:rPr lang="en-US" sz="1200" dirty="0"/>
+              <a:t>Read Wiki</a:t>
+            </a:r>
+            <a:endParaRPr lang="en-SG" sz="1200" dirty="0"/>
+          </a:p>
+        </p:txBody>
+      </p:sp>
+      <p:sp>
+        <p:nvSpPr>
+          <p:cNvPr id="11" name="Rectangle 10">
+            <a:extLst>
+              <a:ext uri="{FF2B5EF4-FFF2-40B4-BE49-F238E27FC236}">
+                <a16:creationId xmlns:a16="http://schemas.microsoft.com/office/drawing/2014/main" id="{A3EC14A0-83DB-4F99-AC40-451E8964EF3F}"/>
+              </a:ext>
+            </a:extLst>
+          </p:cNvPr>
+          <p:cNvSpPr/>
+          <p:nvPr/>
+        </p:nvSpPr>
+        <p:spPr>
+          <a:xfrm>
+            <a:off x="3218742" y="2913615"/>
+            <a:ext cx="1154542" cy="700586"/>
+          </a:xfrm>
+          <a:prstGeom prst="rect">
+            <a:avLst/>
+          </a:prstGeom>
+        </p:spPr>
+        <p:style>
+          <a:lnRef idx="2">
+            <a:schemeClr val="accent1">
+              <a:shade val="50000"/>
+            </a:schemeClr>
+          </a:lnRef>
+          <a:fillRef idx="1">
+            <a:schemeClr val="accent1"/>
+          </a:fillRef>
+          <a:effectRef idx="0">
+            <a:schemeClr val="accent1"/>
+          </a:effectRef>
+          <a:fontRef idx="minor">
+            <a:schemeClr val="lt1"/>
+          </a:fontRef>
+        </p:style>
+        <p:txBody>
+          <a:bodyPr rtlCol="0" anchor="ctr"/>
+          <a:lstStyle/>
+          <a:p>
+            <a:pPr algn="ctr"/>
+            <a:r>
+              <a:rPr lang="en-US" sz="1200" dirty="0"/>
+              <a:t>Schedule Iteration 1 tasks</a:t>
+            </a:r>
+            <a:endParaRPr lang="en-SG" sz="1200" dirty="0"/>
+          </a:p>
+        </p:txBody>
+      </p:sp>
+      <p:sp>
+        <p:nvSpPr>
+          <p:cNvPr id="12" name="Rectangle 11">
+            <a:extLst>
+              <a:ext uri="{FF2B5EF4-FFF2-40B4-BE49-F238E27FC236}">
+                <a16:creationId xmlns:a16="http://schemas.microsoft.com/office/drawing/2014/main" id="{F6957E20-C7E8-4AB2-96B6-E90959C1474E}"/>
+              </a:ext>
+            </a:extLst>
+          </p:cNvPr>
+          <p:cNvSpPr/>
+          <p:nvPr/>
+        </p:nvSpPr>
+        <p:spPr>
+          <a:xfrm>
+            <a:off x="4880713" y="2913615"/>
+            <a:ext cx="1154542" cy="700586"/>
+          </a:xfrm>
+          <a:prstGeom prst="rect">
+            <a:avLst/>
+          </a:prstGeom>
+        </p:spPr>
+        <p:style>
+          <a:lnRef idx="2">
+            <a:schemeClr val="accent1">
+              <a:shade val="50000"/>
+            </a:schemeClr>
+          </a:lnRef>
+          <a:fillRef idx="1">
+            <a:schemeClr val="accent1"/>
+          </a:fillRef>
+          <a:effectRef idx="0">
+            <a:schemeClr val="accent1"/>
+          </a:effectRef>
+          <a:fontRef idx="minor">
+            <a:schemeClr val="lt1"/>
+          </a:fontRef>
+        </p:style>
+        <p:txBody>
+          <a:bodyPr rtlCol="0" anchor="ctr"/>
+          <a:lstStyle/>
+          <a:p>
+            <a:pPr algn="ctr"/>
+            <a:r>
+              <a:rPr lang="en-US" sz="1200" dirty="0"/>
+              <a:t>Plan other Iterations</a:t>
+            </a:r>
+            <a:endParaRPr lang="en-SG" sz="1200" dirty="0"/>
+          </a:p>
+        </p:txBody>
+      </p:sp>
+      <p:sp>
+        <p:nvSpPr>
+          <p:cNvPr id="13" name="Rectangle 12">
+            <a:extLst>
+              <a:ext uri="{FF2B5EF4-FFF2-40B4-BE49-F238E27FC236}">
+                <a16:creationId xmlns:a16="http://schemas.microsoft.com/office/drawing/2014/main" id="{20B3380A-0E83-4A59-B8ED-6B39D24142E5}"/>
+              </a:ext>
+            </a:extLst>
+          </p:cNvPr>
+          <p:cNvSpPr/>
+          <p:nvPr/>
+        </p:nvSpPr>
+        <p:spPr>
+          <a:xfrm>
+            <a:off x="6542684" y="2855612"/>
+            <a:ext cx="1306942" cy="816592"/>
+          </a:xfrm>
+          <a:prstGeom prst="rect">
+            <a:avLst/>
+          </a:prstGeom>
+        </p:spPr>
+        <p:style>
+          <a:lnRef idx="2">
+            <a:schemeClr val="accent1">
+              <a:shade val="50000"/>
+            </a:schemeClr>
+          </a:lnRef>
+          <a:fillRef idx="1">
+            <a:schemeClr val="accent1"/>
+          </a:fillRef>
+          <a:effectRef idx="0">
+            <a:schemeClr val="accent1"/>
+          </a:effectRef>
+          <a:fontRef idx="minor">
+            <a:schemeClr val="lt1"/>
+          </a:fontRef>
+        </p:style>
+        <p:txBody>
+          <a:bodyPr rtlCol="0" anchor="ctr"/>
+          <a:lstStyle/>
+          <a:p>
+            <a:pPr algn="ctr"/>
+            <a:r>
+              <a:rPr lang="en-US" sz="1200" dirty="0"/>
+              <a:t>Create Login Page with Welcome Message</a:t>
+            </a:r>
+            <a:endParaRPr lang="en-SG" sz="1200" dirty="0"/>
+          </a:p>
+        </p:txBody>
+      </p:sp>
+      <p:sp>
+        <p:nvSpPr>
+          <p:cNvPr id="15" name="Rectangle 14">
+            <a:extLst>
+              <a:ext uri="{FF2B5EF4-FFF2-40B4-BE49-F238E27FC236}">
+                <a16:creationId xmlns:a16="http://schemas.microsoft.com/office/drawing/2014/main" id="{895423C6-9E88-42B2-8EDD-53EBCF942A6D}"/>
+              </a:ext>
+            </a:extLst>
+          </p:cNvPr>
+          <p:cNvSpPr/>
+          <p:nvPr/>
+        </p:nvSpPr>
+        <p:spPr>
+          <a:xfrm>
+            <a:off x="8357055" y="2913615"/>
+            <a:ext cx="1154542" cy="700586"/>
+          </a:xfrm>
+          <a:prstGeom prst="rect">
+            <a:avLst/>
+          </a:prstGeom>
+        </p:spPr>
+        <p:style>
+          <a:lnRef idx="2">
+            <a:schemeClr val="accent1">
+              <a:shade val="50000"/>
+            </a:schemeClr>
+          </a:lnRef>
+          <a:fillRef idx="1">
+            <a:schemeClr val="accent1"/>
+          </a:fillRef>
+          <a:effectRef idx="0">
+            <a:schemeClr val="accent1"/>
+          </a:effectRef>
+          <a:fontRef idx="minor">
+            <a:schemeClr val="lt1"/>
+          </a:fontRef>
+        </p:style>
+        <p:txBody>
+          <a:bodyPr rtlCol="0" anchor="ctr"/>
+          <a:lstStyle/>
+          <a:p>
+            <a:pPr algn="ctr"/>
+            <a:r>
+              <a:rPr lang="en-US" sz="1200" dirty="0"/>
+              <a:t>Create project database</a:t>
+            </a:r>
+            <a:endParaRPr lang="en-SG" sz="1200" dirty="0"/>
+          </a:p>
+        </p:txBody>
+      </p:sp>
+      <p:sp>
+        <p:nvSpPr>
+          <p:cNvPr id="16" name="Rectangle 15">
+            <a:extLst>
+              <a:ext uri="{FF2B5EF4-FFF2-40B4-BE49-F238E27FC236}">
+                <a16:creationId xmlns:a16="http://schemas.microsoft.com/office/drawing/2014/main" id="{5FD94160-9A52-4605-A745-EF0F5B0299DD}"/>
+              </a:ext>
+            </a:extLst>
+          </p:cNvPr>
+          <p:cNvSpPr/>
+          <p:nvPr/>
+        </p:nvSpPr>
+        <p:spPr>
+          <a:xfrm>
+            <a:off x="10019026" y="2913615"/>
+            <a:ext cx="1154542" cy="700586"/>
+          </a:xfrm>
+          <a:prstGeom prst="rect">
+            <a:avLst/>
+          </a:prstGeom>
+        </p:spPr>
+        <p:style>
+          <a:lnRef idx="2">
+            <a:schemeClr val="accent1">
+              <a:shade val="50000"/>
+            </a:schemeClr>
+          </a:lnRef>
+          <a:fillRef idx="1">
+            <a:schemeClr val="accent1"/>
+          </a:fillRef>
+          <a:effectRef idx="0">
+            <a:schemeClr val="accent1"/>
+          </a:effectRef>
+          <a:fontRef idx="minor">
+            <a:schemeClr val="lt1"/>
+          </a:fontRef>
+        </p:style>
+        <p:txBody>
+          <a:bodyPr rtlCol="0" anchor="ctr"/>
+          <a:lstStyle/>
+          <a:p>
+            <a:pPr algn="ctr"/>
+            <a:r>
+              <a:rPr lang="en-US" sz="1200" dirty="0"/>
+              <a:t>Test</a:t>
+            </a:r>
+          </a:p>
+          <a:p>
+            <a:pPr algn="ctr"/>
+            <a:r>
+              <a:rPr lang="en-US" sz="1200" dirty="0"/>
+              <a:t>Login Page</a:t>
+            </a:r>
+            <a:endParaRPr lang="en-SG" sz="1200" dirty="0"/>
+          </a:p>
+        </p:txBody>
+      </p:sp>
+      <p:sp>
+        <p:nvSpPr>
+          <p:cNvPr id="17" name="Rectangle 16">
+            <a:extLst>
+              <a:ext uri="{FF2B5EF4-FFF2-40B4-BE49-F238E27FC236}">
+                <a16:creationId xmlns:a16="http://schemas.microsoft.com/office/drawing/2014/main" id="{8C82C072-8C08-4CBC-9397-E9E692A5CB99}"/>
+              </a:ext>
+            </a:extLst>
+          </p:cNvPr>
+          <p:cNvSpPr/>
+          <p:nvPr/>
+        </p:nvSpPr>
+        <p:spPr>
+          <a:xfrm>
+            <a:off x="10019026" y="4535514"/>
+            <a:ext cx="1154542" cy="700586"/>
+          </a:xfrm>
+          <a:prstGeom prst="rect">
+            <a:avLst/>
+          </a:prstGeom>
+        </p:spPr>
+        <p:style>
+          <a:lnRef idx="2">
+            <a:schemeClr val="accent1">
+              <a:shade val="50000"/>
+            </a:schemeClr>
+          </a:lnRef>
+          <a:fillRef idx="1">
+            <a:schemeClr val="accent1"/>
+          </a:fillRef>
+          <a:effectRef idx="0">
+            <a:schemeClr val="accent1"/>
+          </a:effectRef>
+          <a:fontRef idx="minor">
+            <a:schemeClr val="lt1"/>
+          </a:fontRef>
+        </p:style>
+        <p:txBody>
+          <a:bodyPr rtlCol="0" anchor="ctr"/>
+          <a:lstStyle/>
+          <a:p>
+            <a:pPr algn="ctr"/>
+            <a:r>
+              <a:rPr lang="en-US" sz="1200" dirty="0"/>
+              <a:t>Create addBid page</a:t>
+            </a:r>
+            <a:endParaRPr lang="en-SG" sz="1200" dirty="0"/>
+          </a:p>
+        </p:txBody>
+      </p:sp>
+      <p:sp>
+        <p:nvSpPr>
+          <p:cNvPr id="19" name="Rectangle 18">
+            <a:extLst>
+              <a:ext uri="{FF2B5EF4-FFF2-40B4-BE49-F238E27FC236}">
+                <a16:creationId xmlns:a16="http://schemas.microsoft.com/office/drawing/2014/main" id="{62516FA8-1576-4108-9FB9-B4FEFC33886C}"/>
+              </a:ext>
+            </a:extLst>
+          </p:cNvPr>
+          <p:cNvSpPr/>
+          <p:nvPr/>
+        </p:nvSpPr>
+        <p:spPr>
+          <a:xfrm>
+            <a:off x="8204655" y="4477511"/>
+            <a:ext cx="1306942" cy="816592"/>
+          </a:xfrm>
+          <a:prstGeom prst="rect">
+            <a:avLst/>
+          </a:prstGeom>
+        </p:spPr>
+        <p:style>
+          <a:lnRef idx="2">
+            <a:schemeClr val="accent1">
+              <a:shade val="50000"/>
+            </a:schemeClr>
+          </a:lnRef>
+          <a:fillRef idx="1">
+            <a:schemeClr val="accent1"/>
+          </a:fillRef>
+          <a:effectRef idx="0">
+            <a:schemeClr val="accent1"/>
+          </a:effectRef>
+          <a:fontRef idx="minor">
+            <a:schemeClr val="lt1"/>
+          </a:fontRef>
+        </p:style>
+        <p:txBody>
+          <a:bodyPr rtlCol="0" anchor="ctr"/>
+          <a:lstStyle/>
+          <a:p>
+            <a:pPr algn="ctr"/>
+            <a:r>
+              <a:rPr lang="en-US" sz="1200" dirty="0"/>
+              <a:t>Create Bootstrap interface </a:t>
+            </a:r>
+          </a:p>
+        </p:txBody>
+      </p:sp>
+      <p:sp>
+        <p:nvSpPr>
+          <p:cNvPr id="20" name="Rectangle 19">
+            <a:extLst>
+              <a:ext uri="{FF2B5EF4-FFF2-40B4-BE49-F238E27FC236}">
+                <a16:creationId xmlns:a16="http://schemas.microsoft.com/office/drawing/2014/main" id="{7A262ECF-512E-400A-88E0-7495E9727EE2}"/>
+              </a:ext>
+            </a:extLst>
+          </p:cNvPr>
+          <p:cNvSpPr/>
+          <p:nvPr/>
+        </p:nvSpPr>
+        <p:spPr>
+          <a:xfrm>
+            <a:off x="6542684" y="4535514"/>
+            <a:ext cx="1154542" cy="700586"/>
+          </a:xfrm>
+          <a:prstGeom prst="rect">
+            <a:avLst/>
+          </a:prstGeom>
+        </p:spPr>
+        <p:style>
+          <a:lnRef idx="2">
+            <a:schemeClr val="accent1">
+              <a:shade val="50000"/>
+            </a:schemeClr>
+          </a:lnRef>
+          <a:fillRef idx="1">
+            <a:schemeClr val="accent1"/>
+          </a:fillRef>
+          <a:effectRef idx="0">
+            <a:schemeClr val="accent1"/>
+          </a:effectRef>
+          <a:fontRef idx="minor">
+            <a:schemeClr val="lt1"/>
+          </a:fontRef>
+        </p:style>
+        <p:txBody>
+          <a:bodyPr rtlCol="0" anchor="ctr"/>
+          <a:lstStyle/>
+          <a:p>
+            <a:pPr algn="ctr"/>
+            <a:r>
+              <a:rPr lang="en-US" sz="1200" dirty="0"/>
+              <a:t>Add .csv values into database</a:t>
+            </a:r>
+            <a:endParaRPr lang="en-SG" sz="1200" dirty="0"/>
+          </a:p>
+        </p:txBody>
+      </p:sp>
+      <p:sp>
+        <p:nvSpPr>
+          <p:cNvPr id="21" name="Rectangle 20">
+            <a:extLst>
+              <a:ext uri="{FF2B5EF4-FFF2-40B4-BE49-F238E27FC236}">
+                <a16:creationId xmlns:a16="http://schemas.microsoft.com/office/drawing/2014/main" id="{BDF75092-1E93-4961-B2A9-0704BF3395FD}"/>
+              </a:ext>
+            </a:extLst>
+          </p:cNvPr>
+          <p:cNvSpPr/>
+          <p:nvPr/>
+        </p:nvSpPr>
+        <p:spPr>
+          <a:xfrm>
+            <a:off x="4880713" y="4535514"/>
+            <a:ext cx="1154542" cy="700586"/>
+          </a:xfrm>
+          <a:prstGeom prst="rect">
+            <a:avLst/>
+          </a:prstGeom>
+        </p:spPr>
+        <p:style>
+          <a:lnRef idx="2">
+            <a:schemeClr val="accent1">
+              <a:shade val="50000"/>
+            </a:schemeClr>
+          </a:lnRef>
+          <a:fillRef idx="1">
+            <a:schemeClr val="accent1"/>
+          </a:fillRef>
+          <a:effectRef idx="0">
+            <a:schemeClr val="accent1"/>
+          </a:effectRef>
+          <a:fontRef idx="minor">
+            <a:schemeClr val="lt1"/>
+          </a:fontRef>
+        </p:style>
+        <p:txBody>
+          <a:bodyPr rtlCol="0" anchor="ctr"/>
+          <a:lstStyle/>
+          <a:p>
+            <a:pPr algn="ctr"/>
+            <a:r>
+              <a:rPr lang="en-US" sz="1200" dirty="0"/>
+              <a:t>File validations</a:t>
+            </a:r>
+            <a:endParaRPr lang="en-SG" sz="1200" dirty="0"/>
+          </a:p>
+        </p:txBody>
+      </p:sp>
+      <p:sp>
+        <p:nvSpPr>
+          <p:cNvPr id="22" name="Rectangle 21">
+            <a:extLst>
+              <a:ext uri="{FF2B5EF4-FFF2-40B4-BE49-F238E27FC236}">
+                <a16:creationId xmlns:a16="http://schemas.microsoft.com/office/drawing/2014/main" id="{1CC668AC-5B4E-40A6-A8DF-201C0A826504}"/>
+              </a:ext>
+            </a:extLst>
+          </p:cNvPr>
+          <p:cNvSpPr/>
+          <p:nvPr/>
+        </p:nvSpPr>
+        <p:spPr>
+          <a:xfrm>
+            <a:off x="3218742" y="4535514"/>
+            <a:ext cx="1154542" cy="700586"/>
+          </a:xfrm>
+          <a:prstGeom prst="rect">
+            <a:avLst/>
+          </a:prstGeom>
+        </p:spPr>
+        <p:style>
+          <a:lnRef idx="2">
+            <a:schemeClr val="accent1">
+              <a:shade val="50000"/>
+            </a:schemeClr>
+          </a:lnRef>
+          <a:fillRef idx="1">
+            <a:schemeClr val="accent1"/>
+          </a:fillRef>
+          <a:effectRef idx="0">
+            <a:schemeClr val="accent1"/>
+          </a:effectRef>
+          <a:fontRef idx="minor">
+            <a:schemeClr val="lt1"/>
+          </a:fontRef>
+        </p:style>
+        <p:txBody>
+          <a:bodyPr rtlCol="0" anchor="ctr"/>
+          <a:lstStyle/>
+          <a:p>
+            <a:pPr algn="ctr"/>
+            <a:r>
+              <a:rPr lang="en-US" sz="1200" dirty="0"/>
+              <a:t>Test </a:t>
+            </a:r>
+          </a:p>
+          <a:p>
+            <a:pPr algn="ctr"/>
+            <a:r>
+              <a:rPr lang="en-US" sz="1200" dirty="0"/>
+              <a:t>Bootstrap</a:t>
+            </a:r>
+            <a:endParaRPr lang="en-SG" sz="1200" dirty="0"/>
+          </a:p>
+        </p:txBody>
+      </p:sp>
+      <p:sp>
+        <p:nvSpPr>
+          <p:cNvPr id="23" name="Rectangle 22">
+            <a:extLst>
+              <a:ext uri="{FF2B5EF4-FFF2-40B4-BE49-F238E27FC236}">
+                <a16:creationId xmlns:a16="http://schemas.microsoft.com/office/drawing/2014/main" id="{0764D162-9F8D-421D-B40D-97B96A553938}"/>
+              </a:ext>
+            </a:extLst>
+          </p:cNvPr>
+          <p:cNvSpPr/>
+          <p:nvPr/>
+        </p:nvSpPr>
+        <p:spPr>
+          <a:xfrm>
+            <a:off x="1556771" y="4535514"/>
+            <a:ext cx="1154542" cy="700586"/>
+          </a:xfrm>
+          <a:prstGeom prst="rect">
+            <a:avLst/>
+          </a:prstGeom>
+        </p:spPr>
+        <p:style>
+          <a:lnRef idx="2">
+            <a:schemeClr val="accent1">
+              <a:shade val="50000"/>
+            </a:schemeClr>
+          </a:lnRef>
+          <a:fillRef idx="1">
+            <a:schemeClr val="accent1"/>
+          </a:fillRef>
+          <a:effectRef idx="0">
+            <a:schemeClr val="accent1"/>
+          </a:effectRef>
+          <a:fontRef idx="minor">
+            <a:schemeClr val="lt1"/>
+          </a:fontRef>
+        </p:style>
+        <p:txBody>
+          <a:bodyPr rtlCol="0" anchor="ctr"/>
+          <a:lstStyle/>
+          <a:p>
+            <a:pPr algn="ctr"/>
+            <a:r>
+              <a:rPr lang="en-US" sz="1200" dirty="0"/>
+              <a:t>Test</a:t>
+            </a:r>
+          </a:p>
+          <a:p>
+            <a:pPr algn="ctr"/>
+            <a:r>
+              <a:rPr lang="en-US" sz="1200" dirty="0"/>
+              <a:t>Iteration 1</a:t>
+            </a:r>
+            <a:endParaRPr lang="en-SG" sz="1200" dirty="0"/>
+          </a:p>
+        </p:txBody>
+      </p:sp>
+      <p:cxnSp>
+        <p:nvCxnSpPr>
+          <p:cNvPr id="6" name="Straight Arrow Connector 5">
+            <a:extLst>
+              <a:ext uri="{FF2B5EF4-FFF2-40B4-BE49-F238E27FC236}">
+                <a16:creationId xmlns:a16="http://schemas.microsoft.com/office/drawing/2014/main" id="{1246AB82-BCFF-4C36-926B-AE644EE37CE8}"/>
+              </a:ext>
+            </a:extLst>
+          </p:cNvPr>
+          <p:cNvCxnSpPr>
+            <a:cxnSpLocks/>
+            <a:stCxn id="4" idx="3"/>
+            <a:endCxn id="11" idx="1"/>
+          </p:cNvCxnSpPr>
+          <p:nvPr/>
+        </p:nvCxnSpPr>
+        <p:spPr>
+          <a:xfrm>
+            <a:off x="2711313" y="3263908"/>
+            <a:ext cx="507429" cy="0"/>
+          </a:xfrm>
+          <a:prstGeom prst="straightConnector1">
+            <a:avLst/>
+          </a:prstGeom>
+          <a:ln w="19050">
+            <a:tailEnd type="triangle"/>
+          </a:ln>
+        </p:spPr>
+        <p:style>
+          <a:lnRef idx="1">
+            <a:schemeClr val="accent1"/>
+          </a:lnRef>
+          <a:fillRef idx="0">
+            <a:schemeClr val="accent1"/>
+          </a:fillRef>
+          <a:effectRef idx="0">
+            <a:schemeClr val="accent1"/>
+          </a:effectRef>
+          <a:fontRef idx="minor">
+            <a:schemeClr val="tx1"/>
+          </a:fontRef>
+        </p:style>
+      </p:cxnSp>
+      <p:cxnSp>
+        <p:nvCxnSpPr>
+          <p:cNvPr id="25" name="Straight Arrow Connector 24">
+            <a:extLst>
+              <a:ext uri="{FF2B5EF4-FFF2-40B4-BE49-F238E27FC236}">
+                <a16:creationId xmlns:a16="http://schemas.microsoft.com/office/drawing/2014/main" id="{39A8F959-2494-4316-976E-CEBE440D0BEE}"/>
+              </a:ext>
+            </a:extLst>
+          </p:cNvPr>
+          <p:cNvCxnSpPr>
+            <a:cxnSpLocks/>
+            <a:stCxn id="11" idx="3"/>
+            <a:endCxn id="12" idx="1"/>
+          </p:cNvCxnSpPr>
+          <p:nvPr/>
+        </p:nvCxnSpPr>
+        <p:spPr>
+          <a:xfrm>
+            <a:off x="4373284" y="3263908"/>
+            <a:ext cx="507429" cy="0"/>
+          </a:xfrm>
+          <a:prstGeom prst="straightConnector1">
+            <a:avLst/>
+          </a:prstGeom>
+          <a:ln w="19050">
+            <a:tailEnd type="triangle"/>
+          </a:ln>
+        </p:spPr>
+        <p:style>
+          <a:lnRef idx="1">
+            <a:schemeClr val="accent1"/>
+          </a:lnRef>
+          <a:fillRef idx="0">
+            <a:schemeClr val="accent1"/>
+          </a:fillRef>
+          <a:effectRef idx="0">
+            <a:schemeClr val="accent1"/>
+          </a:effectRef>
+          <a:fontRef idx="minor">
+            <a:schemeClr val="tx1"/>
+          </a:fontRef>
+        </p:style>
+      </p:cxnSp>
+      <p:cxnSp>
+        <p:nvCxnSpPr>
+          <p:cNvPr id="31" name="Straight Arrow Connector 30">
+            <a:extLst>
+              <a:ext uri="{FF2B5EF4-FFF2-40B4-BE49-F238E27FC236}">
+                <a16:creationId xmlns:a16="http://schemas.microsoft.com/office/drawing/2014/main" id="{8D3F46D8-14DB-4377-807E-74727026AB92}"/>
+              </a:ext>
+            </a:extLst>
+          </p:cNvPr>
+          <p:cNvCxnSpPr>
+            <a:cxnSpLocks/>
+            <a:stCxn id="12" idx="3"/>
+            <a:endCxn id="13" idx="1"/>
+          </p:cNvCxnSpPr>
+          <p:nvPr/>
+        </p:nvCxnSpPr>
+        <p:spPr>
+          <a:xfrm>
+            <a:off x="6035255" y="3263908"/>
+            <a:ext cx="507429" cy="0"/>
+          </a:xfrm>
+          <a:prstGeom prst="straightConnector1">
+            <a:avLst/>
+          </a:prstGeom>
+          <a:ln w="19050">
+            <a:tailEnd type="triangle"/>
+          </a:ln>
+        </p:spPr>
+        <p:style>
+          <a:lnRef idx="1">
+            <a:schemeClr val="accent1"/>
+          </a:lnRef>
+          <a:fillRef idx="0">
+            <a:schemeClr val="accent1"/>
+          </a:fillRef>
+          <a:effectRef idx="0">
+            <a:schemeClr val="accent1"/>
+          </a:effectRef>
+          <a:fontRef idx="minor">
+            <a:schemeClr val="tx1"/>
+          </a:fontRef>
+        </p:style>
+      </p:cxnSp>
+      <p:cxnSp>
+        <p:nvCxnSpPr>
+          <p:cNvPr id="34" name="Straight Arrow Connector 33">
+            <a:extLst>
+              <a:ext uri="{FF2B5EF4-FFF2-40B4-BE49-F238E27FC236}">
+                <a16:creationId xmlns:a16="http://schemas.microsoft.com/office/drawing/2014/main" id="{3CE76AEF-E574-49D6-9D29-922BF0910BDB}"/>
+              </a:ext>
+            </a:extLst>
+          </p:cNvPr>
+          <p:cNvCxnSpPr>
+            <a:cxnSpLocks/>
+            <a:stCxn id="13" idx="3"/>
+            <a:endCxn id="15" idx="1"/>
+          </p:cNvCxnSpPr>
+          <p:nvPr/>
+        </p:nvCxnSpPr>
+        <p:spPr>
+          <a:xfrm>
+            <a:off x="7849626" y="3263908"/>
+            <a:ext cx="507429" cy="0"/>
+          </a:xfrm>
+          <a:prstGeom prst="straightConnector1">
+            <a:avLst/>
+          </a:prstGeom>
+          <a:ln w="19050">
+            <a:tailEnd type="triangle"/>
+          </a:ln>
+        </p:spPr>
+        <p:style>
+          <a:lnRef idx="1">
+            <a:schemeClr val="accent1"/>
+          </a:lnRef>
+          <a:fillRef idx="0">
+            <a:schemeClr val="accent1"/>
+          </a:fillRef>
+          <a:effectRef idx="0">
+            <a:schemeClr val="accent1"/>
+          </a:effectRef>
+          <a:fontRef idx="minor">
+            <a:schemeClr val="tx1"/>
+          </a:fontRef>
+        </p:style>
+      </p:cxnSp>
+      <p:cxnSp>
+        <p:nvCxnSpPr>
+          <p:cNvPr id="38" name="Straight Arrow Connector 37">
+            <a:extLst>
+              <a:ext uri="{FF2B5EF4-FFF2-40B4-BE49-F238E27FC236}">
+                <a16:creationId xmlns:a16="http://schemas.microsoft.com/office/drawing/2014/main" id="{DF393A5D-6D4A-47C2-9451-282F1A8B66E7}"/>
+              </a:ext>
+            </a:extLst>
+          </p:cNvPr>
+          <p:cNvCxnSpPr>
+            <a:cxnSpLocks/>
+            <a:stCxn id="15" idx="3"/>
+            <a:endCxn id="16" idx="1"/>
+          </p:cNvCxnSpPr>
+          <p:nvPr/>
+        </p:nvCxnSpPr>
+        <p:spPr>
+          <a:xfrm>
+            <a:off x="9511597" y="3263908"/>
+            <a:ext cx="507429" cy="0"/>
+          </a:xfrm>
+          <a:prstGeom prst="straightConnector1">
+            <a:avLst/>
+          </a:prstGeom>
+          <a:ln w="19050">
+            <a:tailEnd type="triangle"/>
+          </a:ln>
+        </p:spPr>
+        <p:style>
+          <a:lnRef idx="1">
+            <a:schemeClr val="accent1"/>
+          </a:lnRef>
+          <a:fillRef idx="0">
+            <a:schemeClr val="accent1"/>
+          </a:fillRef>
+          <a:effectRef idx="0">
+            <a:schemeClr val="accent1"/>
+          </a:effectRef>
+          <a:fontRef idx="minor">
+            <a:schemeClr val="tx1"/>
+          </a:fontRef>
+        </p:style>
+      </p:cxnSp>
+      <p:cxnSp>
+        <p:nvCxnSpPr>
+          <p:cNvPr id="41" name="Straight Arrow Connector 40">
+            <a:extLst>
+              <a:ext uri="{FF2B5EF4-FFF2-40B4-BE49-F238E27FC236}">
+                <a16:creationId xmlns:a16="http://schemas.microsoft.com/office/drawing/2014/main" id="{1EFB006A-7627-4D53-878E-652C317786D3}"/>
+              </a:ext>
+            </a:extLst>
+          </p:cNvPr>
+          <p:cNvCxnSpPr>
+            <a:cxnSpLocks/>
+            <a:stCxn id="22" idx="1"/>
+            <a:endCxn id="23" idx="3"/>
+          </p:cNvCxnSpPr>
+          <p:nvPr/>
+        </p:nvCxnSpPr>
+        <p:spPr>
+          <a:xfrm flipH="1">
+            <a:off x="2711313" y="4885807"/>
+            <a:ext cx="507429" cy="0"/>
+          </a:xfrm>
+          <a:prstGeom prst="straightConnector1">
+            <a:avLst/>
+          </a:prstGeom>
+          <a:ln w="19050">
+            <a:tailEnd type="triangle"/>
+          </a:ln>
+        </p:spPr>
+        <p:style>
+          <a:lnRef idx="1">
+            <a:schemeClr val="accent1"/>
+          </a:lnRef>
+          <a:fillRef idx="0">
+            <a:schemeClr val="accent1"/>
+          </a:fillRef>
+          <a:effectRef idx="0">
+            <a:schemeClr val="accent1"/>
+          </a:effectRef>
+          <a:fontRef idx="minor">
+            <a:schemeClr val="tx1"/>
+          </a:fontRef>
+        </p:style>
+      </p:cxnSp>
+      <p:cxnSp>
+        <p:nvCxnSpPr>
+          <p:cNvPr id="44" name="Straight Arrow Connector 43">
+            <a:extLst>
+              <a:ext uri="{FF2B5EF4-FFF2-40B4-BE49-F238E27FC236}">
+                <a16:creationId xmlns:a16="http://schemas.microsoft.com/office/drawing/2014/main" id="{0490FD33-2299-46E7-A2AE-A8EFA45EF49C}"/>
+              </a:ext>
+            </a:extLst>
+          </p:cNvPr>
+          <p:cNvCxnSpPr>
+            <a:cxnSpLocks/>
+            <a:stCxn id="21" idx="1"/>
+            <a:endCxn id="22" idx="3"/>
+          </p:cNvCxnSpPr>
+          <p:nvPr/>
+        </p:nvCxnSpPr>
+        <p:spPr>
+          <a:xfrm flipH="1">
+            <a:off x="4373284" y="4885807"/>
+            <a:ext cx="507429" cy="0"/>
+          </a:xfrm>
+          <a:prstGeom prst="straightConnector1">
+            <a:avLst/>
+          </a:prstGeom>
+          <a:ln w="19050">
+            <a:tailEnd type="triangle"/>
+          </a:ln>
+        </p:spPr>
+        <p:style>
+          <a:lnRef idx="1">
+            <a:schemeClr val="accent1"/>
+          </a:lnRef>
+          <a:fillRef idx="0">
+            <a:schemeClr val="accent1"/>
+          </a:fillRef>
+          <a:effectRef idx="0">
+            <a:schemeClr val="accent1"/>
+          </a:effectRef>
+          <a:fontRef idx="minor">
+            <a:schemeClr val="tx1"/>
+          </a:fontRef>
+        </p:style>
+      </p:cxnSp>
+      <p:cxnSp>
+        <p:nvCxnSpPr>
+          <p:cNvPr id="47" name="Straight Arrow Connector 46">
+            <a:extLst>
+              <a:ext uri="{FF2B5EF4-FFF2-40B4-BE49-F238E27FC236}">
+                <a16:creationId xmlns:a16="http://schemas.microsoft.com/office/drawing/2014/main" id="{DAE96BEF-462A-4A3B-B599-7B5CA1D7FB35}"/>
+              </a:ext>
+            </a:extLst>
+          </p:cNvPr>
+          <p:cNvCxnSpPr>
+            <a:cxnSpLocks/>
+            <a:stCxn id="20" idx="1"/>
+            <a:endCxn id="21" idx="3"/>
+          </p:cNvCxnSpPr>
+          <p:nvPr/>
+        </p:nvCxnSpPr>
+        <p:spPr>
+          <a:xfrm flipH="1">
+            <a:off x="6035255" y="4885807"/>
+            <a:ext cx="507429" cy="0"/>
+          </a:xfrm>
+          <a:prstGeom prst="straightConnector1">
+            <a:avLst/>
+          </a:prstGeom>
+          <a:ln w="19050">
+            <a:tailEnd type="triangle"/>
+          </a:ln>
+        </p:spPr>
+        <p:style>
+          <a:lnRef idx="1">
+            <a:schemeClr val="accent1"/>
+          </a:lnRef>
+          <a:fillRef idx="0">
+            <a:schemeClr val="accent1"/>
+          </a:fillRef>
+          <a:effectRef idx="0">
+            <a:schemeClr val="accent1"/>
+          </a:effectRef>
+          <a:fontRef idx="minor">
+            <a:schemeClr val="tx1"/>
+          </a:fontRef>
+        </p:style>
+      </p:cxnSp>
+      <p:cxnSp>
+        <p:nvCxnSpPr>
+          <p:cNvPr id="50" name="Straight Arrow Connector 49">
+            <a:extLst>
+              <a:ext uri="{FF2B5EF4-FFF2-40B4-BE49-F238E27FC236}">
+                <a16:creationId xmlns:a16="http://schemas.microsoft.com/office/drawing/2014/main" id="{C2E497CC-20BB-4B52-85AC-B20C76CFD3DE}"/>
+              </a:ext>
+            </a:extLst>
+          </p:cNvPr>
+          <p:cNvCxnSpPr>
+            <a:cxnSpLocks/>
+            <a:stCxn id="19" idx="1"/>
+            <a:endCxn id="20" idx="3"/>
+          </p:cNvCxnSpPr>
+          <p:nvPr/>
+        </p:nvCxnSpPr>
+        <p:spPr>
+          <a:xfrm flipH="1">
+            <a:off x="7697226" y="4885807"/>
+            <a:ext cx="507429" cy="0"/>
+          </a:xfrm>
+          <a:prstGeom prst="straightConnector1">
+            <a:avLst/>
+          </a:prstGeom>
+          <a:ln w="19050">
+            <a:tailEnd type="triangle"/>
+          </a:ln>
+        </p:spPr>
+        <p:style>
+          <a:lnRef idx="1">
+            <a:schemeClr val="accent1"/>
+          </a:lnRef>
+          <a:fillRef idx="0">
+            <a:schemeClr val="accent1"/>
+          </a:fillRef>
+          <a:effectRef idx="0">
+            <a:schemeClr val="accent1"/>
+          </a:effectRef>
+          <a:fontRef idx="minor">
+            <a:schemeClr val="tx1"/>
+          </a:fontRef>
+        </p:style>
+      </p:cxnSp>
+      <p:cxnSp>
+        <p:nvCxnSpPr>
+          <p:cNvPr id="56" name="Straight Arrow Connector 55">
+            <a:extLst>
+              <a:ext uri="{FF2B5EF4-FFF2-40B4-BE49-F238E27FC236}">
+                <a16:creationId xmlns:a16="http://schemas.microsoft.com/office/drawing/2014/main" id="{AB4106EE-0B72-4B4D-8E6B-6C8BA4401B7F}"/>
+              </a:ext>
+            </a:extLst>
+          </p:cNvPr>
+          <p:cNvCxnSpPr>
+            <a:cxnSpLocks/>
+            <a:stCxn id="17" idx="1"/>
+            <a:endCxn id="19" idx="3"/>
+          </p:cNvCxnSpPr>
+          <p:nvPr/>
+        </p:nvCxnSpPr>
+        <p:spPr>
+          <a:xfrm flipH="1">
+            <a:off x="9511597" y="4885807"/>
+            <a:ext cx="507429" cy="0"/>
+          </a:xfrm>
+          <a:prstGeom prst="straightConnector1">
+            <a:avLst/>
+          </a:prstGeom>
+          <a:ln w="19050">
+            <a:tailEnd type="triangle"/>
+          </a:ln>
+        </p:spPr>
+        <p:style>
+          <a:lnRef idx="1">
+            <a:schemeClr val="accent1"/>
+          </a:lnRef>
+          <a:fillRef idx="0">
+            <a:schemeClr val="accent1"/>
+          </a:fillRef>
+          <a:effectRef idx="0">
+            <a:schemeClr val="accent1"/>
+          </a:effectRef>
+          <a:fontRef idx="minor">
+            <a:schemeClr val="tx1"/>
+          </a:fontRef>
+        </p:style>
+      </p:cxnSp>
+      <p:cxnSp>
+        <p:nvCxnSpPr>
+          <p:cNvPr id="59" name="Straight Arrow Connector 58">
+            <a:extLst>
+              <a:ext uri="{FF2B5EF4-FFF2-40B4-BE49-F238E27FC236}">
+                <a16:creationId xmlns:a16="http://schemas.microsoft.com/office/drawing/2014/main" id="{1492C44B-0084-4C63-A1FD-85938BDBE6FD}"/>
+              </a:ext>
+            </a:extLst>
+          </p:cNvPr>
+          <p:cNvCxnSpPr>
+            <a:cxnSpLocks/>
+            <a:stCxn id="16" idx="2"/>
+            <a:endCxn id="17" idx="0"/>
+          </p:cNvCxnSpPr>
+          <p:nvPr/>
+        </p:nvCxnSpPr>
+        <p:spPr>
+          <a:xfrm>
+            <a:off x="10596297" y="3614201"/>
+            <a:ext cx="0" cy="921313"/>
+          </a:xfrm>
+          <a:prstGeom prst="straightConnector1">
+            <a:avLst/>
+          </a:prstGeom>
+          <a:ln w="19050">
+            <a:tailEnd type="triangle"/>
+          </a:ln>
+        </p:spPr>
+        <p:style>
+          <a:lnRef idx="1">
+            <a:schemeClr val="accent1"/>
+          </a:lnRef>
+          <a:fillRef idx="0">
+            <a:schemeClr val="accent1"/>
+          </a:fillRef>
+          <a:effectRef idx="0">
+            <a:schemeClr val="accent1"/>
+          </a:effectRef>
+          <a:fontRef idx="minor">
+            <a:schemeClr val="tx1"/>
+          </a:fontRef>
+        </p:style>
+      </p:cxnSp>
+      <p:cxnSp>
+        <p:nvCxnSpPr>
+          <p:cNvPr id="62" name="Straight Arrow Connector 61">
+            <a:extLst>
+              <a:ext uri="{FF2B5EF4-FFF2-40B4-BE49-F238E27FC236}">
+                <a16:creationId xmlns:a16="http://schemas.microsoft.com/office/drawing/2014/main" id="{1A89D27D-8B06-43F6-B331-1BA5B7E28DF2}"/>
+              </a:ext>
+            </a:extLst>
+          </p:cNvPr>
+          <p:cNvCxnSpPr>
+            <a:cxnSpLocks/>
+            <a:stCxn id="23" idx="2"/>
+          </p:cNvCxnSpPr>
+          <p:nvPr/>
+        </p:nvCxnSpPr>
+        <p:spPr>
+          <a:xfrm>
+            <a:off x="2134042" y="5236100"/>
+            <a:ext cx="0" cy="646085"/>
+          </a:xfrm>
+          <a:prstGeom prst="straightConnector1">
+            <a:avLst/>
+          </a:prstGeom>
+          <a:ln w="19050">
+            <a:tailEnd type="triangle"/>
+          </a:ln>
+        </p:spPr>
+        <p:style>
+          <a:lnRef idx="1">
+            <a:schemeClr val="accent1"/>
+          </a:lnRef>
+          <a:fillRef idx="0">
+            <a:schemeClr val="accent1"/>
+          </a:fillRef>
+          <a:effectRef idx="0">
+            <a:schemeClr val="accent1"/>
+          </a:effectRef>
+          <a:fontRef idx="minor">
+            <a:schemeClr val="tx1"/>
+          </a:fontRef>
+        </p:style>
+      </p:cxnSp>
+      <p:sp>
+        <p:nvSpPr>
+          <p:cNvPr id="65" name="Oval 64">
+            <a:extLst>
+              <a:ext uri="{FF2B5EF4-FFF2-40B4-BE49-F238E27FC236}">
+                <a16:creationId xmlns:a16="http://schemas.microsoft.com/office/drawing/2014/main" id="{8FEEFE47-4CDB-42CC-AE7B-62F1972A5A44}"/>
+              </a:ext>
+            </a:extLst>
+          </p:cNvPr>
+          <p:cNvSpPr/>
+          <p:nvPr/>
+        </p:nvSpPr>
+        <p:spPr>
+          <a:xfrm>
+            <a:off x="1955710" y="5882185"/>
+            <a:ext cx="371197" cy="348018"/>
+          </a:xfrm>
+          <a:prstGeom prst="ellipse">
+            <a:avLst/>
+          </a:prstGeom>
+          <a:ln w="28575">
+            <a:solidFill>
+              <a:schemeClr val="accent1"/>
+            </a:solidFill>
+          </a:ln>
+        </p:spPr>
+        <p:style>
+          <a:lnRef idx="2">
+            <a:schemeClr val="accent6"/>
+          </a:lnRef>
+          <a:fillRef idx="1">
+            <a:schemeClr val="lt1"/>
+          </a:fillRef>
+          <a:effectRef idx="0">
+            <a:schemeClr val="accent6"/>
+          </a:effectRef>
+          <a:fontRef idx="minor">
+            <a:schemeClr val="dk1"/>
+          </a:fontRef>
+        </p:style>
+        <p:txBody>
+          <a:bodyPr rtlCol="0" anchor="ctr"/>
+          <a:lstStyle/>
+          <a:p>
+            <a:pPr algn="ctr"/>
+            <a:endParaRPr lang="en-SG"/>
+          </a:p>
+        </p:txBody>
+      </p:sp>
+      <p:sp>
+        <p:nvSpPr>
+          <p:cNvPr id="66" name="Oval 65">
+            <a:extLst>
+              <a:ext uri="{FF2B5EF4-FFF2-40B4-BE49-F238E27FC236}">
+                <a16:creationId xmlns:a16="http://schemas.microsoft.com/office/drawing/2014/main" id="{B99E5AC4-A4AF-4165-938D-96C2AC26EFB9}"/>
+              </a:ext>
+            </a:extLst>
+          </p:cNvPr>
+          <p:cNvSpPr/>
+          <p:nvPr/>
+        </p:nvSpPr>
+        <p:spPr>
+          <a:xfrm>
+            <a:off x="647235" y="3089899"/>
+            <a:ext cx="371197" cy="348018"/>
+          </a:xfrm>
+          <a:prstGeom prst="ellipse">
+            <a:avLst/>
+          </a:prstGeom>
+          <a:ln w="28575">
+            <a:solidFill>
+              <a:schemeClr val="accent1"/>
+            </a:solidFill>
+          </a:ln>
+        </p:spPr>
+        <p:style>
+          <a:lnRef idx="2">
+            <a:schemeClr val="accent6"/>
+          </a:lnRef>
+          <a:fillRef idx="1">
+            <a:schemeClr val="lt1"/>
+          </a:fillRef>
+          <a:effectRef idx="0">
+            <a:schemeClr val="accent6"/>
+          </a:effectRef>
+          <a:fontRef idx="minor">
+            <a:schemeClr val="dk1"/>
+          </a:fontRef>
+        </p:style>
+        <p:txBody>
+          <a:bodyPr rtlCol="0" anchor="ctr"/>
+          <a:lstStyle/>
+          <a:p>
+            <a:pPr algn="ctr"/>
+            <a:endParaRPr lang="en-SG"/>
+          </a:p>
+        </p:txBody>
+      </p:sp>
+      <p:cxnSp>
+        <p:nvCxnSpPr>
+          <p:cNvPr id="67" name="Straight Arrow Connector 66">
+            <a:extLst>
+              <a:ext uri="{FF2B5EF4-FFF2-40B4-BE49-F238E27FC236}">
+                <a16:creationId xmlns:a16="http://schemas.microsoft.com/office/drawing/2014/main" id="{B6759223-E581-4B4A-8D95-1512EB648E90}"/>
+              </a:ext>
+            </a:extLst>
+          </p:cNvPr>
+          <p:cNvCxnSpPr>
+            <a:cxnSpLocks/>
+            <a:stCxn id="66" idx="6"/>
+            <a:endCxn id="4" idx="1"/>
+          </p:cNvCxnSpPr>
+          <p:nvPr/>
+        </p:nvCxnSpPr>
+        <p:spPr>
+          <a:xfrm>
+            <a:off x="1018432" y="3263908"/>
+            <a:ext cx="538339" cy="0"/>
+          </a:xfrm>
+          <a:prstGeom prst="straightConnector1">
+            <a:avLst/>
+          </a:prstGeom>
+          <a:ln w="19050">
+            <a:tailEnd type="triangle"/>
+          </a:ln>
+        </p:spPr>
+        <p:style>
+          <a:lnRef idx="1">
+            <a:schemeClr val="accent1"/>
+          </a:lnRef>
+          <a:fillRef idx="0">
+            <a:schemeClr val="accent1"/>
+          </a:fillRef>
+          <a:effectRef idx="0">
+            <a:schemeClr val="accent1"/>
+          </a:effectRef>
+          <a:fontRef idx="minor">
+            <a:schemeClr val="tx1"/>
+          </a:fontRef>
+        </p:style>
+      </p:cxnSp>
+      <p:sp>
+        <p:nvSpPr>
+          <p:cNvPr id="71" name="TextBox 70">
+            <a:extLst>
+              <a:ext uri="{FF2B5EF4-FFF2-40B4-BE49-F238E27FC236}">
+                <a16:creationId xmlns:a16="http://schemas.microsoft.com/office/drawing/2014/main" id="{476EB3F2-03ED-4341-851A-CE3F7170A194}"/>
+              </a:ext>
+            </a:extLst>
+          </p:cNvPr>
+          <p:cNvSpPr txBox="1"/>
+          <p:nvPr/>
+        </p:nvSpPr>
+        <p:spPr>
+          <a:xfrm>
+            <a:off x="591549" y="2827230"/>
+            <a:ext cx="482568" cy="276999"/>
+          </a:xfrm>
+          <a:prstGeom prst="rect">
+            <a:avLst/>
+          </a:prstGeom>
+          <a:noFill/>
+        </p:spPr>
+        <p:txBody>
+          <a:bodyPr wrap="none" rtlCol="0">
+            <a:spAutoFit/>
           </a:bodyPr>
           <a:lstStyle/>
           <a:p>
-            <a:endParaRPr lang="en-SG" sz="2000">
-              <a:solidFill>
-                <a:srgbClr val="000000"/>
-              </a:solidFill>
-            </a:endParaRPr>
+            <a:r>
+              <a:rPr lang="en-US" sz="1200" dirty="0"/>
+              <a:t>Start</a:t>
+            </a:r>
+            <a:endParaRPr lang="en-SG" sz="1200" dirty="0"/>
+          </a:p>
+        </p:txBody>
+      </p:sp>
+      <p:sp>
+        <p:nvSpPr>
+          <p:cNvPr id="73" name="TextBox 72">
+            <a:extLst>
+              <a:ext uri="{FF2B5EF4-FFF2-40B4-BE49-F238E27FC236}">
+                <a16:creationId xmlns:a16="http://schemas.microsoft.com/office/drawing/2014/main" id="{516678A9-7BC2-44CB-B5F9-7DC5FF2BF874}"/>
+              </a:ext>
+            </a:extLst>
+          </p:cNvPr>
+          <p:cNvSpPr txBox="1"/>
+          <p:nvPr/>
+        </p:nvSpPr>
+        <p:spPr>
+          <a:xfrm>
+            <a:off x="1892758" y="6230203"/>
+            <a:ext cx="420308" cy="276999"/>
+          </a:xfrm>
+          <a:prstGeom prst="rect">
+            <a:avLst/>
+          </a:prstGeom>
+          <a:noFill/>
+        </p:spPr>
+        <p:txBody>
+          <a:bodyPr wrap="none" rtlCol="0">
+            <a:spAutoFit/>
+          </a:bodyPr>
+          <a:lstStyle/>
+          <a:p>
+            <a:r>
+              <a:rPr lang="en-US" sz="1200" dirty="0"/>
+              <a:t>End</a:t>
+            </a:r>
+            <a:endParaRPr lang="en-SG" sz="1200" dirty="0"/>
           </a:p>
         </p:txBody>
       </p:sp>

</xml_diff>

<commit_message>
Update on PM Review
Revise PM Review slides
</commit_message>
<xml_diff>
--- a/presentations/PM Review - Week 7.pptx
+++ b/presentations/PM Review - Week 7.pptx
@@ -5,7 +5,7 @@
     <p:sldMasterId id="2147483648" r:id="rId1"/>
   </p:sldMasterIdLst>
   <p:notesMasterIdLst>
-    <p:notesMasterId r:id="rId14"/>
+    <p:notesMasterId r:id="rId18"/>
   </p:notesMasterIdLst>
   <p:sldIdLst>
     <p:sldId id="256" r:id="rId2"/>
@@ -17,9 +17,13 @@
     <p:sldId id="267" r:id="rId8"/>
     <p:sldId id="262" r:id="rId9"/>
     <p:sldId id="266" r:id="rId10"/>
-    <p:sldId id="265" r:id="rId11"/>
-    <p:sldId id="268" r:id="rId12"/>
-    <p:sldId id="269" r:id="rId13"/>
+    <p:sldId id="270" r:id="rId11"/>
+    <p:sldId id="271" r:id="rId12"/>
+    <p:sldId id="272" r:id="rId13"/>
+    <p:sldId id="265" r:id="rId14"/>
+    <p:sldId id="268" r:id="rId15"/>
+    <p:sldId id="269" r:id="rId16"/>
+    <p:sldId id="273" r:id="rId17"/>
   </p:sldIdLst>
   <p:sldSz cx="12192000" cy="6858000"/>
   <p:notesSz cx="6858000" cy="9144000"/>
@@ -793,7 +797,7 @@
           <a:p>
             <a:fld id="{A5DD6795-6237-4751-AF39-03266F874185}" type="slidenum">
               <a:rPr lang="en-SG" smtClean="0"/>
-              <a:t>11</a:t>
+              <a:t>10</a:t>
             </a:fld>
             <a:endParaRPr lang="en-SG"/>
           </a:p>
@@ -802,7 +806,7 @@
     </p:spTree>
     <p:extLst>
       <p:ext uri="{BB962C8B-B14F-4D97-AF65-F5344CB8AC3E}">
-        <p14:creationId xmlns:p14="http://schemas.microsoft.com/office/powerpoint/2010/main" val="2206007641"/>
+        <p14:creationId xmlns:p14="http://schemas.microsoft.com/office/powerpoint/2010/main" val="1550472986"/>
       </p:ext>
     </p:extLst>
   </p:cSld>
@@ -877,7 +881,259 @@
           <a:p>
             <a:fld id="{A5DD6795-6237-4751-AF39-03266F874185}" type="slidenum">
               <a:rPr lang="en-SG" smtClean="0"/>
+              <a:t>11</a:t>
+            </a:fld>
+            <a:endParaRPr lang="en-SG"/>
+          </a:p>
+        </p:txBody>
+      </p:sp>
+    </p:spTree>
+    <p:extLst>
+      <p:ext uri="{BB962C8B-B14F-4D97-AF65-F5344CB8AC3E}">
+        <p14:creationId xmlns:p14="http://schemas.microsoft.com/office/powerpoint/2010/main" val="785707279"/>
+      </p:ext>
+    </p:extLst>
+  </p:cSld>
+  <p:clrMapOvr>
+    <a:masterClrMapping/>
+  </p:clrMapOvr>
+</p:notes>
+</file>
+
+<file path=ppt/notesSlides/notesSlide6.xml><?xml version="1.0" encoding="utf-8"?>
+<p:notes xmlns:a="http://schemas.openxmlformats.org/drawingml/2006/main" xmlns:r="http://schemas.openxmlformats.org/officeDocument/2006/relationships" xmlns:p="http://schemas.openxmlformats.org/presentationml/2006/main">
+  <p:cSld>
+    <p:spTree>
+      <p:nvGrpSpPr>
+        <p:cNvPr id="1" name=""/>
+        <p:cNvGrpSpPr/>
+        <p:nvPr/>
+      </p:nvGrpSpPr>
+      <p:grpSpPr>
+        <a:xfrm>
+          <a:off x="0" y="0"/>
+          <a:ext cx="0" cy="0"/>
+          <a:chOff x="0" y="0"/>
+          <a:chExt cx="0" cy="0"/>
+        </a:xfrm>
+      </p:grpSpPr>
+      <p:sp>
+        <p:nvSpPr>
+          <p:cNvPr id="2" name="Slide Image Placeholder 1"/>
+          <p:cNvSpPr>
+            <a:spLocks noGrp="1" noRot="1" noChangeAspect="1"/>
+          </p:cNvSpPr>
+          <p:nvPr>
+            <p:ph type="sldImg"/>
+          </p:nvPr>
+        </p:nvSpPr>
+        <p:spPr/>
+      </p:sp>
+      <p:sp>
+        <p:nvSpPr>
+          <p:cNvPr id="3" name="Notes Placeholder 2"/>
+          <p:cNvSpPr>
+            <a:spLocks noGrp="1"/>
+          </p:cNvSpPr>
+          <p:nvPr>
+            <p:ph type="body" idx="1"/>
+          </p:nvPr>
+        </p:nvSpPr>
+        <p:spPr/>
+        <p:txBody>
+          <a:bodyPr/>
+          <a:lstStyle/>
+          <a:p>
+            <a:endParaRPr lang="en-SG" dirty="0"/>
+          </a:p>
+        </p:txBody>
+      </p:sp>
+      <p:sp>
+        <p:nvSpPr>
+          <p:cNvPr id="4" name="Slide Number Placeholder 3"/>
+          <p:cNvSpPr>
+            <a:spLocks noGrp="1"/>
+          </p:cNvSpPr>
+          <p:nvPr>
+            <p:ph type="sldNum" sz="quarter" idx="5"/>
+          </p:nvPr>
+        </p:nvSpPr>
+        <p:spPr/>
+        <p:txBody>
+          <a:bodyPr/>
+          <a:lstStyle/>
+          <a:p>
+            <a:fld id="{A5DD6795-6237-4751-AF39-03266F874185}" type="slidenum">
+              <a:rPr lang="en-SG" smtClean="0"/>
               <a:t>12</a:t>
+            </a:fld>
+            <a:endParaRPr lang="en-SG"/>
+          </a:p>
+        </p:txBody>
+      </p:sp>
+    </p:spTree>
+    <p:extLst>
+      <p:ext uri="{BB962C8B-B14F-4D97-AF65-F5344CB8AC3E}">
+        <p14:creationId xmlns:p14="http://schemas.microsoft.com/office/powerpoint/2010/main" val="714780837"/>
+      </p:ext>
+    </p:extLst>
+  </p:cSld>
+  <p:clrMapOvr>
+    <a:masterClrMapping/>
+  </p:clrMapOvr>
+</p:notes>
+</file>
+
+<file path=ppt/notesSlides/notesSlide7.xml><?xml version="1.0" encoding="utf-8"?>
+<p:notes xmlns:a="http://schemas.openxmlformats.org/drawingml/2006/main" xmlns:r="http://schemas.openxmlformats.org/officeDocument/2006/relationships" xmlns:p="http://schemas.openxmlformats.org/presentationml/2006/main">
+  <p:cSld>
+    <p:spTree>
+      <p:nvGrpSpPr>
+        <p:cNvPr id="1" name=""/>
+        <p:cNvGrpSpPr/>
+        <p:nvPr/>
+      </p:nvGrpSpPr>
+      <p:grpSpPr>
+        <a:xfrm>
+          <a:off x="0" y="0"/>
+          <a:ext cx="0" cy="0"/>
+          <a:chOff x="0" y="0"/>
+          <a:chExt cx="0" cy="0"/>
+        </a:xfrm>
+      </p:grpSpPr>
+      <p:sp>
+        <p:nvSpPr>
+          <p:cNvPr id="2" name="Slide Image Placeholder 1"/>
+          <p:cNvSpPr>
+            <a:spLocks noGrp="1" noRot="1" noChangeAspect="1"/>
+          </p:cNvSpPr>
+          <p:nvPr>
+            <p:ph type="sldImg"/>
+          </p:nvPr>
+        </p:nvSpPr>
+        <p:spPr/>
+      </p:sp>
+      <p:sp>
+        <p:nvSpPr>
+          <p:cNvPr id="3" name="Notes Placeholder 2"/>
+          <p:cNvSpPr>
+            <a:spLocks noGrp="1"/>
+          </p:cNvSpPr>
+          <p:nvPr>
+            <p:ph type="body" idx="1"/>
+          </p:nvPr>
+        </p:nvSpPr>
+        <p:spPr/>
+        <p:txBody>
+          <a:bodyPr/>
+          <a:lstStyle/>
+          <a:p>
+            <a:endParaRPr lang="en-SG" dirty="0"/>
+          </a:p>
+        </p:txBody>
+      </p:sp>
+      <p:sp>
+        <p:nvSpPr>
+          <p:cNvPr id="4" name="Slide Number Placeholder 3"/>
+          <p:cNvSpPr>
+            <a:spLocks noGrp="1"/>
+          </p:cNvSpPr>
+          <p:nvPr>
+            <p:ph type="sldNum" sz="quarter" idx="5"/>
+          </p:nvPr>
+        </p:nvSpPr>
+        <p:spPr/>
+        <p:txBody>
+          <a:bodyPr/>
+          <a:lstStyle/>
+          <a:p>
+            <a:fld id="{A5DD6795-6237-4751-AF39-03266F874185}" type="slidenum">
+              <a:rPr lang="en-SG" smtClean="0"/>
+              <a:t>14</a:t>
+            </a:fld>
+            <a:endParaRPr lang="en-SG"/>
+          </a:p>
+        </p:txBody>
+      </p:sp>
+    </p:spTree>
+    <p:extLst>
+      <p:ext uri="{BB962C8B-B14F-4D97-AF65-F5344CB8AC3E}">
+        <p14:creationId xmlns:p14="http://schemas.microsoft.com/office/powerpoint/2010/main" val="2206007641"/>
+      </p:ext>
+    </p:extLst>
+  </p:cSld>
+  <p:clrMapOvr>
+    <a:masterClrMapping/>
+  </p:clrMapOvr>
+</p:notes>
+</file>
+
+<file path=ppt/notesSlides/notesSlide8.xml><?xml version="1.0" encoding="utf-8"?>
+<p:notes xmlns:a="http://schemas.openxmlformats.org/drawingml/2006/main" xmlns:r="http://schemas.openxmlformats.org/officeDocument/2006/relationships" xmlns:p="http://schemas.openxmlformats.org/presentationml/2006/main">
+  <p:cSld>
+    <p:spTree>
+      <p:nvGrpSpPr>
+        <p:cNvPr id="1" name=""/>
+        <p:cNvGrpSpPr/>
+        <p:nvPr/>
+      </p:nvGrpSpPr>
+      <p:grpSpPr>
+        <a:xfrm>
+          <a:off x="0" y="0"/>
+          <a:ext cx="0" cy="0"/>
+          <a:chOff x="0" y="0"/>
+          <a:chExt cx="0" cy="0"/>
+        </a:xfrm>
+      </p:grpSpPr>
+      <p:sp>
+        <p:nvSpPr>
+          <p:cNvPr id="2" name="Slide Image Placeholder 1"/>
+          <p:cNvSpPr>
+            <a:spLocks noGrp="1" noRot="1" noChangeAspect="1"/>
+          </p:cNvSpPr>
+          <p:nvPr>
+            <p:ph type="sldImg"/>
+          </p:nvPr>
+        </p:nvSpPr>
+        <p:spPr/>
+      </p:sp>
+      <p:sp>
+        <p:nvSpPr>
+          <p:cNvPr id="3" name="Notes Placeholder 2"/>
+          <p:cNvSpPr>
+            <a:spLocks noGrp="1"/>
+          </p:cNvSpPr>
+          <p:nvPr>
+            <p:ph type="body" idx="1"/>
+          </p:nvPr>
+        </p:nvSpPr>
+        <p:spPr/>
+        <p:txBody>
+          <a:bodyPr/>
+          <a:lstStyle/>
+          <a:p>
+            <a:endParaRPr lang="en-SG" dirty="0"/>
+          </a:p>
+        </p:txBody>
+      </p:sp>
+      <p:sp>
+        <p:nvSpPr>
+          <p:cNvPr id="4" name="Slide Number Placeholder 3"/>
+          <p:cNvSpPr>
+            <a:spLocks noGrp="1"/>
+          </p:cNvSpPr>
+          <p:nvPr>
+            <p:ph type="sldNum" sz="quarter" idx="5"/>
+          </p:nvPr>
+        </p:nvSpPr>
+        <p:spPr/>
+        <p:txBody>
+          <a:bodyPr/>
+          <a:lstStyle/>
+          <a:p>
+            <a:fld id="{A5DD6795-6237-4751-AF39-03266F874185}" type="slidenum">
+              <a:rPr lang="en-SG" smtClean="0"/>
+              <a:t>15</a:t>
             </a:fld>
             <a:endParaRPr lang="en-SG"/>
           </a:p>
@@ -4287,28 +4543,47 @@
         </p:nvSpPr>
         <p:spPr>
           <a:xfrm>
-            <a:off x="3045368" y="2043663"/>
-            <a:ext cx="6105194" cy="1207537"/>
+            <a:off x="3043403" y="566379"/>
+            <a:ext cx="6105194" cy="2809571"/>
           </a:xfrm>
         </p:spPr>
         <p:txBody>
           <a:bodyPr>
-            <a:normAutofit/>
+            <a:noAutofit/>
           </a:bodyPr>
           <a:lstStyle/>
           <a:p>
             <a:r>
-              <a:rPr lang="en-US" dirty="0">
+              <a:rPr lang="en-US" b="1" dirty="0">
                 <a:solidFill>
                   <a:srgbClr val="FFFFFF"/>
                 </a:solidFill>
+                <a:latin typeface="Gloss And Bloom" pitchFamily="2" charset="0"/>
               </a:rPr>
-              <a:t>SPM PM Review</a:t>
-            </a:r>
-            <a:endParaRPr lang="en-SG" dirty="0">
+              <a:t>SPM </a:t>
+            </a:r>
+            <a:br>
+              <a:rPr lang="en-US" b="1" dirty="0">
+                <a:solidFill>
+                  <a:srgbClr val="FFFFFF"/>
+                </a:solidFill>
+                <a:latin typeface="Gloss And Bloom" pitchFamily="2" charset="0"/>
+              </a:rPr>
+            </a:br>
+            <a:r>
+              <a:rPr lang="en-US" b="1" dirty="0">
+                <a:solidFill>
+                  <a:srgbClr val="FFFFFF"/>
+                </a:solidFill>
+                <a:latin typeface="Gloss And Bloom" pitchFamily="2" charset="0"/>
+              </a:rPr>
+              <a:t>PM Review</a:t>
+            </a:r>
+            <a:endParaRPr lang="en-SG" b="1" dirty="0">
               <a:solidFill>
                 <a:srgbClr val="FFFFFF"/>
               </a:solidFill>
+              <a:latin typeface="Gloss And Bloom" pitchFamily="2" charset="0"/>
             </a:endParaRPr>
           </a:p>
         </p:txBody>
@@ -4331,8 +4606,8 @@
         </p:nvSpPr>
         <p:spPr>
           <a:xfrm>
-            <a:off x="3043403" y="3526078"/>
-            <a:ext cx="6105194" cy="1655522"/>
+            <a:off x="0" y="3422176"/>
+            <a:ext cx="12192000" cy="2690478"/>
           </a:xfrm>
         </p:spPr>
         <p:txBody>
@@ -4342,7 +4617,7 @@
           <a:lstStyle/>
           <a:p>
             <a:r>
-              <a:rPr lang="en-US" dirty="0">
+              <a:rPr lang="en-US" sz="2800" b="1" dirty="0">
                 <a:solidFill>
                   <a:srgbClr val="FFFFFF"/>
                 </a:solidFill>
@@ -4383,7 +4658,45 @@
                   <a:srgbClr val="FFFFFF"/>
                 </a:solidFill>
               </a:rPr>
-              <a:t> Xin, Tricia Tan Li Lin, Ong Yan Ning, Loh Xiao Binn</a:t>
+              <a:t> Xin</a:t>
+            </a:r>
+          </a:p>
+          <a:p>
+            <a:r>
+              <a:rPr lang="en-SG" dirty="0">
+                <a:solidFill>
+                  <a:srgbClr val="FFFFFF"/>
+                </a:solidFill>
+              </a:rPr>
+              <a:t> Tricia Tan Li Lin</a:t>
+            </a:r>
+          </a:p>
+          <a:p>
+            <a:r>
+              <a:rPr lang="en-SG" dirty="0">
+                <a:solidFill>
+                  <a:srgbClr val="FFFFFF"/>
+                </a:solidFill>
+              </a:rPr>
+              <a:t>Ong Yan Ning</a:t>
+            </a:r>
+          </a:p>
+          <a:p>
+            <a:r>
+              <a:rPr lang="en-SG" dirty="0" err="1">
+                <a:solidFill>
+                  <a:srgbClr val="FFFFFF"/>
+                </a:solidFill>
+              </a:rPr>
+              <a:t>Loh</a:t>
+            </a:r>
+            <a:r>
+              <a:rPr lang="en-SG" dirty="0">
+                <a:solidFill>
+                  <a:srgbClr val="FFFFFF"/>
+                </a:solidFill>
+              </a:rPr>
+              <a:t> Xiao Binn</a:t>
             </a:r>
           </a:p>
           <a:p>
@@ -4409,6 +4722,3344 @@
 </file>
 
 <file path=ppt/slides/slide10.xml><?xml version="1.0" encoding="utf-8"?>
+<p:sld xmlns:a="http://schemas.openxmlformats.org/drawingml/2006/main" xmlns:r="http://schemas.openxmlformats.org/officeDocument/2006/relationships" xmlns:p="http://schemas.openxmlformats.org/presentationml/2006/main">
+  <p:cSld>
+    <p:bg>
+      <p:bgPr>
+        <a:solidFill>
+          <a:schemeClr val="bg1"/>
+        </a:solidFill>
+        <a:effectLst/>
+      </p:bgPr>
+    </p:bg>
+    <p:spTree>
+      <p:nvGrpSpPr>
+        <p:cNvPr id="1" name=""/>
+        <p:cNvGrpSpPr/>
+        <p:nvPr/>
+      </p:nvGrpSpPr>
+      <p:grpSpPr>
+        <a:xfrm>
+          <a:off x="0" y="0"/>
+          <a:ext cx="0" cy="0"/>
+          <a:chOff x="0" y="0"/>
+          <a:chExt cx="0" cy="0"/>
+        </a:xfrm>
+      </p:grpSpPr>
+      <p:sp>
+        <p:nvSpPr>
+          <p:cNvPr id="8" name="Rectangle 7">
+            <a:extLst>
+              <a:ext uri="{FF2B5EF4-FFF2-40B4-BE49-F238E27FC236}">
+                <a16:creationId xmlns:a16="http://schemas.microsoft.com/office/drawing/2014/main" id="{4351DFE5-F63D-4BE0-BDA9-E3EB88F01AA5}"/>
+              </a:ext>
+              <a:ext uri="{C183D7F6-B498-43B3-948B-1728B52AA6E4}">
+                <adec:decorative xmlns:adec="http://schemas.microsoft.com/office/drawing/2017/decorative" val="1"/>
+              </a:ext>
+            </a:extLst>
+          </p:cNvPr>
+          <p:cNvSpPr>
+            <a:spLocks noGrp="1" noRot="1" noChangeAspect="1" noMove="1" noResize="1" noEditPoints="1" noAdjustHandles="1" noChangeArrowheads="1" noChangeShapeType="1" noTextEdit="1"/>
+          </p:cNvSpPr>
+          <p:nvPr>
+            <p:extLst>
+              <p:ext uri="{386F3935-93C4-4BCD-93E2-E3B085C9AB24}">
+                <p16:designElem xmlns:p16="http://schemas.microsoft.com/office/powerpoint/2015/main" val="1"/>
+              </p:ext>
+            </p:extLst>
+          </p:nvPr>
+        </p:nvSpPr>
+        <p:spPr>
+          <a:xfrm>
+            <a:off x="355601" y="0"/>
+            <a:ext cx="11480494" cy="2753936"/>
+          </a:xfrm>
+          <a:prstGeom prst="rect">
+            <a:avLst/>
+          </a:prstGeom>
+          <a:gradFill>
+            <a:gsLst>
+              <a:gs pos="0">
+                <a:schemeClr val="accent1">
+                  <a:lumMod val="90000"/>
+                </a:schemeClr>
+              </a:gs>
+              <a:gs pos="25000">
+                <a:schemeClr val="accent1">
+                  <a:lumMod val="90000"/>
+                </a:schemeClr>
+              </a:gs>
+              <a:gs pos="94000">
+                <a:schemeClr val="bg2">
+                  <a:lumMod val="25000"/>
+                </a:schemeClr>
+              </a:gs>
+              <a:gs pos="100000">
+                <a:schemeClr val="bg2">
+                  <a:lumMod val="25000"/>
+                </a:schemeClr>
+              </a:gs>
+            </a:gsLst>
+            <a:lin ang="4200000" scaled="0"/>
+          </a:gradFill>
+          <a:ln>
+            <a:noFill/>
+          </a:ln>
+        </p:spPr>
+        <p:style>
+          <a:lnRef idx="2">
+            <a:schemeClr val="accent1">
+              <a:shade val="50000"/>
+            </a:schemeClr>
+          </a:lnRef>
+          <a:fillRef idx="1">
+            <a:schemeClr val="accent1"/>
+          </a:fillRef>
+          <a:effectRef idx="0">
+            <a:schemeClr val="accent1"/>
+          </a:effectRef>
+          <a:fontRef idx="minor">
+            <a:schemeClr val="lt1"/>
+          </a:fontRef>
+        </p:style>
+        <p:txBody>
+          <a:bodyPr rtlCol="0" anchor="ctr"/>
+          <a:lstStyle/>
+          <a:p>
+            <a:pPr algn="ctr"/>
+            <a:endParaRPr lang="en-US"/>
+          </a:p>
+        </p:txBody>
+      </p:sp>
+      <p:pic>
+        <p:nvPicPr>
+          <p:cNvPr id="10" name="Picture 9">
+            <a:extLst>
+              <a:ext uri="{FF2B5EF4-FFF2-40B4-BE49-F238E27FC236}">
+                <a16:creationId xmlns:a16="http://schemas.microsoft.com/office/drawing/2014/main" id="{3AA16612-ACD2-4A16-8F2B-4514FD6BF28F}"/>
+              </a:ext>
+              <a:ext uri="{C183D7F6-B498-43B3-948B-1728B52AA6E4}">
+                <adec:decorative xmlns:adec="http://schemas.microsoft.com/office/drawing/2017/decorative" val="1"/>
+              </a:ext>
+            </a:extLst>
+          </p:cNvPr>
+          <p:cNvPicPr>
+            <a:picLocks noGrp="1" noRot="1" noChangeAspect="1" noMove="1" noResize="1" noEditPoints="1" noAdjustHandles="1" noChangeArrowheads="1" noChangeShapeType="1" noCrop="1"/>
+          </p:cNvPicPr>
+          <p:nvPr>
+            <p:extLst>
+              <p:ext uri="{386F3935-93C4-4BCD-93E2-E3B085C9AB24}">
+                <p16:designElem xmlns:p16="http://schemas.microsoft.com/office/powerpoint/2015/main" val="1"/>
+              </p:ext>
+            </p:extLst>
+          </p:nvPr>
+        </p:nvPicPr>
+        <p:blipFill>
+          <a:blip r:embed="rId3">
+            <a:extLst>
+              <a:ext uri="{28A0092B-C50C-407E-A947-70E740481C1C}">
+                <a14:useLocalDpi xmlns:a14="http://schemas.microsoft.com/office/drawing/2010/main" val="0"/>
+              </a:ext>
+            </a:extLst>
+          </a:blip>
+          <a:stretch>
+            <a:fillRect/>
+          </a:stretch>
+        </p:blipFill>
+        <p:spPr>
+          <a:xfrm>
+            <a:off x="0" y="0"/>
+            <a:ext cx="12192000" cy="6858000"/>
+          </a:xfrm>
+          <a:prstGeom prst="rect">
+            <a:avLst/>
+          </a:prstGeom>
+        </p:spPr>
+      </p:pic>
+      <p:sp>
+        <p:nvSpPr>
+          <p:cNvPr id="11" name="Rectangle 10">
+            <a:extLst>
+              <a:ext uri="{FF2B5EF4-FFF2-40B4-BE49-F238E27FC236}">
+                <a16:creationId xmlns:a16="http://schemas.microsoft.com/office/drawing/2014/main" id="{A3EC14A0-83DB-4F99-AC40-451E8964EF3F}"/>
+              </a:ext>
+            </a:extLst>
+          </p:cNvPr>
+          <p:cNvSpPr/>
+          <p:nvPr/>
+        </p:nvSpPr>
+        <p:spPr>
+          <a:xfrm>
+            <a:off x="2563651" y="3009150"/>
+            <a:ext cx="1154542" cy="700586"/>
+          </a:xfrm>
+          <a:prstGeom prst="rect">
+            <a:avLst/>
+          </a:prstGeom>
+        </p:spPr>
+        <p:style>
+          <a:lnRef idx="2">
+            <a:schemeClr val="accent1">
+              <a:shade val="50000"/>
+            </a:schemeClr>
+          </a:lnRef>
+          <a:fillRef idx="1">
+            <a:schemeClr val="accent1"/>
+          </a:fillRef>
+          <a:effectRef idx="0">
+            <a:schemeClr val="accent1"/>
+          </a:effectRef>
+          <a:fontRef idx="minor">
+            <a:schemeClr val="lt1"/>
+          </a:fontRef>
+        </p:style>
+        <p:txBody>
+          <a:bodyPr rtlCol="0" anchor="ctr"/>
+          <a:lstStyle/>
+          <a:p>
+            <a:pPr algn="ctr"/>
+            <a:r>
+              <a:rPr lang="en-US" sz="1200" dirty="0"/>
+              <a:t>AWS Deployment</a:t>
+            </a:r>
+            <a:endParaRPr lang="en-SG" sz="1200" dirty="0"/>
+          </a:p>
+        </p:txBody>
+      </p:sp>
+      <p:sp>
+        <p:nvSpPr>
+          <p:cNvPr id="15" name="Rectangle 14">
+            <a:extLst>
+              <a:ext uri="{FF2B5EF4-FFF2-40B4-BE49-F238E27FC236}">
+                <a16:creationId xmlns:a16="http://schemas.microsoft.com/office/drawing/2014/main" id="{895423C6-9E88-42B2-8EDD-53EBCF942A6D}"/>
+              </a:ext>
+            </a:extLst>
+          </p:cNvPr>
+          <p:cNvSpPr/>
+          <p:nvPr/>
+        </p:nvSpPr>
+        <p:spPr>
+          <a:xfrm>
+            <a:off x="7701964" y="3009150"/>
+            <a:ext cx="1154542" cy="700586"/>
+          </a:xfrm>
+          <a:prstGeom prst="rect">
+            <a:avLst/>
+          </a:prstGeom>
+        </p:spPr>
+        <p:style>
+          <a:lnRef idx="2">
+            <a:schemeClr val="accent1">
+              <a:shade val="50000"/>
+            </a:schemeClr>
+          </a:lnRef>
+          <a:fillRef idx="1">
+            <a:schemeClr val="accent1"/>
+          </a:fillRef>
+          <a:effectRef idx="0">
+            <a:schemeClr val="accent1"/>
+          </a:effectRef>
+          <a:fontRef idx="minor">
+            <a:schemeClr val="lt1"/>
+          </a:fontRef>
+        </p:style>
+        <p:txBody>
+          <a:bodyPr rtlCol="0" anchor="ctr"/>
+          <a:lstStyle/>
+          <a:p>
+            <a:pPr algn="ctr"/>
+            <a:r>
+              <a:rPr lang="en-US" sz="1200" dirty="0"/>
+              <a:t>JSON Web Service</a:t>
+            </a:r>
+            <a:endParaRPr lang="en-SG" sz="1200" dirty="0"/>
+          </a:p>
+        </p:txBody>
+      </p:sp>
+      <p:sp>
+        <p:nvSpPr>
+          <p:cNvPr id="16" name="Rectangle 15">
+            <a:extLst>
+              <a:ext uri="{FF2B5EF4-FFF2-40B4-BE49-F238E27FC236}">
+                <a16:creationId xmlns:a16="http://schemas.microsoft.com/office/drawing/2014/main" id="{5FD94160-9A52-4605-A745-EF0F5B0299DD}"/>
+              </a:ext>
+            </a:extLst>
+          </p:cNvPr>
+          <p:cNvSpPr/>
+          <p:nvPr/>
+        </p:nvSpPr>
+        <p:spPr>
+          <a:xfrm>
+            <a:off x="9363935" y="3009150"/>
+            <a:ext cx="1154542" cy="700586"/>
+          </a:xfrm>
+          <a:prstGeom prst="rect">
+            <a:avLst/>
+          </a:prstGeom>
+        </p:spPr>
+        <p:style>
+          <a:lnRef idx="2">
+            <a:schemeClr val="accent1">
+              <a:shade val="50000"/>
+            </a:schemeClr>
+          </a:lnRef>
+          <a:fillRef idx="1">
+            <a:schemeClr val="accent1"/>
+          </a:fillRef>
+          <a:effectRef idx="0">
+            <a:schemeClr val="accent1"/>
+          </a:effectRef>
+          <a:fontRef idx="minor">
+            <a:schemeClr val="lt1"/>
+          </a:fontRef>
+        </p:style>
+        <p:txBody>
+          <a:bodyPr rtlCol="0" anchor="ctr"/>
+          <a:lstStyle/>
+          <a:p>
+            <a:pPr algn="ctr"/>
+            <a:r>
+              <a:rPr lang="en-US" sz="1200" dirty="0"/>
+              <a:t>Update Bid</a:t>
+            </a:r>
+            <a:endParaRPr lang="en-SG" sz="1200" dirty="0"/>
+          </a:p>
+        </p:txBody>
+      </p:sp>
+      <p:sp>
+        <p:nvSpPr>
+          <p:cNvPr id="17" name="Rectangle 16">
+            <a:extLst>
+              <a:ext uri="{FF2B5EF4-FFF2-40B4-BE49-F238E27FC236}">
+                <a16:creationId xmlns:a16="http://schemas.microsoft.com/office/drawing/2014/main" id="{8C82C072-8C08-4CBC-9397-E9E692A5CB99}"/>
+              </a:ext>
+            </a:extLst>
+          </p:cNvPr>
+          <p:cNvSpPr/>
+          <p:nvPr/>
+        </p:nvSpPr>
+        <p:spPr>
+          <a:xfrm>
+            <a:off x="9363935" y="4631049"/>
+            <a:ext cx="1154542" cy="700586"/>
+          </a:xfrm>
+          <a:prstGeom prst="rect">
+            <a:avLst/>
+          </a:prstGeom>
+        </p:spPr>
+        <p:style>
+          <a:lnRef idx="2">
+            <a:schemeClr val="accent1">
+              <a:shade val="50000"/>
+            </a:schemeClr>
+          </a:lnRef>
+          <a:fillRef idx="1">
+            <a:schemeClr val="accent1"/>
+          </a:fillRef>
+          <a:effectRef idx="0">
+            <a:schemeClr val="accent1"/>
+          </a:effectRef>
+          <a:fontRef idx="minor">
+            <a:schemeClr val="lt1"/>
+          </a:fontRef>
+        </p:style>
+        <p:txBody>
+          <a:bodyPr rtlCol="0" anchor="ctr"/>
+          <a:lstStyle/>
+          <a:p>
+            <a:pPr algn="ctr"/>
+            <a:r>
+              <a:rPr lang="en-US" sz="1200" dirty="0"/>
+              <a:t>Iteration</a:t>
+            </a:r>
+          </a:p>
+          <a:p>
+            <a:pPr algn="ctr"/>
+            <a:r>
+              <a:rPr lang="en-US" sz="1200" dirty="0"/>
+              <a:t>Integration</a:t>
+            </a:r>
+            <a:endParaRPr lang="en-SG" sz="1200" dirty="0"/>
+          </a:p>
+        </p:txBody>
+      </p:sp>
+      <p:sp>
+        <p:nvSpPr>
+          <p:cNvPr id="19" name="Rectangle 18">
+            <a:extLst>
+              <a:ext uri="{FF2B5EF4-FFF2-40B4-BE49-F238E27FC236}">
+                <a16:creationId xmlns:a16="http://schemas.microsoft.com/office/drawing/2014/main" id="{62516FA8-1576-4108-9FB9-B4FEFC33886C}"/>
+              </a:ext>
+            </a:extLst>
+          </p:cNvPr>
+          <p:cNvSpPr/>
+          <p:nvPr/>
+        </p:nvSpPr>
+        <p:spPr>
+          <a:xfrm>
+            <a:off x="4318630" y="4573046"/>
+            <a:ext cx="1306942" cy="816592"/>
+          </a:xfrm>
+          <a:prstGeom prst="rect">
+            <a:avLst/>
+          </a:prstGeom>
+        </p:spPr>
+        <p:style>
+          <a:lnRef idx="2">
+            <a:schemeClr val="accent1">
+              <a:shade val="50000"/>
+            </a:schemeClr>
+          </a:lnRef>
+          <a:fillRef idx="1">
+            <a:schemeClr val="accent1"/>
+          </a:fillRef>
+          <a:effectRef idx="0">
+            <a:schemeClr val="accent1"/>
+          </a:effectRef>
+          <a:fontRef idx="minor">
+            <a:schemeClr val="lt1"/>
+          </a:fontRef>
+        </p:style>
+        <p:txBody>
+          <a:bodyPr rtlCol="0" anchor="ctr"/>
+          <a:lstStyle/>
+          <a:p>
+            <a:pPr algn="ctr"/>
+            <a:r>
+              <a:rPr lang="en-US" sz="1200" dirty="0"/>
+              <a:t>Online Review</a:t>
+            </a:r>
+          </a:p>
+          <a:p>
+            <a:pPr algn="ctr"/>
+            <a:r>
+              <a:rPr lang="en-US" sz="1200" dirty="0"/>
+              <a:t>Preparation</a:t>
+            </a:r>
+          </a:p>
+          <a:p>
+            <a:pPr algn="ctr"/>
+            <a:r>
+              <a:rPr lang="en-US" sz="1200" dirty="0"/>
+              <a:t>(Milestone)</a:t>
+            </a:r>
+          </a:p>
+        </p:txBody>
+      </p:sp>
+      <p:cxnSp>
+        <p:nvCxnSpPr>
+          <p:cNvPr id="6" name="Straight Arrow Connector 5">
+            <a:extLst>
+              <a:ext uri="{FF2B5EF4-FFF2-40B4-BE49-F238E27FC236}">
+                <a16:creationId xmlns:a16="http://schemas.microsoft.com/office/drawing/2014/main" id="{1246AB82-BCFF-4C36-926B-AE644EE37CE8}"/>
+              </a:ext>
+            </a:extLst>
+          </p:cNvPr>
+          <p:cNvCxnSpPr>
+            <a:cxnSpLocks/>
+            <a:endCxn id="11" idx="1"/>
+          </p:cNvCxnSpPr>
+          <p:nvPr/>
+        </p:nvCxnSpPr>
+        <p:spPr>
+          <a:xfrm>
+            <a:off x="2056222" y="3359443"/>
+            <a:ext cx="507429" cy="0"/>
+          </a:xfrm>
+          <a:prstGeom prst="straightConnector1">
+            <a:avLst/>
+          </a:prstGeom>
+          <a:ln w="19050">
+            <a:tailEnd type="triangle"/>
+          </a:ln>
+        </p:spPr>
+        <p:style>
+          <a:lnRef idx="1">
+            <a:schemeClr val="accent1"/>
+          </a:lnRef>
+          <a:fillRef idx="0">
+            <a:schemeClr val="accent1"/>
+          </a:fillRef>
+          <a:effectRef idx="0">
+            <a:schemeClr val="accent1"/>
+          </a:effectRef>
+          <a:fontRef idx="minor">
+            <a:schemeClr val="tx1"/>
+          </a:fontRef>
+        </p:style>
+      </p:cxnSp>
+      <p:cxnSp>
+        <p:nvCxnSpPr>
+          <p:cNvPr id="25" name="Straight Arrow Connector 24">
+            <a:extLst>
+              <a:ext uri="{FF2B5EF4-FFF2-40B4-BE49-F238E27FC236}">
+                <a16:creationId xmlns:a16="http://schemas.microsoft.com/office/drawing/2014/main" id="{39A8F959-2494-4316-976E-CEBE440D0BEE}"/>
+              </a:ext>
+            </a:extLst>
+          </p:cNvPr>
+          <p:cNvCxnSpPr>
+            <a:cxnSpLocks/>
+            <a:stCxn id="11" idx="3"/>
+          </p:cNvCxnSpPr>
+          <p:nvPr/>
+        </p:nvCxnSpPr>
+        <p:spPr>
+          <a:xfrm>
+            <a:off x="3718193" y="3359443"/>
+            <a:ext cx="507429" cy="0"/>
+          </a:xfrm>
+          <a:prstGeom prst="straightConnector1">
+            <a:avLst/>
+          </a:prstGeom>
+          <a:ln w="19050">
+            <a:tailEnd type="triangle"/>
+          </a:ln>
+        </p:spPr>
+        <p:style>
+          <a:lnRef idx="1">
+            <a:schemeClr val="accent1"/>
+          </a:lnRef>
+          <a:fillRef idx="0">
+            <a:schemeClr val="accent1"/>
+          </a:fillRef>
+          <a:effectRef idx="0">
+            <a:schemeClr val="accent1"/>
+          </a:effectRef>
+          <a:fontRef idx="minor">
+            <a:schemeClr val="tx1"/>
+          </a:fontRef>
+        </p:style>
+      </p:cxnSp>
+      <p:cxnSp>
+        <p:nvCxnSpPr>
+          <p:cNvPr id="31" name="Straight Arrow Connector 30">
+            <a:extLst>
+              <a:ext uri="{FF2B5EF4-FFF2-40B4-BE49-F238E27FC236}">
+                <a16:creationId xmlns:a16="http://schemas.microsoft.com/office/drawing/2014/main" id="{8D3F46D8-14DB-4377-807E-74727026AB92}"/>
+              </a:ext>
+            </a:extLst>
+          </p:cNvPr>
+          <p:cNvCxnSpPr>
+            <a:cxnSpLocks/>
+          </p:cNvCxnSpPr>
+          <p:nvPr/>
+        </p:nvCxnSpPr>
+        <p:spPr>
+          <a:xfrm>
+            <a:off x="5532564" y="3359443"/>
+            <a:ext cx="507429" cy="0"/>
+          </a:xfrm>
+          <a:prstGeom prst="straightConnector1">
+            <a:avLst/>
+          </a:prstGeom>
+          <a:ln w="19050">
+            <a:tailEnd type="triangle"/>
+          </a:ln>
+        </p:spPr>
+        <p:style>
+          <a:lnRef idx="1">
+            <a:schemeClr val="accent1"/>
+          </a:lnRef>
+          <a:fillRef idx="0">
+            <a:schemeClr val="accent1"/>
+          </a:fillRef>
+          <a:effectRef idx="0">
+            <a:schemeClr val="accent1"/>
+          </a:effectRef>
+          <a:fontRef idx="minor">
+            <a:schemeClr val="tx1"/>
+          </a:fontRef>
+        </p:style>
+      </p:cxnSp>
+      <p:cxnSp>
+        <p:nvCxnSpPr>
+          <p:cNvPr id="34" name="Straight Arrow Connector 33">
+            <a:extLst>
+              <a:ext uri="{FF2B5EF4-FFF2-40B4-BE49-F238E27FC236}">
+                <a16:creationId xmlns:a16="http://schemas.microsoft.com/office/drawing/2014/main" id="{3CE76AEF-E574-49D6-9D29-922BF0910BDB}"/>
+              </a:ext>
+            </a:extLst>
+          </p:cNvPr>
+          <p:cNvCxnSpPr>
+            <a:cxnSpLocks/>
+            <a:endCxn id="15" idx="1"/>
+          </p:cNvCxnSpPr>
+          <p:nvPr/>
+        </p:nvCxnSpPr>
+        <p:spPr>
+          <a:xfrm>
+            <a:off x="7194535" y="3359443"/>
+            <a:ext cx="507429" cy="0"/>
+          </a:xfrm>
+          <a:prstGeom prst="straightConnector1">
+            <a:avLst/>
+          </a:prstGeom>
+          <a:ln w="19050">
+            <a:tailEnd type="triangle"/>
+          </a:ln>
+        </p:spPr>
+        <p:style>
+          <a:lnRef idx="1">
+            <a:schemeClr val="accent1"/>
+          </a:lnRef>
+          <a:fillRef idx="0">
+            <a:schemeClr val="accent1"/>
+          </a:fillRef>
+          <a:effectRef idx="0">
+            <a:schemeClr val="accent1"/>
+          </a:effectRef>
+          <a:fontRef idx="minor">
+            <a:schemeClr val="tx1"/>
+          </a:fontRef>
+        </p:style>
+      </p:cxnSp>
+      <p:cxnSp>
+        <p:nvCxnSpPr>
+          <p:cNvPr id="38" name="Straight Arrow Connector 37">
+            <a:extLst>
+              <a:ext uri="{FF2B5EF4-FFF2-40B4-BE49-F238E27FC236}">
+                <a16:creationId xmlns:a16="http://schemas.microsoft.com/office/drawing/2014/main" id="{DF393A5D-6D4A-47C2-9451-282F1A8B66E7}"/>
+              </a:ext>
+            </a:extLst>
+          </p:cNvPr>
+          <p:cNvCxnSpPr>
+            <a:cxnSpLocks/>
+            <a:stCxn id="15" idx="3"/>
+            <a:endCxn id="16" idx="1"/>
+          </p:cNvCxnSpPr>
+          <p:nvPr/>
+        </p:nvCxnSpPr>
+        <p:spPr>
+          <a:xfrm>
+            <a:off x="8856506" y="3359443"/>
+            <a:ext cx="507429" cy="0"/>
+          </a:xfrm>
+          <a:prstGeom prst="straightConnector1">
+            <a:avLst/>
+          </a:prstGeom>
+          <a:ln w="19050">
+            <a:tailEnd type="triangle"/>
+          </a:ln>
+        </p:spPr>
+        <p:style>
+          <a:lnRef idx="1">
+            <a:schemeClr val="accent1"/>
+          </a:lnRef>
+          <a:fillRef idx="0">
+            <a:schemeClr val="accent1"/>
+          </a:fillRef>
+          <a:effectRef idx="0">
+            <a:schemeClr val="accent1"/>
+          </a:effectRef>
+          <a:fontRef idx="minor">
+            <a:schemeClr val="tx1"/>
+          </a:fontRef>
+        </p:style>
+      </p:cxnSp>
+      <p:cxnSp>
+        <p:nvCxnSpPr>
+          <p:cNvPr id="50" name="Straight Arrow Connector 49">
+            <a:extLst>
+              <a:ext uri="{FF2B5EF4-FFF2-40B4-BE49-F238E27FC236}">
+                <a16:creationId xmlns:a16="http://schemas.microsoft.com/office/drawing/2014/main" id="{C2E497CC-20BB-4B52-85AC-B20C76CFD3DE}"/>
+              </a:ext>
+            </a:extLst>
+          </p:cNvPr>
+          <p:cNvCxnSpPr>
+            <a:cxnSpLocks/>
+            <a:stCxn id="19" idx="1"/>
+          </p:cNvCxnSpPr>
+          <p:nvPr/>
+        </p:nvCxnSpPr>
+        <p:spPr>
+          <a:xfrm flipH="1">
+            <a:off x="3811201" y="4981342"/>
+            <a:ext cx="507429" cy="0"/>
+          </a:xfrm>
+          <a:prstGeom prst="straightConnector1">
+            <a:avLst/>
+          </a:prstGeom>
+          <a:ln w="19050">
+            <a:tailEnd type="triangle"/>
+          </a:ln>
+        </p:spPr>
+        <p:style>
+          <a:lnRef idx="1">
+            <a:schemeClr val="accent1"/>
+          </a:lnRef>
+          <a:fillRef idx="0">
+            <a:schemeClr val="accent1"/>
+          </a:fillRef>
+          <a:effectRef idx="0">
+            <a:schemeClr val="accent1"/>
+          </a:effectRef>
+          <a:fontRef idx="minor">
+            <a:schemeClr val="tx1"/>
+          </a:fontRef>
+        </p:style>
+      </p:cxnSp>
+      <p:cxnSp>
+        <p:nvCxnSpPr>
+          <p:cNvPr id="56" name="Straight Arrow Connector 55">
+            <a:extLst>
+              <a:ext uri="{FF2B5EF4-FFF2-40B4-BE49-F238E27FC236}">
+                <a16:creationId xmlns:a16="http://schemas.microsoft.com/office/drawing/2014/main" id="{AB4106EE-0B72-4B4D-8E6B-6C8BA4401B7F}"/>
+              </a:ext>
+            </a:extLst>
+          </p:cNvPr>
+          <p:cNvCxnSpPr>
+            <a:cxnSpLocks/>
+            <a:stCxn id="17" idx="1"/>
+            <a:endCxn id="42" idx="3"/>
+          </p:cNvCxnSpPr>
+          <p:nvPr/>
+        </p:nvCxnSpPr>
+        <p:spPr>
+          <a:xfrm flipH="1">
+            <a:off x="8904326" y="4981342"/>
+            <a:ext cx="459609" cy="0"/>
+          </a:xfrm>
+          <a:prstGeom prst="straightConnector1">
+            <a:avLst/>
+          </a:prstGeom>
+          <a:ln w="19050">
+            <a:tailEnd type="triangle"/>
+          </a:ln>
+        </p:spPr>
+        <p:style>
+          <a:lnRef idx="1">
+            <a:schemeClr val="accent1"/>
+          </a:lnRef>
+          <a:fillRef idx="0">
+            <a:schemeClr val="accent1"/>
+          </a:fillRef>
+          <a:effectRef idx="0">
+            <a:schemeClr val="accent1"/>
+          </a:effectRef>
+          <a:fontRef idx="minor">
+            <a:schemeClr val="tx1"/>
+          </a:fontRef>
+        </p:style>
+      </p:cxnSp>
+      <p:cxnSp>
+        <p:nvCxnSpPr>
+          <p:cNvPr id="59" name="Straight Arrow Connector 58">
+            <a:extLst>
+              <a:ext uri="{FF2B5EF4-FFF2-40B4-BE49-F238E27FC236}">
+                <a16:creationId xmlns:a16="http://schemas.microsoft.com/office/drawing/2014/main" id="{1492C44B-0084-4C63-A1FD-85938BDBE6FD}"/>
+              </a:ext>
+            </a:extLst>
+          </p:cNvPr>
+          <p:cNvCxnSpPr>
+            <a:cxnSpLocks/>
+            <a:stCxn id="16" idx="2"/>
+            <a:endCxn id="17" idx="0"/>
+          </p:cNvCxnSpPr>
+          <p:nvPr/>
+        </p:nvCxnSpPr>
+        <p:spPr>
+          <a:xfrm>
+            <a:off x="9941206" y="3709736"/>
+            <a:ext cx="0" cy="921313"/>
+          </a:xfrm>
+          <a:prstGeom prst="straightConnector1">
+            <a:avLst/>
+          </a:prstGeom>
+          <a:ln w="19050">
+            <a:tailEnd type="triangle"/>
+          </a:ln>
+        </p:spPr>
+        <p:style>
+          <a:lnRef idx="1">
+            <a:schemeClr val="accent1"/>
+          </a:lnRef>
+          <a:fillRef idx="0">
+            <a:schemeClr val="accent1"/>
+          </a:fillRef>
+          <a:effectRef idx="0">
+            <a:schemeClr val="accent1"/>
+          </a:effectRef>
+          <a:fontRef idx="minor">
+            <a:schemeClr val="tx1"/>
+          </a:fontRef>
+        </p:style>
+      </p:cxnSp>
+      <p:sp>
+        <p:nvSpPr>
+          <p:cNvPr id="65" name="Oval 64">
+            <a:extLst>
+              <a:ext uri="{FF2B5EF4-FFF2-40B4-BE49-F238E27FC236}">
+                <a16:creationId xmlns:a16="http://schemas.microsoft.com/office/drawing/2014/main" id="{8FEEFE47-4CDB-42CC-AE7B-62F1972A5A44}"/>
+              </a:ext>
+            </a:extLst>
+          </p:cNvPr>
+          <p:cNvSpPr/>
+          <p:nvPr/>
+        </p:nvSpPr>
+        <p:spPr>
+          <a:xfrm>
+            <a:off x="3436071" y="4826037"/>
+            <a:ext cx="371197" cy="348018"/>
+          </a:xfrm>
+          <a:prstGeom prst="ellipse">
+            <a:avLst/>
+          </a:prstGeom>
+          <a:ln w="28575">
+            <a:solidFill>
+              <a:schemeClr val="accent1"/>
+            </a:solidFill>
+          </a:ln>
+        </p:spPr>
+        <p:style>
+          <a:lnRef idx="2">
+            <a:schemeClr val="accent6"/>
+          </a:lnRef>
+          <a:fillRef idx="1">
+            <a:schemeClr val="lt1"/>
+          </a:fillRef>
+          <a:effectRef idx="0">
+            <a:schemeClr val="accent6"/>
+          </a:effectRef>
+          <a:fontRef idx="minor">
+            <a:schemeClr val="dk1"/>
+          </a:fontRef>
+        </p:style>
+        <p:txBody>
+          <a:bodyPr rtlCol="0" anchor="ctr"/>
+          <a:lstStyle/>
+          <a:p>
+            <a:pPr algn="ctr"/>
+            <a:endParaRPr lang="en-SG"/>
+          </a:p>
+        </p:txBody>
+      </p:sp>
+      <p:sp>
+        <p:nvSpPr>
+          <p:cNvPr id="66" name="Oval 65">
+            <a:extLst>
+              <a:ext uri="{FF2B5EF4-FFF2-40B4-BE49-F238E27FC236}">
+                <a16:creationId xmlns:a16="http://schemas.microsoft.com/office/drawing/2014/main" id="{B99E5AC4-A4AF-4165-938D-96C2AC26EFB9}"/>
+              </a:ext>
+            </a:extLst>
+          </p:cNvPr>
+          <p:cNvSpPr/>
+          <p:nvPr/>
+        </p:nvSpPr>
+        <p:spPr>
+          <a:xfrm>
+            <a:off x="1670820" y="3185434"/>
+            <a:ext cx="371197" cy="348018"/>
+          </a:xfrm>
+          <a:prstGeom prst="ellipse">
+            <a:avLst/>
+          </a:prstGeom>
+          <a:ln w="28575">
+            <a:solidFill>
+              <a:schemeClr val="accent1"/>
+            </a:solidFill>
+          </a:ln>
+        </p:spPr>
+        <p:style>
+          <a:lnRef idx="2">
+            <a:schemeClr val="accent6"/>
+          </a:lnRef>
+          <a:fillRef idx="1">
+            <a:schemeClr val="lt1"/>
+          </a:fillRef>
+          <a:effectRef idx="0">
+            <a:schemeClr val="accent6"/>
+          </a:effectRef>
+          <a:fontRef idx="minor">
+            <a:schemeClr val="dk1"/>
+          </a:fontRef>
+        </p:style>
+        <p:txBody>
+          <a:bodyPr rtlCol="0" anchor="ctr"/>
+          <a:lstStyle/>
+          <a:p>
+            <a:pPr algn="ctr"/>
+            <a:endParaRPr lang="en-SG"/>
+          </a:p>
+        </p:txBody>
+      </p:sp>
+      <p:sp>
+        <p:nvSpPr>
+          <p:cNvPr id="71" name="TextBox 70">
+            <a:extLst>
+              <a:ext uri="{FF2B5EF4-FFF2-40B4-BE49-F238E27FC236}">
+                <a16:creationId xmlns:a16="http://schemas.microsoft.com/office/drawing/2014/main" id="{476EB3F2-03ED-4341-851A-CE3F7170A194}"/>
+              </a:ext>
+            </a:extLst>
+          </p:cNvPr>
+          <p:cNvSpPr txBox="1"/>
+          <p:nvPr/>
+        </p:nvSpPr>
+        <p:spPr>
+          <a:xfrm>
+            <a:off x="1615134" y="2922765"/>
+            <a:ext cx="482568" cy="276999"/>
+          </a:xfrm>
+          <a:prstGeom prst="rect">
+            <a:avLst/>
+          </a:prstGeom>
+          <a:noFill/>
+        </p:spPr>
+        <p:txBody>
+          <a:bodyPr wrap="none" rtlCol="0">
+            <a:spAutoFit/>
+          </a:bodyPr>
+          <a:lstStyle/>
+          <a:p>
+            <a:r>
+              <a:rPr lang="en-US" sz="1200" dirty="0"/>
+              <a:t>Start</a:t>
+            </a:r>
+            <a:endParaRPr lang="en-SG" sz="1200" dirty="0"/>
+          </a:p>
+        </p:txBody>
+      </p:sp>
+      <p:sp>
+        <p:nvSpPr>
+          <p:cNvPr id="73" name="TextBox 72">
+            <a:extLst>
+              <a:ext uri="{FF2B5EF4-FFF2-40B4-BE49-F238E27FC236}">
+                <a16:creationId xmlns:a16="http://schemas.microsoft.com/office/drawing/2014/main" id="{516678A9-7BC2-44CB-B5F9-7DC5FF2BF874}"/>
+              </a:ext>
+            </a:extLst>
+          </p:cNvPr>
+          <p:cNvSpPr txBox="1"/>
+          <p:nvPr/>
+        </p:nvSpPr>
+        <p:spPr>
+          <a:xfrm>
+            <a:off x="3420885" y="5146759"/>
+            <a:ext cx="420308" cy="276999"/>
+          </a:xfrm>
+          <a:prstGeom prst="rect">
+            <a:avLst/>
+          </a:prstGeom>
+          <a:noFill/>
+        </p:spPr>
+        <p:txBody>
+          <a:bodyPr wrap="none" rtlCol="0">
+            <a:spAutoFit/>
+          </a:bodyPr>
+          <a:lstStyle/>
+          <a:p>
+            <a:r>
+              <a:rPr lang="en-US" sz="1200" dirty="0"/>
+              <a:t>End</a:t>
+            </a:r>
+            <a:endParaRPr lang="en-SG" sz="1200" dirty="0"/>
+          </a:p>
+        </p:txBody>
+      </p:sp>
+      <p:sp>
+        <p:nvSpPr>
+          <p:cNvPr id="36" name="Rectangle 35">
+            <a:extLst>
+              <a:ext uri="{FF2B5EF4-FFF2-40B4-BE49-F238E27FC236}">
+                <a16:creationId xmlns:a16="http://schemas.microsoft.com/office/drawing/2014/main" id="{442E7CDC-A2D6-4A9E-95BB-84EBE1A16CC2}"/>
+              </a:ext>
+            </a:extLst>
+          </p:cNvPr>
+          <p:cNvSpPr/>
+          <p:nvPr/>
+        </p:nvSpPr>
+        <p:spPr>
+          <a:xfrm>
+            <a:off x="4225622" y="2951147"/>
+            <a:ext cx="1306942" cy="816592"/>
+          </a:xfrm>
+          <a:prstGeom prst="rect">
+            <a:avLst/>
+          </a:prstGeom>
+        </p:spPr>
+        <p:style>
+          <a:lnRef idx="2">
+            <a:schemeClr val="accent1">
+              <a:shade val="50000"/>
+            </a:schemeClr>
+          </a:lnRef>
+          <a:fillRef idx="1">
+            <a:schemeClr val="accent1"/>
+          </a:fillRef>
+          <a:effectRef idx="0">
+            <a:schemeClr val="accent1"/>
+          </a:effectRef>
+          <a:fontRef idx="minor">
+            <a:schemeClr val="lt1"/>
+          </a:fontRef>
+        </p:style>
+        <p:txBody>
+          <a:bodyPr rtlCol="0" anchor="ctr"/>
+          <a:lstStyle/>
+          <a:p>
+            <a:pPr algn="ctr"/>
+            <a:r>
+              <a:rPr lang="en-US" sz="1200" dirty="0"/>
+              <a:t>Validations (</a:t>
+            </a:r>
+            <a:r>
+              <a:rPr lang="en-US" sz="1200" dirty="0" err="1"/>
+              <a:t>addBid</a:t>
+            </a:r>
+            <a:r>
+              <a:rPr lang="en-US" sz="1200" dirty="0"/>
+              <a:t>, Bootstrap)</a:t>
+            </a:r>
+            <a:endParaRPr lang="en-SG" sz="1200" dirty="0"/>
+          </a:p>
+        </p:txBody>
+      </p:sp>
+      <p:sp>
+        <p:nvSpPr>
+          <p:cNvPr id="39" name="Rectangle 38">
+            <a:extLst>
+              <a:ext uri="{FF2B5EF4-FFF2-40B4-BE49-F238E27FC236}">
+                <a16:creationId xmlns:a16="http://schemas.microsoft.com/office/drawing/2014/main" id="{01473D17-C7FE-4685-BD9B-678EC74BA77C}"/>
+              </a:ext>
+            </a:extLst>
+          </p:cNvPr>
+          <p:cNvSpPr/>
+          <p:nvPr/>
+        </p:nvSpPr>
+        <p:spPr>
+          <a:xfrm>
+            <a:off x="6039993" y="3009149"/>
+            <a:ext cx="1154542" cy="700586"/>
+          </a:xfrm>
+          <a:prstGeom prst="rect">
+            <a:avLst/>
+          </a:prstGeom>
+        </p:spPr>
+        <p:style>
+          <a:lnRef idx="2">
+            <a:schemeClr val="accent1">
+              <a:shade val="50000"/>
+            </a:schemeClr>
+          </a:lnRef>
+          <a:fillRef idx="1">
+            <a:schemeClr val="accent1"/>
+          </a:fillRef>
+          <a:effectRef idx="0">
+            <a:schemeClr val="accent1"/>
+          </a:effectRef>
+          <a:fontRef idx="minor">
+            <a:schemeClr val="lt1"/>
+          </a:fontRef>
+        </p:style>
+        <p:txBody>
+          <a:bodyPr rtlCol="0" anchor="ctr"/>
+          <a:lstStyle/>
+          <a:p>
+            <a:pPr algn="ctr"/>
+            <a:r>
+              <a:rPr lang="en-US" sz="1200" dirty="0"/>
+              <a:t>Drop Bid</a:t>
+            </a:r>
+            <a:endParaRPr lang="en-SG" sz="1200" dirty="0"/>
+          </a:p>
+        </p:txBody>
+      </p:sp>
+      <p:sp>
+        <p:nvSpPr>
+          <p:cNvPr id="42" name="Rectangle 41">
+            <a:extLst>
+              <a:ext uri="{FF2B5EF4-FFF2-40B4-BE49-F238E27FC236}">
+                <a16:creationId xmlns:a16="http://schemas.microsoft.com/office/drawing/2014/main" id="{0413551F-38EF-41D8-B990-119C00FF344A}"/>
+              </a:ext>
+            </a:extLst>
+          </p:cNvPr>
+          <p:cNvSpPr/>
+          <p:nvPr/>
+        </p:nvSpPr>
+        <p:spPr>
+          <a:xfrm>
+            <a:off x="7749784" y="4631049"/>
+            <a:ext cx="1154542" cy="700586"/>
+          </a:xfrm>
+          <a:prstGeom prst="rect">
+            <a:avLst/>
+          </a:prstGeom>
+        </p:spPr>
+        <p:style>
+          <a:lnRef idx="2">
+            <a:schemeClr val="accent1">
+              <a:shade val="50000"/>
+            </a:schemeClr>
+          </a:lnRef>
+          <a:fillRef idx="1">
+            <a:schemeClr val="accent1"/>
+          </a:fillRef>
+          <a:effectRef idx="0">
+            <a:schemeClr val="accent1"/>
+          </a:effectRef>
+          <a:fontRef idx="minor">
+            <a:schemeClr val="lt1"/>
+          </a:fontRef>
+        </p:style>
+        <p:txBody>
+          <a:bodyPr rtlCol="0" anchor="ctr"/>
+          <a:lstStyle/>
+          <a:p>
+            <a:pPr algn="ctr"/>
+            <a:r>
+              <a:rPr lang="en-US" sz="1200" dirty="0"/>
+              <a:t>Iteration Testing</a:t>
+            </a:r>
+            <a:endParaRPr lang="en-SG" sz="1200" dirty="0"/>
+          </a:p>
+        </p:txBody>
+      </p:sp>
+      <p:cxnSp>
+        <p:nvCxnSpPr>
+          <p:cNvPr id="43" name="Straight Arrow Connector 42">
+            <a:extLst>
+              <a:ext uri="{FF2B5EF4-FFF2-40B4-BE49-F238E27FC236}">
+                <a16:creationId xmlns:a16="http://schemas.microsoft.com/office/drawing/2014/main" id="{12B43C27-464F-4EBA-989F-C945DB2CEEF4}"/>
+              </a:ext>
+            </a:extLst>
+          </p:cNvPr>
+          <p:cNvCxnSpPr>
+            <a:cxnSpLocks/>
+            <a:endCxn id="19" idx="3"/>
+          </p:cNvCxnSpPr>
+          <p:nvPr/>
+        </p:nvCxnSpPr>
+        <p:spPr>
+          <a:xfrm flipH="1">
+            <a:off x="5625572" y="4981342"/>
+            <a:ext cx="507429" cy="0"/>
+          </a:xfrm>
+          <a:prstGeom prst="straightConnector1">
+            <a:avLst/>
+          </a:prstGeom>
+          <a:ln w="19050">
+            <a:tailEnd type="triangle"/>
+          </a:ln>
+        </p:spPr>
+        <p:style>
+          <a:lnRef idx="1">
+            <a:schemeClr val="accent1"/>
+          </a:lnRef>
+          <a:fillRef idx="0">
+            <a:schemeClr val="accent1"/>
+          </a:fillRef>
+          <a:effectRef idx="0">
+            <a:schemeClr val="accent1"/>
+          </a:effectRef>
+          <a:fontRef idx="minor">
+            <a:schemeClr val="tx1"/>
+          </a:fontRef>
+        </p:style>
+      </p:cxnSp>
+      <p:sp>
+        <p:nvSpPr>
+          <p:cNvPr id="46" name="Rectangle 45">
+            <a:extLst>
+              <a:ext uri="{FF2B5EF4-FFF2-40B4-BE49-F238E27FC236}">
+                <a16:creationId xmlns:a16="http://schemas.microsoft.com/office/drawing/2014/main" id="{75857AA1-DE87-4703-B801-3ED7F08F4D1E}"/>
+              </a:ext>
+            </a:extLst>
+          </p:cNvPr>
+          <p:cNvSpPr/>
+          <p:nvPr/>
+        </p:nvSpPr>
+        <p:spPr>
+          <a:xfrm>
+            <a:off x="6133001" y="4631049"/>
+            <a:ext cx="1154542" cy="700586"/>
+          </a:xfrm>
+          <a:prstGeom prst="rect">
+            <a:avLst/>
+          </a:prstGeom>
+        </p:spPr>
+        <p:style>
+          <a:lnRef idx="2">
+            <a:schemeClr val="accent1">
+              <a:shade val="50000"/>
+            </a:schemeClr>
+          </a:lnRef>
+          <a:fillRef idx="1">
+            <a:schemeClr val="accent1"/>
+          </a:fillRef>
+          <a:effectRef idx="0">
+            <a:schemeClr val="accent1"/>
+          </a:effectRef>
+          <a:fontRef idx="minor">
+            <a:schemeClr val="lt1"/>
+          </a:fontRef>
+        </p:style>
+        <p:txBody>
+          <a:bodyPr rtlCol="0" anchor="ctr"/>
+          <a:lstStyle/>
+          <a:p>
+            <a:pPr algn="ctr"/>
+            <a:r>
+              <a:rPr lang="en-US" sz="1200" dirty="0"/>
+              <a:t>Iteration Deployment</a:t>
+            </a:r>
+            <a:endParaRPr lang="en-SG" sz="1200" dirty="0"/>
+          </a:p>
+        </p:txBody>
+      </p:sp>
+      <p:cxnSp>
+        <p:nvCxnSpPr>
+          <p:cNvPr id="48" name="Straight Arrow Connector 47">
+            <a:extLst>
+              <a:ext uri="{FF2B5EF4-FFF2-40B4-BE49-F238E27FC236}">
+                <a16:creationId xmlns:a16="http://schemas.microsoft.com/office/drawing/2014/main" id="{E09B14BD-809F-4171-95F8-228E8A5CA15B}"/>
+              </a:ext>
+            </a:extLst>
+          </p:cNvPr>
+          <p:cNvCxnSpPr>
+            <a:cxnSpLocks/>
+          </p:cNvCxnSpPr>
+          <p:nvPr/>
+        </p:nvCxnSpPr>
+        <p:spPr>
+          <a:xfrm flipH="1">
+            <a:off x="7290175" y="4981342"/>
+            <a:ext cx="459609" cy="0"/>
+          </a:xfrm>
+          <a:prstGeom prst="straightConnector1">
+            <a:avLst/>
+          </a:prstGeom>
+          <a:ln w="19050">
+            <a:tailEnd type="triangle"/>
+          </a:ln>
+        </p:spPr>
+        <p:style>
+          <a:lnRef idx="1">
+            <a:schemeClr val="accent1"/>
+          </a:lnRef>
+          <a:fillRef idx="0">
+            <a:schemeClr val="accent1"/>
+          </a:fillRef>
+          <a:effectRef idx="0">
+            <a:schemeClr val="accent1"/>
+          </a:effectRef>
+          <a:fontRef idx="minor">
+            <a:schemeClr val="tx1"/>
+          </a:fontRef>
+        </p:style>
+      </p:cxnSp>
+      <p:sp>
+        <p:nvSpPr>
+          <p:cNvPr id="51" name="Title 1">
+            <a:extLst>
+              <a:ext uri="{FF2B5EF4-FFF2-40B4-BE49-F238E27FC236}">
+                <a16:creationId xmlns:a16="http://schemas.microsoft.com/office/drawing/2014/main" id="{1F5B3F94-22E8-4D5B-B177-67A3D0E802D9}"/>
+              </a:ext>
+            </a:extLst>
+          </p:cNvPr>
+          <p:cNvSpPr txBox="1">
+            <a:spLocks/>
+          </p:cNvSpPr>
+          <p:nvPr/>
+        </p:nvSpPr>
+        <p:spPr>
+          <a:xfrm>
+            <a:off x="1179074" y="975815"/>
+            <a:ext cx="9833548" cy="1325563"/>
+          </a:xfrm>
+          <a:prstGeom prst="rect">
+            <a:avLst/>
+          </a:prstGeom>
+        </p:spPr>
+        <p:txBody>
+          <a:bodyPr vert="horz" lIns="91440" tIns="45720" rIns="91440" bIns="45720" rtlCol="0" anchor="ctr">
+            <a:normAutofit/>
+          </a:bodyPr>
+          <a:lstStyle>
+            <a:lvl1pPr algn="l" defTabSz="914400" rtl="0" eaLnBrk="1" latinLnBrk="0" hangingPunct="1">
+              <a:lnSpc>
+                <a:spcPct val="90000"/>
+              </a:lnSpc>
+              <a:spcBef>
+                <a:spcPct val="0"/>
+              </a:spcBef>
+              <a:buNone/>
+              <a:defRPr sz="4400" kern="1200">
+                <a:solidFill>
+                  <a:schemeClr val="tx1"/>
+                </a:solidFill>
+                <a:latin typeface="+mj-lt"/>
+                <a:ea typeface="+mj-ea"/>
+                <a:cs typeface="+mj-cs"/>
+              </a:defRPr>
+            </a:lvl1pPr>
+          </a:lstStyle>
+          <a:p>
+            <a:pPr algn="ctr"/>
+            <a:r>
+              <a:rPr lang="en-US" sz="4000" b="1" dirty="0">
+                <a:solidFill>
+                  <a:srgbClr val="FFFFFF"/>
+                </a:solidFill>
+                <a:latin typeface="Gloss And Bloom" pitchFamily="2" charset="0"/>
+              </a:rPr>
+              <a:t>Critical Path (Iteration 2)</a:t>
+            </a:r>
+            <a:endParaRPr lang="en-SG" sz="4000" b="1" dirty="0">
+              <a:solidFill>
+                <a:srgbClr val="FFFFFF"/>
+              </a:solidFill>
+              <a:latin typeface="Gloss And Bloom" pitchFamily="2" charset="0"/>
+            </a:endParaRPr>
+          </a:p>
+        </p:txBody>
+      </p:sp>
+    </p:spTree>
+    <p:extLst>
+      <p:ext uri="{BB962C8B-B14F-4D97-AF65-F5344CB8AC3E}">
+        <p14:creationId xmlns:p14="http://schemas.microsoft.com/office/powerpoint/2010/main" val="3765329551"/>
+      </p:ext>
+    </p:extLst>
+  </p:cSld>
+  <p:clrMapOvr>
+    <a:masterClrMapping/>
+  </p:clrMapOvr>
+</p:sld>
+</file>
+
+<file path=ppt/slides/slide11.xml><?xml version="1.0" encoding="utf-8"?>
+<p:sld xmlns:a="http://schemas.openxmlformats.org/drawingml/2006/main" xmlns:r="http://schemas.openxmlformats.org/officeDocument/2006/relationships" xmlns:p="http://schemas.openxmlformats.org/presentationml/2006/main">
+  <p:cSld>
+    <p:bg>
+      <p:bgPr>
+        <a:solidFill>
+          <a:schemeClr val="bg1"/>
+        </a:solidFill>
+        <a:effectLst/>
+      </p:bgPr>
+    </p:bg>
+    <p:spTree>
+      <p:nvGrpSpPr>
+        <p:cNvPr id="1" name=""/>
+        <p:cNvGrpSpPr/>
+        <p:nvPr/>
+      </p:nvGrpSpPr>
+      <p:grpSpPr>
+        <a:xfrm>
+          <a:off x="0" y="0"/>
+          <a:ext cx="0" cy="0"/>
+          <a:chOff x="0" y="0"/>
+          <a:chExt cx="0" cy="0"/>
+        </a:xfrm>
+      </p:grpSpPr>
+      <p:sp>
+        <p:nvSpPr>
+          <p:cNvPr id="8" name="Rectangle 7">
+            <a:extLst>
+              <a:ext uri="{FF2B5EF4-FFF2-40B4-BE49-F238E27FC236}">
+                <a16:creationId xmlns:a16="http://schemas.microsoft.com/office/drawing/2014/main" id="{4351DFE5-F63D-4BE0-BDA9-E3EB88F01AA5}"/>
+              </a:ext>
+              <a:ext uri="{C183D7F6-B498-43B3-948B-1728B52AA6E4}">
+                <adec:decorative xmlns:adec="http://schemas.microsoft.com/office/drawing/2017/decorative" val="1"/>
+              </a:ext>
+            </a:extLst>
+          </p:cNvPr>
+          <p:cNvSpPr>
+            <a:spLocks noGrp="1" noRot="1" noChangeAspect="1" noMove="1" noResize="1" noEditPoints="1" noAdjustHandles="1" noChangeArrowheads="1" noChangeShapeType="1" noTextEdit="1"/>
+          </p:cNvSpPr>
+          <p:nvPr>
+            <p:extLst>
+              <p:ext uri="{386F3935-93C4-4BCD-93E2-E3B085C9AB24}">
+                <p16:designElem xmlns:p16="http://schemas.microsoft.com/office/powerpoint/2015/main" val="1"/>
+              </p:ext>
+            </p:extLst>
+          </p:nvPr>
+        </p:nvSpPr>
+        <p:spPr>
+          <a:xfrm>
+            <a:off x="355601" y="0"/>
+            <a:ext cx="11480494" cy="2753936"/>
+          </a:xfrm>
+          <a:prstGeom prst="rect">
+            <a:avLst/>
+          </a:prstGeom>
+          <a:gradFill>
+            <a:gsLst>
+              <a:gs pos="0">
+                <a:schemeClr val="accent1">
+                  <a:lumMod val="90000"/>
+                </a:schemeClr>
+              </a:gs>
+              <a:gs pos="25000">
+                <a:schemeClr val="accent1">
+                  <a:lumMod val="90000"/>
+                </a:schemeClr>
+              </a:gs>
+              <a:gs pos="94000">
+                <a:schemeClr val="bg2">
+                  <a:lumMod val="25000"/>
+                </a:schemeClr>
+              </a:gs>
+              <a:gs pos="100000">
+                <a:schemeClr val="bg2">
+                  <a:lumMod val="25000"/>
+                </a:schemeClr>
+              </a:gs>
+            </a:gsLst>
+            <a:lin ang="4200000" scaled="0"/>
+          </a:gradFill>
+          <a:ln>
+            <a:noFill/>
+          </a:ln>
+        </p:spPr>
+        <p:style>
+          <a:lnRef idx="2">
+            <a:schemeClr val="accent1">
+              <a:shade val="50000"/>
+            </a:schemeClr>
+          </a:lnRef>
+          <a:fillRef idx="1">
+            <a:schemeClr val="accent1"/>
+          </a:fillRef>
+          <a:effectRef idx="0">
+            <a:schemeClr val="accent1"/>
+          </a:effectRef>
+          <a:fontRef idx="minor">
+            <a:schemeClr val="lt1"/>
+          </a:fontRef>
+        </p:style>
+        <p:txBody>
+          <a:bodyPr rtlCol="0" anchor="ctr"/>
+          <a:lstStyle/>
+          <a:p>
+            <a:pPr algn="ctr"/>
+            <a:endParaRPr lang="en-US"/>
+          </a:p>
+        </p:txBody>
+      </p:sp>
+      <p:pic>
+        <p:nvPicPr>
+          <p:cNvPr id="10" name="Picture 9">
+            <a:extLst>
+              <a:ext uri="{FF2B5EF4-FFF2-40B4-BE49-F238E27FC236}">
+                <a16:creationId xmlns:a16="http://schemas.microsoft.com/office/drawing/2014/main" id="{3AA16612-ACD2-4A16-8F2B-4514FD6BF28F}"/>
+              </a:ext>
+              <a:ext uri="{C183D7F6-B498-43B3-948B-1728B52AA6E4}">
+                <adec:decorative xmlns:adec="http://schemas.microsoft.com/office/drawing/2017/decorative" val="1"/>
+              </a:ext>
+            </a:extLst>
+          </p:cNvPr>
+          <p:cNvPicPr>
+            <a:picLocks noGrp="1" noRot="1" noChangeAspect="1" noMove="1" noResize="1" noEditPoints="1" noAdjustHandles="1" noChangeArrowheads="1" noChangeShapeType="1" noCrop="1"/>
+          </p:cNvPicPr>
+          <p:nvPr>
+            <p:extLst>
+              <p:ext uri="{386F3935-93C4-4BCD-93E2-E3B085C9AB24}">
+                <p16:designElem xmlns:p16="http://schemas.microsoft.com/office/powerpoint/2015/main" val="1"/>
+              </p:ext>
+            </p:extLst>
+          </p:nvPr>
+        </p:nvPicPr>
+        <p:blipFill>
+          <a:blip r:embed="rId3">
+            <a:extLst>
+              <a:ext uri="{28A0092B-C50C-407E-A947-70E740481C1C}">
+                <a14:useLocalDpi xmlns:a14="http://schemas.microsoft.com/office/drawing/2010/main" val="0"/>
+              </a:ext>
+            </a:extLst>
+          </a:blip>
+          <a:stretch>
+            <a:fillRect/>
+          </a:stretch>
+        </p:blipFill>
+        <p:spPr>
+          <a:xfrm>
+            <a:off x="0" y="0"/>
+            <a:ext cx="12192000" cy="6858000"/>
+          </a:xfrm>
+          <a:prstGeom prst="rect">
+            <a:avLst/>
+          </a:prstGeom>
+        </p:spPr>
+      </p:pic>
+      <p:sp>
+        <p:nvSpPr>
+          <p:cNvPr id="11" name="Rectangle 10">
+            <a:extLst>
+              <a:ext uri="{FF2B5EF4-FFF2-40B4-BE49-F238E27FC236}">
+                <a16:creationId xmlns:a16="http://schemas.microsoft.com/office/drawing/2014/main" id="{A3EC14A0-83DB-4F99-AC40-451E8964EF3F}"/>
+              </a:ext>
+            </a:extLst>
+          </p:cNvPr>
+          <p:cNvSpPr/>
+          <p:nvPr/>
+        </p:nvSpPr>
+        <p:spPr>
+          <a:xfrm>
+            <a:off x="2706951" y="3161654"/>
+            <a:ext cx="1154542" cy="700586"/>
+          </a:xfrm>
+          <a:prstGeom prst="rect">
+            <a:avLst/>
+          </a:prstGeom>
+        </p:spPr>
+        <p:style>
+          <a:lnRef idx="2">
+            <a:schemeClr val="accent1">
+              <a:shade val="50000"/>
+            </a:schemeClr>
+          </a:lnRef>
+          <a:fillRef idx="1">
+            <a:schemeClr val="accent1"/>
+          </a:fillRef>
+          <a:effectRef idx="0">
+            <a:schemeClr val="accent1"/>
+          </a:effectRef>
+          <a:fontRef idx="minor">
+            <a:schemeClr val="lt1"/>
+          </a:fontRef>
+        </p:style>
+        <p:txBody>
+          <a:bodyPr rtlCol="0" anchor="ctr"/>
+          <a:lstStyle/>
+          <a:p>
+            <a:pPr algn="ctr"/>
+            <a:r>
+              <a:rPr lang="en-US" sz="1200" dirty="0"/>
+              <a:t>Rounds </a:t>
+            </a:r>
+            <a:endParaRPr lang="en-SG" sz="1200" dirty="0"/>
+          </a:p>
+        </p:txBody>
+      </p:sp>
+      <p:sp>
+        <p:nvSpPr>
+          <p:cNvPr id="15" name="Rectangle 14">
+            <a:extLst>
+              <a:ext uri="{FF2B5EF4-FFF2-40B4-BE49-F238E27FC236}">
+                <a16:creationId xmlns:a16="http://schemas.microsoft.com/office/drawing/2014/main" id="{895423C6-9E88-42B2-8EDD-53EBCF942A6D}"/>
+              </a:ext>
+            </a:extLst>
+          </p:cNvPr>
+          <p:cNvSpPr/>
+          <p:nvPr/>
+        </p:nvSpPr>
+        <p:spPr>
+          <a:xfrm>
+            <a:off x="7721274" y="3161654"/>
+            <a:ext cx="1154542" cy="700586"/>
+          </a:xfrm>
+          <a:prstGeom prst="rect">
+            <a:avLst/>
+          </a:prstGeom>
+        </p:spPr>
+        <p:style>
+          <a:lnRef idx="2">
+            <a:schemeClr val="accent1">
+              <a:shade val="50000"/>
+            </a:schemeClr>
+          </a:lnRef>
+          <a:fillRef idx="1">
+            <a:schemeClr val="accent1"/>
+          </a:fillRef>
+          <a:effectRef idx="0">
+            <a:schemeClr val="accent1"/>
+          </a:effectRef>
+          <a:fontRef idx="minor">
+            <a:schemeClr val="lt1"/>
+          </a:fontRef>
+        </p:style>
+        <p:txBody>
+          <a:bodyPr rtlCol="0" anchor="ctr"/>
+          <a:lstStyle/>
+          <a:p>
+            <a:pPr algn="ctr"/>
+            <a:r>
+              <a:rPr lang="en-US" sz="1200" dirty="0"/>
+              <a:t>Iteration Integration</a:t>
+            </a:r>
+            <a:endParaRPr lang="en-SG" sz="1200" dirty="0"/>
+          </a:p>
+        </p:txBody>
+      </p:sp>
+      <p:sp>
+        <p:nvSpPr>
+          <p:cNvPr id="16" name="Rectangle 15">
+            <a:extLst>
+              <a:ext uri="{FF2B5EF4-FFF2-40B4-BE49-F238E27FC236}">
+                <a16:creationId xmlns:a16="http://schemas.microsoft.com/office/drawing/2014/main" id="{5FD94160-9A52-4605-A745-EF0F5B0299DD}"/>
+              </a:ext>
+            </a:extLst>
+          </p:cNvPr>
+          <p:cNvSpPr/>
+          <p:nvPr/>
+        </p:nvSpPr>
+        <p:spPr>
+          <a:xfrm>
+            <a:off x="9383245" y="3161654"/>
+            <a:ext cx="1154542" cy="700586"/>
+          </a:xfrm>
+          <a:prstGeom prst="rect">
+            <a:avLst/>
+          </a:prstGeom>
+        </p:spPr>
+        <p:style>
+          <a:lnRef idx="2">
+            <a:schemeClr val="accent1">
+              <a:shade val="50000"/>
+            </a:schemeClr>
+          </a:lnRef>
+          <a:fillRef idx="1">
+            <a:schemeClr val="accent1"/>
+          </a:fillRef>
+          <a:effectRef idx="0">
+            <a:schemeClr val="accent1"/>
+          </a:effectRef>
+          <a:fontRef idx="minor">
+            <a:schemeClr val="lt1"/>
+          </a:fontRef>
+        </p:style>
+        <p:txBody>
+          <a:bodyPr rtlCol="0" anchor="ctr"/>
+          <a:lstStyle/>
+          <a:p>
+            <a:pPr algn="ctr"/>
+            <a:r>
+              <a:rPr lang="en-US" sz="1200" dirty="0"/>
+              <a:t>Iteration Testing</a:t>
+            </a:r>
+            <a:endParaRPr lang="en-SG" sz="1200" dirty="0"/>
+          </a:p>
+        </p:txBody>
+      </p:sp>
+      <p:sp>
+        <p:nvSpPr>
+          <p:cNvPr id="19" name="Rectangle 18">
+            <a:extLst>
+              <a:ext uri="{FF2B5EF4-FFF2-40B4-BE49-F238E27FC236}">
+                <a16:creationId xmlns:a16="http://schemas.microsoft.com/office/drawing/2014/main" id="{62516FA8-1576-4108-9FB9-B4FEFC33886C}"/>
+              </a:ext>
+            </a:extLst>
+          </p:cNvPr>
+          <p:cNvSpPr/>
+          <p:nvPr/>
+        </p:nvSpPr>
+        <p:spPr>
+          <a:xfrm>
+            <a:off x="7562050" y="4812599"/>
+            <a:ext cx="1306942" cy="816592"/>
+          </a:xfrm>
+          <a:prstGeom prst="rect">
+            <a:avLst/>
+          </a:prstGeom>
+        </p:spPr>
+        <p:style>
+          <a:lnRef idx="2">
+            <a:schemeClr val="accent1">
+              <a:shade val="50000"/>
+            </a:schemeClr>
+          </a:lnRef>
+          <a:fillRef idx="1">
+            <a:schemeClr val="accent1"/>
+          </a:fillRef>
+          <a:effectRef idx="0">
+            <a:schemeClr val="accent1"/>
+          </a:effectRef>
+          <a:fontRef idx="minor">
+            <a:schemeClr val="lt1"/>
+          </a:fontRef>
+        </p:style>
+        <p:txBody>
+          <a:bodyPr rtlCol="0" anchor="ctr"/>
+          <a:lstStyle/>
+          <a:p>
+            <a:pPr algn="ctr"/>
+            <a:r>
+              <a:rPr lang="en-US" sz="1200" dirty="0"/>
+              <a:t>UAT </a:t>
+            </a:r>
+          </a:p>
+          <a:p>
+            <a:pPr algn="ctr"/>
+            <a:r>
+              <a:rPr lang="en-US" sz="1200" dirty="0"/>
+              <a:t>Preparation</a:t>
+            </a:r>
+          </a:p>
+          <a:p>
+            <a:pPr algn="ctr"/>
+            <a:r>
+              <a:rPr lang="en-US" sz="1200" dirty="0"/>
+              <a:t>(Milestone)</a:t>
+            </a:r>
+          </a:p>
+        </p:txBody>
+      </p:sp>
+      <p:cxnSp>
+        <p:nvCxnSpPr>
+          <p:cNvPr id="6" name="Straight Arrow Connector 5">
+            <a:extLst>
+              <a:ext uri="{FF2B5EF4-FFF2-40B4-BE49-F238E27FC236}">
+                <a16:creationId xmlns:a16="http://schemas.microsoft.com/office/drawing/2014/main" id="{1246AB82-BCFF-4C36-926B-AE644EE37CE8}"/>
+              </a:ext>
+            </a:extLst>
+          </p:cNvPr>
+          <p:cNvCxnSpPr>
+            <a:cxnSpLocks/>
+            <a:endCxn id="11" idx="1"/>
+          </p:cNvCxnSpPr>
+          <p:nvPr/>
+        </p:nvCxnSpPr>
+        <p:spPr>
+          <a:xfrm>
+            <a:off x="2199522" y="3511947"/>
+            <a:ext cx="507429" cy="0"/>
+          </a:xfrm>
+          <a:prstGeom prst="straightConnector1">
+            <a:avLst/>
+          </a:prstGeom>
+          <a:ln w="19050">
+            <a:tailEnd type="triangle"/>
+          </a:ln>
+        </p:spPr>
+        <p:style>
+          <a:lnRef idx="1">
+            <a:schemeClr val="accent1"/>
+          </a:lnRef>
+          <a:fillRef idx="0">
+            <a:schemeClr val="accent1"/>
+          </a:fillRef>
+          <a:effectRef idx="0">
+            <a:schemeClr val="accent1"/>
+          </a:effectRef>
+          <a:fontRef idx="minor">
+            <a:schemeClr val="tx1"/>
+          </a:fontRef>
+        </p:style>
+      </p:cxnSp>
+      <p:cxnSp>
+        <p:nvCxnSpPr>
+          <p:cNvPr id="25" name="Straight Arrow Connector 24">
+            <a:extLst>
+              <a:ext uri="{FF2B5EF4-FFF2-40B4-BE49-F238E27FC236}">
+                <a16:creationId xmlns:a16="http://schemas.microsoft.com/office/drawing/2014/main" id="{39A8F959-2494-4316-976E-CEBE440D0BEE}"/>
+              </a:ext>
+            </a:extLst>
+          </p:cNvPr>
+          <p:cNvCxnSpPr>
+            <a:cxnSpLocks/>
+            <a:stCxn id="11" idx="3"/>
+          </p:cNvCxnSpPr>
+          <p:nvPr/>
+        </p:nvCxnSpPr>
+        <p:spPr>
+          <a:xfrm>
+            <a:off x="3861493" y="3511947"/>
+            <a:ext cx="507429" cy="0"/>
+          </a:xfrm>
+          <a:prstGeom prst="straightConnector1">
+            <a:avLst/>
+          </a:prstGeom>
+          <a:ln w="19050">
+            <a:tailEnd type="triangle"/>
+          </a:ln>
+        </p:spPr>
+        <p:style>
+          <a:lnRef idx="1">
+            <a:schemeClr val="accent1"/>
+          </a:lnRef>
+          <a:fillRef idx="0">
+            <a:schemeClr val="accent1"/>
+          </a:fillRef>
+          <a:effectRef idx="0">
+            <a:schemeClr val="accent1"/>
+          </a:effectRef>
+          <a:fontRef idx="minor">
+            <a:schemeClr val="tx1"/>
+          </a:fontRef>
+        </p:style>
+      </p:cxnSp>
+      <p:cxnSp>
+        <p:nvCxnSpPr>
+          <p:cNvPr id="31" name="Straight Arrow Connector 30">
+            <a:extLst>
+              <a:ext uri="{FF2B5EF4-FFF2-40B4-BE49-F238E27FC236}">
+                <a16:creationId xmlns:a16="http://schemas.microsoft.com/office/drawing/2014/main" id="{8D3F46D8-14DB-4377-807E-74727026AB92}"/>
+              </a:ext>
+            </a:extLst>
+          </p:cNvPr>
+          <p:cNvCxnSpPr>
+            <a:cxnSpLocks/>
+          </p:cNvCxnSpPr>
+          <p:nvPr/>
+        </p:nvCxnSpPr>
+        <p:spPr>
+          <a:xfrm>
+            <a:off x="5551874" y="3511947"/>
+            <a:ext cx="507429" cy="0"/>
+          </a:xfrm>
+          <a:prstGeom prst="straightConnector1">
+            <a:avLst/>
+          </a:prstGeom>
+          <a:ln w="19050">
+            <a:tailEnd type="triangle"/>
+          </a:ln>
+        </p:spPr>
+        <p:style>
+          <a:lnRef idx="1">
+            <a:schemeClr val="accent1"/>
+          </a:lnRef>
+          <a:fillRef idx="0">
+            <a:schemeClr val="accent1"/>
+          </a:fillRef>
+          <a:effectRef idx="0">
+            <a:schemeClr val="accent1"/>
+          </a:effectRef>
+          <a:fontRef idx="minor">
+            <a:schemeClr val="tx1"/>
+          </a:fontRef>
+        </p:style>
+      </p:cxnSp>
+      <p:cxnSp>
+        <p:nvCxnSpPr>
+          <p:cNvPr id="34" name="Straight Arrow Connector 33">
+            <a:extLst>
+              <a:ext uri="{FF2B5EF4-FFF2-40B4-BE49-F238E27FC236}">
+                <a16:creationId xmlns:a16="http://schemas.microsoft.com/office/drawing/2014/main" id="{3CE76AEF-E574-49D6-9D29-922BF0910BDB}"/>
+              </a:ext>
+            </a:extLst>
+          </p:cNvPr>
+          <p:cNvCxnSpPr>
+            <a:cxnSpLocks/>
+            <a:endCxn id="15" idx="1"/>
+          </p:cNvCxnSpPr>
+          <p:nvPr/>
+        </p:nvCxnSpPr>
+        <p:spPr>
+          <a:xfrm>
+            <a:off x="7213845" y="3511947"/>
+            <a:ext cx="507429" cy="0"/>
+          </a:xfrm>
+          <a:prstGeom prst="straightConnector1">
+            <a:avLst/>
+          </a:prstGeom>
+          <a:ln w="19050">
+            <a:tailEnd type="triangle"/>
+          </a:ln>
+        </p:spPr>
+        <p:style>
+          <a:lnRef idx="1">
+            <a:schemeClr val="accent1"/>
+          </a:lnRef>
+          <a:fillRef idx="0">
+            <a:schemeClr val="accent1"/>
+          </a:fillRef>
+          <a:effectRef idx="0">
+            <a:schemeClr val="accent1"/>
+          </a:effectRef>
+          <a:fontRef idx="minor">
+            <a:schemeClr val="tx1"/>
+          </a:fontRef>
+        </p:style>
+      </p:cxnSp>
+      <p:cxnSp>
+        <p:nvCxnSpPr>
+          <p:cNvPr id="38" name="Straight Arrow Connector 37">
+            <a:extLst>
+              <a:ext uri="{FF2B5EF4-FFF2-40B4-BE49-F238E27FC236}">
+                <a16:creationId xmlns:a16="http://schemas.microsoft.com/office/drawing/2014/main" id="{DF393A5D-6D4A-47C2-9451-282F1A8B66E7}"/>
+              </a:ext>
+            </a:extLst>
+          </p:cNvPr>
+          <p:cNvCxnSpPr>
+            <a:cxnSpLocks/>
+            <a:stCxn id="15" idx="3"/>
+            <a:endCxn id="16" idx="1"/>
+          </p:cNvCxnSpPr>
+          <p:nvPr/>
+        </p:nvCxnSpPr>
+        <p:spPr>
+          <a:xfrm>
+            <a:off x="8875816" y="3511947"/>
+            <a:ext cx="507429" cy="0"/>
+          </a:xfrm>
+          <a:prstGeom prst="straightConnector1">
+            <a:avLst/>
+          </a:prstGeom>
+          <a:ln w="19050">
+            <a:tailEnd type="triangle"/>
+          </a:ln>
+        </p:spPr>
+        <p:style>
+          <a:lnRef idx="1">
+            <a:schemeClr val="accent1"/>
+          </a:lnRef>
+          <a:fillRef idx="0">
+            <a:schemeClr val="accent1"/>
+          </a:fillRef>
+          <a:effectRef idx="0">
+            <a:schemeClr val="accent1"/>
+          </a:effectRef>
+          <a:fontRef idx="minor">
+            <a:schemeClr val="tx1"/>
+          </a:fontRef>
+        </p:style>
+      </p:cxnSp>
+      <p:cxnSp>
+        <p:nvCxnSpPr>
+          <p:cNvPr id="50" name="Straight Arrow Connector 49">
+            <a:extLst>
+              <a:ext uri="{FF2B5EF4-FFF2-40B4-BE49-F238E27FC236}">
+                <a16:creationId xmlns:a16="http://schemas.microsoft.com/office/drawing/2014/main" id="{C2E497CC-20BB-4B52-85AC-B20C76CFD3DE}"/>
+              </a:ext>
+            </a:extLst>
+          </p:cNvPr>
+          <p:cNvCxnSpPr>
+            <a:cxnSpLocks/>
+            <a:stCxn id="19" idx="1"/>
+          </p:cNvCxnSpPr>
+          <p:nvPr/>
+        </p:nvCxnSpPr>
+        <p:spPr>
+          <a:xfrm flipH="1">
+            <a:off x="7054621" y="5220895"/>
+            <a:ext cx="507429" cy="0"/>
+          </a:xfrm>
+          <a:prstGeom prst="straightConnector1">
+            <a:avLst/>
+          </a:prstGeom>
+          <a:ln w="19050">
+            <a:tailEnd type="triangle"/>
+          </a:ln>
+        </p:spPr>
+        <p:style>
+          <a:lnRef idx="1">
+            <a:schemeClr val="accent1"/>
+          </a:lnRef>
+          <a:fillRef idx="0">
+            <a:schemeClr val="accent1"/>
+          </a:fillRef>
+          <a:effectRef idx="0">
+            <a:schemeClr val="accent1"/>
+          </a:effectRef>
+          <a:fontRef idx="minor">
+            <a:schemeClr val="tx1"/>
+          </a:fontRef>
+        </p:style>
+      </p:cxnSp>
+      <p:sp>
+        <p:nvSpPr>
+          <p:cNvPr id="65" name="Oval 64">
+            <a:extLst>
+              <a:ext uri="{FF2B5EF4-FFF2-40B4-BE49-F238E27FC236}">
+                <a16:creationId xmlns:a16="http://schemas.microsoft.com/office/drawing/2014/main" id="{8FEEFE47-4CDB-42CC-AE7B-62F1972A5A44}"/>
+              </a:ext>
+            </a:extLst>
+          </p:cNvPr>
+          <p:cNvSpPr/>
+          <p:nvPr/>
+        </p:nvSpPr>
+        <p:spPr>
+          <a:xfrm>
+            <a:off x="6679491" y="5065590"/>
+            <a:ext cx="371197" cy="348018"/>
+          </a:xfrm>
+          <a:prstGeom prst="ellipse">
+            <a:avLst/>
+          </a:prstGeom>
+          <a:ln w="28575">
+            <a:solidFill>
+              <a:schemeClr val="accent1"/>
+            </a:solidFill>
+          </a:ln>
+        </p:spPr>
+        <p:style>
+          <a:lnRef idx="2">
+            <a:schemeClr val="accent6"/>
+          </a:lnRef>
+          <a:fillRef idx="1">
+            <a:schemeClr val="lt1"/>
+          </a:fillRef>
+          <a:effectRef idx="0">
+            <a:schemeClr val="accent6"/>
+          </a:effectRef>
+          <a:fontRef idx="minor">
+            <a:schemeClr val="dk1"/>
+          </a:fontRef>
+        </p:style>
+        <p:txBody>
+          <a:bodyPr rtlCol="0" anchor="ctr"/>
+          <a:lstStyle/>
+          <a:p>
+            <a:pPr algn="ctr"/>
+            <a:endParaRPr lang="en-SG"/>
+          </a:p>
+        </p:txBody>
+      </p:sp>
+      <p:sp>
+        <p:nvSpPr>
+          <p:cNvPr id="66" name="Oval 65">
+            <a:extLst>
+              <a:ext uri="{FF2B5EF4-FFF2-40B4-BE49-F238E27FC236}">
+                <a16:creationId xmlns:a16="http://schemas.microsoft.com/office/drawing/2014/main" id="{B99E5AC4-A4AF-4165-938D-96C2AC26EFB9}"/>
+              </a:ext>
+            </a:extLst>
+          </p:cNvPr>
+          <p:cNvSpPr/>
+          <p:nvPr/>
+        </p:nvSpPr>
+        <p:spPr>
+          <a:xfrm>
+            <a:off x="1814120" y="3337938"/>
+            <a:ext cx="371197" cy="348018"/>
+          </a:xfrm>
+          <a:prstGeom prst="ellipse">
+            <a:avLst/>
+          </a:prstGeom>
+          <a:ln w="28575">
+            <a:solidFill>
+              <a:schemeClr val="accent1"/>
+            </a:solidFill>
+          </a:ln>
+        </p:spPr>
+        <p:style>
+          <a:lnRef idx="2">
+            <a:schemeClr val="accent6"/>
+          </a:lnRef>
+          <a:fillRef idx="1">
+            <a:schemeClr val="lt1"/>
+          </a:fillRef>
+          <a:effectRef idx="0">
+            <a:schemeClr val="accent6"/>
+          </a:effectRef>
+          <a:fontRef idx="minor">
+            <a:schemeClr val="dk1"/>
+          </a:fontRef>
+        </p:style>
+        <p:txBody>
+          <a:bodyPr rtlCol="0" anchor="ctr"/>
+          <a:lstStyle/>
+          <a:p>
+            <a:pPr algn="ctr"/>
+            <a:endParaRPr lang="en-SG"/>
+          </a:p>
+        </p:txBody>
+      </p:sp>
+      <p:sp>
+        <p:nvSpPr>
+          <p:cNvPr id="71" name="TextBox 70">
+            <a:extLst>
+              <a:ext uri="{FF2B5EF4-FFF2-40B4-BE49-F238E27FC236}">
+                <a16:creationId xmlns:a16="http://schemas.microsoft.com/office/drawing/2014/main" id="{476EB3F2-03ED-4341-851A-CE3F7170A194}"/>
+              </a:ext>
+            </a:extLst>
+          </p:cNvPr>
+          <p:cNvSpPr txBox="1"/>
+          <p:nvPr/>
+        </p:nvSpPr>
+        <p:spPr>
+          <a:xfrm>
+            <a:off x="1758434" y="3075269"/>
+            <a:ext cx="482568" cy="276999"/>
+          </a:xfrm>
+          <a:prstGeom prst="rect">
+            <a:avLst/>
+          </a:prstGeom>
+          <a:noFill/>
+        </p:spPr>
+        <p:txBody>
+          <a:bodyPr wrap="none" rtlCol="0">
+            <a:spAutoFit/>
+          </a:bodyPr>
+          <a:lstStyle/>
+          <a:p>
+            <a:r>
+              <a:rPr lang="en-US" sz="1200" dirty="0"/>
+              <a:t>Start</a:t>
+            </a:r>
+            <a:endParaRPr lang="en-SG" sz="1200" dirty="0"/>
+          </a:p>
+        </p:txBody>
+      </p:sp>
+      <p:sp>
+        <p:nvSpPr>
+          <p:cNvPr id="73" name="TextBox 72">
+            <a:extLst>
+              <a:ext uri="{FF2B5EF4-FFF2-40B4-BE49-F238E27FC236}">
+                <a16:creationId xmlns:a16="http://schemas.microsoft.com/office/drawing/2014/main" id="{516678A9-7BC2-44CB-B5F9-7DC5FF2BF874}"/>
+              </a:ext>
+            </a:extLst>
+          </p:cNvPr>
+          <p:cNvSpPr txBox="1"/>
+          <p:nvPr/>
+        </p:nvSpPr>
+        <p:spPr>
+          <a:xfrm>
+            <a:off x="6664305" y="5386312"/>
+            <a:ext cx="420308" cy="276999"/>
+          </a:xfrm>
+          <a:prstGeom prst="rect">
+            <a:avLst/>
+          </a:prstGeom>
+          <a:noFill/>
+        </p:spPr>
+        <p:txBody>
+          <a:bodyPr wrap="none" rtlCol="0">
+            <a:spAutoFit/>
+          </a:bodyPr>
+          <a:lstStyle/>
+          <a:p>
+            <a:r>
+              <a:rPr lang="en-US" sz="1200" dirty="0"/>
+              <a:t>End</a:t>
+            </a:r>
+            <a:endParaRPr lang="en-SG" sz="1200" dirty="0"/>
+          </a:p>
+        </p:txBody>
+      </p:sp>
+      <p:sp>
+        <p:nvSpPr>
+          <p:cNvPr id="39" name="Rectangle 38">
+            <a:extLst>
+              <a:ext uri="{FF2B5EF4-FFF2-40B4-BE49-F238E27FC236}">
+                <a16:creationId xmlns:a16="http://schemas.microsoft.com/office/drawing/2014/main" id="{01473D17-C7FE-4685-BD9B-678EC74BA77C}"/>
+              </a:ext>
+            </a:extLst>
+          </p:cNvPr>
+          <p:cNvSpPr/>
+          <p:nvPr/>
+        </p:nvSpPr>
+        <p:spPr>
+          <a:xfrm>
+            <a:off x="6059303" y="3161653"/>
+            <a:ext cx="1154542" cy="700586"/>
+          </a:xfrm>
+          <a:prstGeom prst="rect">
+            <a:avLst/>
+          </a:prstGeom>
+        </p:spPr>
+        <p:style>
+          <a:lnRef idx="2">
+            <a:schemeClr val="accent1">
+              <a:shade val="50000"/>
+            </a:schemeClr>
+          </a:lnRef>
+          <a:fillRef idx="1">
+            <a:schemeClr val="accent1"/>
+          </a:fillRef>
+          <a:effectRef idx="0">
+            <a:schemeClr val="accent1"/>
+          </a:effectRef>
+          <a:fontRef idx="minor">
+            <a:schemeClr val="lt1"/>
+          </a:fontRef>
+        </p:style>
+        <p:txBody>
+          <a:bodyPr rtlCol="0" anchor="ctr"/>
+          <a:lstStyle/>
+          <a:p>
+            <a:pPr algn="ctr"/>
+            <a:r>
+              <a:rPr lang="en-US" sz="1200" dirty="0"/>
+              <a:t>JSON</a:t>
+            </a:r>
+            <a:br>
+              <a:rPr lang="en-US" sz="1200" dirty="0"/>
+            </a:br>
+            <a:r>
+              <a:rPr lang="en-US" sz="1200" dirty="0"/>
+              <a:t>Dumping</a:t>
+            </a:r>
+            <a:endParaRPr lang="en-SG" sz="1200" dirty="0"/>
+          </a:p>
+        </p:txBody>
+      </p:sp>
+      <p:sp>
+        <p:nvSpPr>
+          <p:cNvPr id="24" name="Rectangle 23">
+            <a:extLst>
+              <a:ext uri="{FF2B5EF4-FFF2-40B4-BE49-F238E27FC236}">
+                <a16:creationId xmlns:a16="http://schemas.microsoft.com/office/drawing/2014/main" id="{AC7ED93A-4F34-48A2-B4C6-489B194750DC}"/>
+              </a:ext>
+            </a:extLst>
+          </p:cNvPr>
+          <p:cNvSpPr/>
+          <p:nvPr/>
+        </p:nvSpPr>
+        <p:spPr>
+          <a:xfrm>
+            <a:off x="4383127" y="3161653"/>
+            <a:ext cx="1154542" cy="700586"/>
+          </a:xfrm>
+          <a:prstGeom prst="rect">
+            <a:avLst/>
+          </a:prstGeom>
+        </p:spPr>
+        <p:style>
+          <a:lnRef idx="2">
+            <a:schemeClr val="accent1">
+              <a:shade val="50000"/>
+            </a:schemeClr>
+          </a:lnRef>
+          <a:fillRef idx="1">
+            <a:schemeClr val="accent1"/>
+          </a:fillRef>
+          <a:effectRef idx="0">
+            <a:schemeClr val="accent1"/>
+          </a:effectRef>
+          <a:fontRef idx="minor">
+            <a:schemeClr val="lt1"/>
+          </a:fontRef>
+        </p:style>
+        <p:txBody>
+          <a:bodyPr rtlCol="0" anchor="ctr"/>
+          <a:lstStyle/>
+          <a:p>
+            <a:pPr algn="ctr"/>
+            <a:r>
+              <a:rPr lang="en-US" sz="1200" dirty="0"/>
+              <a:t>Drop Section</a:t>
+            </a:r>
+            <a:endParaRPr lang="en-SG" sz="1200" dirty="0"/>
+          </a:p>
+        </p:txBody>
+      </p:sp>
+      <p:cxnSp>
+        <p:nvCxnSpPr>
+          <p:cNvPr id="30" name="Straight Arrow Connector 29">
+            <a:extLst>
+              <a:ext uri="{FF2B5EF4-FFF2-40B4-BE49-F238E27FC236}">
+                <a16:creationId xmlns:a16="http://schemas.microsoft.com/office/drawing/2014/main" id="{59AE8B8D-F07B-42C9-BD2C-AB5074A21D25}"/>
+              </a:ext>
+            </a:extLst>
+          </p:cNvPr>
+          <p:cNvCxnSpPr>
+            <a:cxnSpLocks/>
+            <a:stCxn id="16" idx="2"/>
+            <a:endCxn id="33" idx="0"/>
+          </p:cNvCxnSpPr>
+          <p:nvPr/>
+        </p:nvCxnSpPr>
+        <p:spPr>
+          <a:xfrm>
+            <a:off x="9960516" y="3862240"/>
+            <a:ext cx="6824" cy="994714"/>
+          </a:xfrm>
+          <a:prstGeom prst="straightConnector1">
+            <a:avLst/>
+          </a:prstGeom>
+          <a:ln w="19050">
+            <a:tailEnd type="triangle"/>
+          </a:ln>
+        </p:spPr>
+        <p:style>
+          <a:lnRef idx="1">
+            <a:schemeClr val="accent1"/>
+          </a:lnRef>
+          <a:fillRef idx="0">
+            <a:schemeClr val="accent1"/>
+          </a:fillRef>
+          <a:effectRef idx="0">
+            <a:schemeClr val="accent1"/>
+          </a:effectRef>
+          <a:fontRef idx="minor">
+            <a:schemeClr val="tx1"/>
+          </a:fontRef>
+        </p:style>
+      </p:cxnSp>
+      <p:sp>
+        <p:nvSpPr>
+          <p:cNvPr id="33" name="Rectangle 32">
+            <a:extLst>
+              <a:ext uri="{FF2B5EF4-FFF2-40B4-BE49-F238E27FC236}">
+                <a16:creationId xmlns:a16="http://schemas.microsoft.com/office/drawing/2014/main" id="{38C30D58-8FEA-492E-9792-7E9D006BB3DD}"/>
+              </a:ext>
+            </a:extLst>
+          </p:cNvPr>
+          <p:cNvSpPr/>
+          <p:nvPr/>
+        </p:nvSpPr>
+        <p:spPr>
+          <a:xfrm>
+            <a:off x="9390069" y="4856954"/>
+            <a:ext cx="1154542" cy="700586"/>
+          </a:xfrm>
+          <a:prstGeom prst="rect">
+            <a:avLst/>
+          </a:prstGeom>
+        </p:spPr>
+        <p:style>
+          <a:lnRef idx="2">
+            <a:schemeClr val="accent1">
+              <a:shade val="50000"/>
+            </a:schemeClr>
+          </a:lnRef>
+          <a:fillRef idx="1">
+            <a:schemeClr val="accent1"/>
+          </a:fillRef>
+          <a:effectRef idx="0">
+            <a:schemeClr val="accent1"/>
+          </a:effectRef>
+          <a:fontRef idx="minor">
+            <a:schemeClr val="lt1"/>
+          </a:fontRef>
+        </p:style>
+        <p:txBody>
+          <a:bodyPr rtlCol="0" anchor="ctr"/>
+          <a:lstStyle/>
+          <a:p>
+            <a:pPr algn="ctr"/>
+            <a:r>
+              <a:rPr lang="en-US" sz="1200" dirty="0"/>
+              <a:t>Iteration Deployment</a:t>
+            </a:r>
+            <a:endParaRPr lang="en-SG" sz="1200" dirty="0"/>
+          </a:p>
+        </p:txBody>
+      </p:sp>
+      <p:cxnSp>
+        <p:nvCxnSpPr>
+          <p:cNvPr id="37" name="Straight Arrow Connector 36">
+            <a:extLst>
+              <a:ext uri="{FF2B5EF4-FFF2-40B4-BE49-F238E27FC236}">
+                <a16:creationId xmlns:a16="http://schemas.microsoft.com/office/drawing/2014/main" id="{DD31A232-A48D-4A9B-84E4-72B083848DF9}"/>
+              </a:ext>
+            </a:extLst>
+          </p:cNvPr>
+          <p:cNvCxnSpPr>
+            <a:cxnSpLocks/>
+            <a:stCxn id="33" idx="1"/>
+          </p:cNvCxnSpPr>
+          <p:nvPr/>
+        </p:nvCxnSpPr>
+        <p:spPr>
+          <a:xfrm flipH="1">
+            <a:off x="8875816" y="5207247"/>
+            <a:ext cx="514253" cy="0"/>
+          </a:xfrm>
+          <a:prstGeom prst="straightConnector1">
+            <a:avLst/>
+          </a:prstGeom>
+          <a:ln w="19050">
+            <a:tailEnd type="triangle"/>
+          </a:ln>
+        </p:spPr>
+        <p:style>
+          <a:lnRef idx="1">
+            <a:schemeClr val="accent1"/>
+          </a:lnRef>
+          <a:fillRef idx="0">
+            <a:schemeClr val="accent1"/>
+          </a:fillRef>
+          <a:effectRef idx="0">
+            <a:schemeClr val="accent1"/>
+          </a:effectRef>
+          <a:fontRef idx="minor">
+            <a:schemeClr val="tx1"/>
+          </a:fontRef>
+        </p:style>
+      </p:cxnSp>
+      <p:sp>
+        <p:nvSpPr>
+          <p:cNvPr id="41" name="Title 1">
+            <a:extLst>
+              <a:ext uri="{FF2B5EF4-FFF2-40B4-BE49-F238E27FC236}">
+                <a16:creationId xmlns:a16="http://schemas.microsoft.com/office/drawing/2014/main" id="{06BD03B4-9DEB-434D-9EED-32E6E02EDF55}"/>
+              </a:ext>
+            </a:extLst>
+          </p:cNvPr>
+          <p:cNvSpPr txBox="1">
+            <a:spLocks/>
+          </p:cNvSpPr>
+          <p:nvPr/>
+        </p:nvSpPr>
+        <p:spPr>
+          <a:xfrm>
+            <a:off x="1179074" y="975815"/>
+            <a:ext cx="9833548" cy="1325563"/>
+          </a:xfrm>
+          <a:prstGeom prst="rect">
+            <a:avLst/>
+          </a:prstGeom>
+        </p:spPr>
+        <p:txBody>
+          <a:bodyPr vert="horz" lIns="91440" tIns="45720" rIns="91440" bIns="45720" rtlCol="0" anchor="ctr">
+            <a:normAutofit/>
+          </a:bodyPr>
+          <a:lstStyle>
+            <a:lvl1pPr algn="l" defTabSz="914400" rtl="0" eaLnBrk="1" latinLnBrk="0" hangingPunct="1">
+              <a:lnSpc>
+                <a:spcPct val="90000"/>
+              </a:lnSpc>
+              <a:spcBef>
+                <a:spcPct val="0"/>
+              </a:spcBef>
+              <a:buNone/>
+              <a:defRPr sz="4400" kern="1200">
+                <a:solidFill>
+                  <a:schemeClr val="tx1"/>
+                </a:solidFill>
+                <a:latin typeface="+mj-lt"/>
+                <a:ea typeface="+mj-ea"/>
+                <a:cs typeface="+mj-cs"/>
+              </a:defRPr>
+            </a:lvl1pPr>
+          </a:lstStyle>
+          <a:p>
+            <a:pPr algn="ctr"/>
+            <a:r>
+              <a:rPr lang="en-US" sz="4000" b="1" dirty="0">
+                <a:solidFill>
+                  <a:srgbClr val="FFFFFF"/>
+                </a:solidFill>
+                <a:latin typeface="Gloss And Bloom" pitchFamily="2" charset="0"/>
+              </a:rPr>
+              <a:t>Critical Path (Iteration 3)</a:t>
+            </a:r>
+            <a:endParaRPr lang="en-SG" sz="4000" b="1" dirty="0">
+              <a:solidFill>
+                <a:srgbClr val="FFFFFF"/>
+              </a:solidFill>
+              <a:latin typeface="Gloss And Bloom" pitchFamily="2" charset="0"/>
+            </a:endParaRPr>
+          </a:p>
+        </p:txBody>
+      </p:sp>
+    </p:spTree>
+    <p:extLst>
+      <p:ext uri="{BB962C8B-B14F-4D97-AF65-F5344CB8AC3E}">
+        <p14:creationId xmlns:p14="http://schemas.microsoft.com/office/powerpoint/2010/main" val="3197971674"/>
+      </p:ext>
+    </p:extLst>
+  </p:cSld>
+  <p:clrMapOvr>
+    <a:masterClrMapping/>
+  </p:clrMapOvr>
+</p:sld>
+</file>
+
+<file path=ppt/slides/slide12.xml><?xml version="1.0" encoding="utf-8"?>
+<p:sld xmlns:a="http://schemas.openxmlformats.org/drawingml/2006/main" xmlns:r="http://schemas.openxmlformats.org/officeDocument/2006/relationships" xmlns:p="http://schemas.openxmlformats.org/presentationml/2006/main">
+  <p:cSld>
+    <p:bg>
+      <p:bgPr>
+        <a:solidFill>
+          <a:schemeClr val="bg1"/>
+        </a:solidFill>
+        <a:effectLst/>
+      </p:bgPr>
+    </p:bg>
+    <p:spTree>
+      <p:nvGrpSpPr>
+        <p:cNvPr id="1" name=""/>
+        <p:cNvGrpSpPr/>
+        <p:nvPr/>
+      </p:nvGrpSpPr>
+      <p:grpSpPr>
+        <a:xfrm>
+          <a:off x="0" y="0"/>
+          <a:ext cx="0" cy="0"/>
+          <a:chOff x="0" y="0"/>
+          <a:chExt cx="0" cy="0"/>
+        </a:xfrm>
+      </p:grpSpPr>
+      <p:sp>
+        <p:nvSpPr>
+          <p:cNvPr id="8" name="Rectangle 7">
+            <a:extLst>
+              <a:ext uri="{FF2B5EF4-FFF2-40B4-BE49-F238E27FC236}">
+                <a16:creationId xmlns:a16="http://schemas.microsoft.com/office/drawing/2014/main" id="{4351DFE5-F63D-4BE0-BDA9-E3EB88F01AA5}"/>
+              </a:ext>
+              <a:ext uri="{C183D7F6-B498-43B3-948B-1728B52AA6E4}">
+                <adec:decorative xmlns:adec="http://schemas.microsoft.com/office/drawing/2017/decorative" val="1"/>
+              </a:ext>
+            </a:extLst>
+          </p:cNvPr>
+          <p:cNvSpPr>
+            <a:spLocks noGrp="1" noRot="1" noChangeAspect="1" noMove="1" noResize="1" noEditPoints="1" noAdjustHandles="1" noChangeArrowheads="1" noChangeShapeType="1" noTextEdit="1"/>
+          </p:cNvSpPr>
+          <p:nvPr>
+            <p:extLst>
+              <p:ext uri="{386F3935-93C4-4BCD-93E2-E3B085C9AB24}">
+                <p16:designElem xmlns:p16="http://schemas.microsoft.com/office/powerpoint/2015/main" val="1"/>
+              </p:ext>
+            </p:extLst>
+          </p:nvPr>
+        </p:nvSpPr>
+        <p:spPr>
+          <a:xfrm>
+            <a:off x="355601" y="0"/>
+            <a:ext cx="11480494" cy="2753936"/>
+          </a:xfrm>
+          <a:prstGeom prst="rect">
+            <a:avLst/>
+          </a:prstGeom>
+          <a:gradFill>
+            <a:gsLst>
+              <a:gs pos="0">
+                <a:schemeClr val="accent1">
+                  <a:lumMod val="90000"/>
+                </a:schemeClr>
+              </a:gs>
+              <a:gs pos="25000">
+                <a:schemeClr val="accent1">
+                  <a:lumMod val="90000"/>
+                </a:schemeClr>
+              </a:gs>
+              <a:gs pos="94000">
+                <a:schemeClr val="bg2">
+                  <a:lumMod val="25000"/>
+                </a:schemeClr>
+              </a:gs>
+              <a:gs pos="100000">
+                <a:schemeClr val="bg2">
+                  <a:lumMod val="25000"/>
+                </a:schemeClr>
+              </a:gs>
+            </a:gsLst>
+            <a:lin ang="4200000" scaled="0"/>
+          </a:gradFill>
+          <a:ln>
+            <a:noFill/>
+          </a:ln>
+        </p:spPr>
+        <p:style>
+          <a:lnRef idx="2">
+            <a:schemeClr val="accent1">
+              <a:shade val="50000"/>
+            </a:schemeClr>
+          </a:lnRef>
+          <a:fillRef idx="1">
+            <a:schemeClr val="accent1"/>
+          </a:fillRef>
+          <a:effectRef idx="0">
+            <a:schemeClr val="accent1"/>
+          </a:effectRef>
+          <a:fontRef idx="minor">
+            <a:schemeClr val="lt1"/>
+          </a:fontRef>
+        </p:style>
+        <p:txBody>
+          <a:bodyPr rtlCol="0" anchor="ctr"/>
+          <a:lstStyle/>
+          <a:p>
+            <a:pPr algn="ctr"/>
+            <a:endParaRPr lang="en-US"/>
+          </a:p>
+        </p:txBody>
+      </p:sp>
+      <p:pic>
+        <p:nvPicPr>
+          <p:cNvPr id="10" name="Picture 9">
+            <a:extLst>
+              <a:ext uri="{FF2B5EF4-FFF2-40B4-BE49-F238E27FC236}">
+                <a16:creationId xmlns:a16="http://schemas.microsoft.com/office/drawing/2014/main" id="{3AA16612-ACD2-4A16-8F2B-4514FD6BF28F}"/>
+              </a:ext>
+              <a:ext uri="{C183D7F6-B498-43B3-948B-1728B52AA6E4}">
+                <adec:decorative xmlns:adec="http://schemas.microsoft.com/office/drawing/2017/decorative" val="1"/>
+              </a:ext>
+            </a:extLst>
+          </p:cNvPr>
+          <p:cNvPicPr>
+            <a:picLocks noGrp="1" noRot="1" noChangeAspect="1" noMove="1" noResize="1" noEditPoints="1" noAdjustHandles="1" noChangeArrowheads="1" noChangeShapeType="1" noCrop="1"/>
+          </p:cNvPicPr>
+          <p:nvPr>
+            <p:extLst>
+              <p:ext uri="{386F3935-93C4-4BCD-93E2-E3B085C9AB24}">
+                <p16:designElem xmlns:p16="http://schemas.microsoft.com/office/powerpoint/2015/main" val="1"/>
+              </p:ext>
+            </p:extLst>
+          </p:nvPr>
+        </p:nvPicPr>
+        <p:blipFill>
+          <a:blip r:embed="rId3">
+            <a:extLst>
+              <a:ext uri="{28A0092B-C50C-407E-A947-70E740481C1C}">
+                <a14:useLocalDpi xmlns:a14="http://schemas.microsoft.com/office/drawing/2010/main" val="0"/>
+              </a:ext>
+            </a:extLst>
+          </a:blip>
+          <a:stretch>
+            <a:fillRect/>
+          </a:stretch>
+        </p:blipFill>
+        <p:spPr>
+          <a:xfrm>
+            <a:off x="0" y="0"/>
+            <a:ext cx="12192000" cy="6858000"/>
+          </a:xfrm>
+          <a:prstGeom prst="rect">
+            <a:avLst/>
+          </a:prstGeom>
+        </p:spPr>
+      </p:pic>
+      <p:sp>
+        <p:nvSpPr>
+          <p:cNvPr id="11" name="Rectangle 10">
+            <a:extLst>
+              <a:ext uri="{FF2B5EF4-FFF2-40B4-BE49-F238E27FC236}">
+                <a16:creationId xmlns:a16="http://schemas.microsoft.com/office/drawing/2014/main" id="{A3EC14A0-83DB-4F99-AC40-451E8964EF3F}"/>
+              </a:ext>
+            </a:extLst>
+          </p:cNvPr>
+          <p:cNvSpPr/>
+          <p:nvPr/>
+        </p:nvSpPr>
+        <p:spPr>
+          <a:xfrm>
+            <a:off x="2447645" y="3029622"/>
+            <a:ext cx="1154542" cy="700586"/>
+          </a:xfrm>
+          <a:prstGeom prst="rect">
+            <a:avLst/>
+          </a:prstGeom>
+        </p:spPr>
+        <p:style>
+          <a:lnRef idx="2">
+            <a:schemeClr val="accent1">
+              <a:shade val="50000"/>
+            </a:schemeClr>
+          </a:lnRef>
+          <a:fillRef idx="1">
+            <a:schemeClr val="accent1"/>
+          </a:fillRef>
+          <a:effectRef idx="0">
+            <a:schemeClr val="accent1"/>
+          </a:effectRef>
+          <a:fontRef idx="minor">
+            <a:schemeClr val="lt1"/>
+          </a:fontRef>
+        </p:style>
+        <p:txBody>
+          <a:bodyPr rtlCol="0" anchor="ctr"/>
+          <a:lstStyle/>
+          <a:p>
+            <a:pPr algn="ctr"/>
+            <a:r>
+              <a:rPr lang="en-US" sz="1200" dirty="0"/>
+              <a:t>Integration</a:t>
+            </a:r>
+            <a:endParaRPr lang="en-SG" sz="1200" dirty="0"/>
+          </a:p>
+        </p:txBody>
+      </p:sp>
+      <p:sp>
+        <p:nvSpPr>
+          <p:cNvPr id="15" name="Rectangle 14">
+            <a:extLst>
+              <a:ext uri="{FF2B5EF4-FFF2-40B4-BE49-F238E27FC236}">
+                <a16:creationId xmlns:a16="http://schemas.microsoft.com/office/drawing/2014/main" id="{895423C6-9E88-42B2-8EDD-53EBCF942A6D}"/>
+              </a:ext>
+            </a:extLst>
+          </p:cNvPr>
+          <p:cNvSpPr/>
+          <p:nvPr/>
+        </p:nvSpPr>
+        <p:spPr>
+          <a:xfrm>
+            <a:off x="7461968" y="3029622"/>
+            <a:ext cx="1154542" cy="700586"/>
+          </a:xfrm>
+          <a:prstGeom prst="rect">
+            <a:avLst/>
+          </a:prstGeom>
+        </p:spPr>
+        <p:style>
+          <a:lnRef idx="2">
+            <a:schemeClr val="accent1">
+              <a:shade val="50000"/>
+            </a:schemeClr>
+          </a:lnRef>
+          <a:fillRef idx="1">
+            <a:schemeClr val="accent1"/>
+          </a:fillRef>
+          <a:effectRef idx="0">
+            <a:schemeClr val="accent1"/>
+          </a:effectRef>
+          <a:fontRef idx="minor">
+            <a:schemeClr val="lt1"/>
+          </a:fontRef>
+        </p:style>
+        <p:txBody>
+          <a:bodyPr rtlCol="0" anchor="ctr"/>
+          <a:lstStyle/>
+          <a:p>
+            <a:pPr algn="ctr"/>
+            <a:r>
+              <a:rPr lang="en-US" sz="1200" dirty="0"/>
+              <a:t>AWS Deployment</a:t>
+            </a:r>
+            <a:endParaRPr lang="en-SG" sz="1200" dirty="0"/>
+          </a:p>
+        </p:txBody>
+      </p:sp>
+      <p:sp>
+        <p:nvSpPr>
+          <p:cNvPr id="19" name="Rectangle 18">
+            <a:extLst>
+              <a:ext uri="{FF2B5EF4-FFF2-40B4-BE49-F238E27FC236}">
+                <a16:creationId xmlns:a16="http://schemas.microsoft.com/office/drawing/2014/main" id="{62516FA8-1576-4108-9FB9-B4FEFC33886C}"/>
+              </a:ext>
+            </a:extLst>
+          </p:cNvPr>
+          <p:cNvSpPr/>
+          <p:nvPr/>
+        </p:nvSpPr>
+        <p:spPr>
+          <a:xfrm>
+            <a:off x="9123939" y="2971618"/>
+            <a:ext cx="1306942" cy="816592"/>
+          </a:xfrm>
+          <a:prstGeom prst="rect">
+            <a:avLst/>
+          </a:prstGeom>
+        </p:spPr>
+        <p:style>
+          <a:lnRef idx="2">
+            <a:schemeClr val="accent1">
+              <a:shade val="50000"/>
+            </a:schemeClr>
+          </a:lnRef>
+          <a:fillRef idx="1">
+            <a:schemeClr val="accent1"/>
+          </a:fillRef>
+          <a:effectRef idx="0">
+            <a:schemeClr val="accent1"/>
+          </a:effectRef>
+          <a:fontRef idx="minor">
+            <a:schemeClr val="lt1"/>
+          </a:fontRef>
+        </p:style>
+        <p:txBody>
+          <a:bodyPr rtlCol="0" anchor="ctr"/>
+          <a:lstStyle/>
+          <a:p>
+            <a:pPr algn="ctr"/>
+            <a:r>
+              <a:rPr lang="en-US" sz="1200" dirty="0"/>
+              <a:t>Final Submission </a:t>
+            </a:r>
+          </a:p>
+          <a:p>
+            <a:pPr algn="ctr"/>
+            <a:r>
+              <a:rPr lang="en-US" sz="1200" dirty="0"/>
+              <a:t>Preparation</a:t>
+            </a:r>
+          </a:p>
+          <a:p>
+            <a:pPr algn="ctr"/>
+            <a:r>
+              <a:rPr lang="en-US" sz="1200" dirty="0"/>
+              <a:t>(Milestone)</a:t>
+            </a:r>
+          </a:p>
+        </p:txBody>
+      </p:sp>
+      <p:cxnSp>
+        <p:nvCxnSpPr>
+          <p:cNvPr id="6" name="Straight Arrow Connector 5">
+            <a:extLst>
+              <a:ext uri="{FF2B5EF4-FFF2-40B4-BE49-F238E27FC236}">
+                <a16:creationId xmlns:a16="http://schemas.microsoft.com/office/drawing/2014/main" id="{1246AB82-BCFF-4C36-926B-AE644EE37CE8}"/>
+              </a:ext>
+            </a:extLst>
+          </p:cNvPr>
+          <p:cNvCxnSpPr>
+            <a:cxnSpLocks/>
+            <a:endCxn id="11" idx="1"/>
+          </p:cNvCxnSpPr>
+          <p:nvPr/>
+        </p:nvCxnSpPr>
+        <p:spPr>
+          <a:xfrm>
+            <a:off x="1940216" y="3379915"/>
+            <a:ext cx="507429" cy="0"/>
+          </a:xfrm>
+          <a:prstGeom prst="straightConnector1">
+            <a:avLst/>
+          </a:prstGeom>
+          <a:ln w="19050">
+            <a:tailEnd type="triangle"/>
+          </a:ln>
+        </p:spPr>
+        <p:style>
+          <a:lnRef idx="1">
+            <a:schemeClr val="accent1"/>
+          </a:lnRef>
+          <a:fillRef idx="0">
+            <a:schemeClr val="accent1"/>
+          </a:fillRef>
+          <a:effectRef idx="0">
+            <a:schemeClr val="accent1"/>
+          </a:effectRef>
+          <a:fontRef idx="minor">
+            <a:schemeClr val="tx1"/>
+          </a:fontRef>
+        </p:style>
+      </p:cxnSp>
+      <p:cxnSp>
+        <p:nvCxnSpPr>
+          <p:cNvPr id="25" name="Straight Arrow Connector 24">
+            <a:extLst>
+              <a:ext uri="{FF2B5EF4-FFF2-40B4-BE49-F238E27FC236}">
+                <a16:creationId xmlns:a16="http://schemas.microsoft.com/office/drawing/2014/main" id="{39A8F959-2494-4316-976E-CEBE440D0BEE}"/>
+              </a:ext>
+            </a:extLst>
+          </p:cNvPr>
+          <p:cNvCxnSpPr>
+            <a:cxnSpLocks/>
+            <a:stCxn id="11" idx="3"/>
+          </p:cNvCxnSpPr>
+          <p:nvPr/>
+        </p:nvCxnSpPr>
+        <p:spPr>
+          <a:xfrm>
+            <a:off x="3602187" y="3379915"/>
+            <a:ext cx="507429" cy="0"/>
+          </a:xfrm>
+          <a:prstGeom prst="straightConnector1">
+            <a:avLst/>
+          </a:prstGeom>
+          <a:ln w="19050">
+            <a:tailEnd type="triangle"/>
+          </a:ln>
+        </p:spPr>
+        <p:style>
+          <a:lnRef idx="1">
+            <a:schemeClr val="accent1"/>
+          </a:lnRef>
+          <a:fillRef idx="0">
+            <a:schemeClr val="accent1"/>
+          </a:fillRef>
+          <a:effectRef idx="0">
+            <a:schemeClr val="accent1"/>
+          </a:effectRef>
+          <a:fontRef idx="minor">
+            <a:schemeClr val="tx1"/>
+          </a:fontRef>
+        </p:style>
+      </p:cxnSp>
+      <p:cxnSp>
+        <p:nvCxnSpPr>
+          <p:cNvPr id="31" name="Straight Arrow Connector 30">
+            <a:extLst>
+              <a:ext uri="{FF2B5EF4-FFF2-40B4-BE49-F238E27FC236}">
+                <a16:creationId xmlns:a16="http://schemas.microsoft.com/office/drawing/2014/main" id="{8D3F46D8-14DB-4377-807E-74727026AB92}"/>
+              </a:ext>
+            </a:extLst>
+          </p:cNvPr>
+          <p:cNvCxnSpPr>
+            <a:cxnSpLocks/>
+          </p:cNvCxnSpPr>
+          <p:nvPr/>
+        </p:nvCxnSpPr>
+        <p:spPr>
+          <a:xfrm>
+            <a:off x="5292568" y="3379915"/>
+            <a:ext cx="507429" cy="0"/>
+          </a:xfrm>
+          <a:prstGeom prst="straightConnector1">
+            <a:avLst/>
+          </a:prstGeom>
+          <a:ln w="19050">
+            <a:tailEnd type="triangle"/>
+          </a:ln>
+        </p:spPr>
+        <p:style>
+          <a:lnRef idx="1">
+            <a:schemeClr val="accent1"/>
+          </a:lnRef>
+          <a:fillRef idx="0">
+            <a:schemeClr val="accent1"/>
+          </a:fillRef>
+          <a:effectRef idx="0">
+            <a:schemeClr val="accent1"/>
+          </a:effectRef>
+          <a:fontRef idx="minor">
+            <a:schemeClr val="tx1"/>
+          </a:fontRef>
+        </p:style>
+      </p:cxnSp>
+      <p:cxnSp>
+        <p:nvCxnSpPr>
+          <p:cNvPr id="34" name="Straight Arrow Connector 33">
+            <a:extLst>
+              <a:ext uri="{FF2B5EF4-FFF2-40B4-BE49-F238E27FC236}">
+                <a16:creationId xmlns:a16="http://schemas.microsoft.com/office/drawing/2014/main" id="{3CE76AEF-E574-49D6-9D29-922BF0910BDB}"/>
+              </a:ext>
+            </a:extLst>
+          </p:cNvPr>
+          <p:cNvCxnSpPr>
+            <a:cxnSpLocks/>
+            <a:endCxn id="15" idx="1"/>
+          </p:cNvCxnSpPr>
+          <p:nvPr/>
+        </p:nvCxnSpPr>
+        <p:spPr>
+          <a:xfrm>
+            <a:off x="6954539" y="3379915"/>
+            <a:ext cx="507429" cy="0"/>
+          </a:xfrm>
+          <a:prstGeom prst="straightConnector1">
+            <a:avLst/>
+          </a:prstGeom>
+          <a:ln w="19050">
+            <a:tailEnd type="triangle"/>
+          </a:ln>
+        </p:spPr>
+        <p:style>
+          <a:lnRef idx="1">
+            <a:schemeClr val="accent1"/>
+          </a:lnRef>
+          <a:fillRef idx="0">
+            <a:schemeClr val="accent1"/>
+          </a:fillRef>
+          <a:effectRef idx="0">
+            <a:schemeClr val="accent1"/>
+          </a:effectRef>
+          <a:fontRef idx="minor">
+            <a:schemeClr val="tx1"/>
+          </a:fontRef>
+        </p:style>
+      </p:cxnSp>
+      <p:cxnSp>
+        <p:nvCxnSpPr>
+          <p:cNvPr id="38" name="Straight Arrow Connector 37">
+            <a:extLst>
+              <a:ext uri="{FF2B5EF4-FFF2-40B4-BE49-F238E27FC236}">
+                <a16:creationId xmlns:a16="http://schemas.microsoft.com/office/drawing/2014/main" id="{DF393A5D-6D4A-47C2-9451-282F1A8B66E7}"/>
+              </a:ext>
+            </a:extLst>
+          </p:cNvPr>
+          <p:cNvCxnSpPr>
+            <a:cxnSpLocks/>
+            <a:stCxn id="15" idx="3"/>
+          </p:cNvCxnSpPr>
+          <p:nvPr/>
+        </p:nvCxnSpPr>
+        <p:spPr>
+          <a:xfrm>
+            <a:off x="8616510" y="3379915"/>
+            <a:ext cx="507429" cy="0"/>
+          </a:xfrm>
+          <a:prstGeom prst="straightConnector1">
+            <a:avLst/>
+          </a:prstGeom>
+          <a:ln w="19050">
+            <a:tailEnd type="triangle"/>
+          </a:ln>
+        </p:spPr>
+        <p:style>
+          <a:lnRef idx="1">
+            <a:schemeClr val="accent1"/>
+          </a:lnRef>
+          <a:fillRef idx="0">
+            <a:schemeClr val="accent1"/>
+          </a:fillRef>
+          <a:effectRef idx="0">
+            <a:schemeClr val="accent1"/>
+          </a:effectRef>
+          <a:fontRef idx="minor">
+            <a:schemeClr val="tx1"/>
+          </a:fontRef>
+        </p:style>
+      </p:cxnSp>
+      <p:sp>
+        <p:nvSpPr>
+          <p:cNvPr id="65" name="Oval 64">
+            <a:extLst>
+              <a:ext uri="{FF2B5EF4-FFF2-40B4-BE49-F238E27FC236}">
+                <a16:creationId xmlns:a16="http://schemas.microsoft.com/office/drawing/2014/main" id="{8FEEFE47-4CDB-42CC-AE7B-62F1972A5A44}"/>
+              </a:ext>
+            </a:extLst>
+          </p:cNvPr>
+          <p:cNvSpPr/>
+          <p:nvPr/>
+        </p:nvSpPr>
+        <p:spPr>
+          <a:xfrm>
+            <a:off x="9609738" y="4778709"/>
+            <a:ext cx="371197" cy="348018"/>
+          </a:xfrm>
+          <a:prstGeom prst="ellipse">
+            <a:avLst/>
+          </a:prstGeom>
+          <a:ln w="28575">
+            <a:solidFill>
+              <a:schemeClr val="accent1"/>
+            </a:solidFill>
+          </a:ln>
+        </p:spPr>
+        <p:style>
+          <a:lnRef idx="2">
+            <a:schemeClr val="accent6"/>
+          </a:lnRef>
+          <a:fillRef idx="1">
+            <a:schemeClr val="lt1"/>
+          </a:fillRef>
+          <a:effectRef idx="0">
+            <a:schemeClr val="accent6"/>
+          </a:effectRef>
+          <a:fontRef idx="minor">
+            <a:schemeClr val="dk1"/>
+          </a:fontRef>
+        </p:style>
+        <p:txBody>
+          <a:bodyPr rtlCol="0" anchor="ctr"/>
+          <a:lstStyle/>
+          <a:p>
+            <a:pPr algn="ctr"/>
+            <a:endParaRPr lang="en-SG"/>
+          </a:p>
+        </p:txBody>
+      </p:sp>
+      <p:sp>
+        <p:nvSpPr>
+          <p:cNvPr id="66" name="Oval 65">
+            <a:extLst>
+              <a:ext uri="{FF2B5EF4-FFF2-40B4-BE49-F238E27FC236}">
+                <a16:creationId xmlns:a16="http://schemas.microsoft.com/office/drawing/2014/main" id="{B99E5AC4-A4AF-4165-938D-96C2AC26EFB9}"/>
+              </a:ext>
+            </a:extLst>
+          </p:cNvPr>
+          <p:cNvSpPr/>
+          <p:nvPr/>
+        </p:nvSpPr>
+        <p:spPr>
+          <a:xfrm>
+            <a:off x="1554814" y="3205906"/>
+            <a:ext cx="371197" cy="348018"/>
+          </a:xfrm>
+          <a:prstGeom prst="ellipse">
+            <a:avLst/>
+          </a:prstGeom>
+          <a:ln w="28575">
+            <a:solidFill>
+              <a:schemeClr val="accent1"/>
+            </a:solidFill>
+          </a:ln>
+        </p:spPr>
+        <p:style>
+          <a:lnRef idx="2">
+            <a:schemeClr val="accent6"/>
+          </a:lnRef>
+          <a:fillRef idx="1">
+            <a:schemeClr val="lt1"/>
+          </a:fillRef>
+          <a:effectRef idx="0">
+            <a:schemeClr val="accent6"/>
+          </a:effectRef>
+          <a:fontRef idx="minor">
+            <a:schemeClr val="dk1"/>
+          </a:fontRef>
+        </p:style>
+        <p:txBody>
+          <a:bodyPr rtlCol="0" anchor="ctr"/>
+          <a:lstStyle/>
+          <a:p>
+            <a:pPr algn="ctr"/>
+            <a:endParaRPr lang="en-SG"/>
+          </a:p>
+        </p:txBody>
+      </p:sp>
+      <p:sp>
+        <p:nvSpPr>
+          <p:cNvPr id="71" name="TextBox 70">
+            <a:extLst>
+              <a:ext uri="{FF2B5EF4-FFF2-40B4-BE49-F238E27FC236}">
+                <a16:creationId xmlns:a16="http://schemas.microsoft.com/office/drawing/2014/main" id="{476EB3F2-03ED-4341-851A-CE3F7170A194}"/>
+              </a:ext>
+            </a:extLst>
+          </p:cNvPr>
+          <p:cNvSpPr txBox="1"/>
+          <p:nvPr/>
+        </p:nvSpPr>
+        <p:spPr>
+          <a:xfrm>
+            <a:off x="1499128" y="2943237"/>
+            <a:ext cx="482568" cy="276999"/>
+          </a:xfrm>
+          <a:prstGeom prst="rect">
+            <a:avLst/>
+          </a:prstGeom>
+          <a:noFill/>
+        </p:spPr>
+        <p:txBody>
+          <a:bodyPr wrap="none" rtlCol="0">
+            <a:spAutoFit/>
+          </a:bodyPr>
+          <a:lstStyle/>
+          <a:p>
+            <a:r>
+              <a:rPr lang="en-US" sz="1200" dirty="0"/>
+              <a:t>Start</a:t>
+            </a:r>
+            <a:endParaRPr lang="en-SG" sz="1200" dirty="0"/>
+          </a:p>
+        </p:txBody>
+      </p:sp>
+      <p:sp>
+        <p:nvSpPr>
+          <p:cNvPr id="73" name="TextBox 72">
+            <a:extLst>
+              <a:ext uri="{FF2B5EF4-FFF2-40B4-BE49-F238E27FC236}">
+                <a16:creationId xmlns:a16="http://schemas.microsoft.com/office/drawing/2014/main" id="{516678A9-7BC2-44CB-B5F9-7DC5FF2BF874}"/>
+              </a:ext>
+            </a:extLst>
+          </p:cNvPr>
+          <p:cNvSpPr txBox="1"/>
+          <p:nvPr/>
+        </p:nvSpPr>
+        <p:spPr>
+          <a:xfrm>
+            <a:off x="9594552" y="5099431"/>
+            <a:ext cx="420308" cy="276999"/>
+          </a:xfrm>
+          <a:prstGeom prst="rect">
+            <a:avLst/>
+          </a:prstGeom>
+          <a:noFill/>
+        </p:spPr>
+        <p:txBody>
+          <a:bodyPr wrap="none" rtlCol="0">
+            <a:spAutoFit/>
+          </a:bodyPr>
+          <a:lstStyle/>
+          <a:p>
+            <a:r>
+              <a:rPr lang="en-US" sz="1200" dirty="0"/>
+              <a:t>End</a:t>
+            </a:r>
+            <a:endParaRPr lang="en-SG" sz="1200" dirty="0"/>
+          </a:p>
+        </p:txBody>
+      </p:sp>
+      <p:sp>
+        <p:nvSpPr>
+          <p:cNvPr id="39" name="Rectangle 38">
+            <a:extLst>
+              <a:ext uri="{FF2B5EF4-FFF2-40B4-BE49-F238E27FC236}">
+                <a16:creationId xmlns:a16="http://schemas.microsoft.com/office/drawing/2014/main" id="{01473D17-C7FE-4685-BD9B-678EC74BA77C}"/>
+              </a:ext>
+            </a:extLst>
+          </p:cNvPr>
+          <p:cNvSpPr/>
+          <p:nvPr/>
+        </p:nvSpPr>
+        <p:spPr>
+          <a:xfrm>
+            <a:off x="5799997" y="3029621"/>
+            <a:ext cx="1154542" cy="700586"/>
+          </a:xfrm>
+          <a:prstGeom prst="rect">
+            <a:avLst/>
+          </a:prstGeom>
+        </p:spPr>
+        <p:style>
+          <a:lnRef idx="2">
+            <a:schemeClr val="accent1">
+              <a:shade val="50000"/>
+            </a:schemeClr>
+          </a:lnRef>
+          <a:fillRef idx="1">
+            <a:schemeClr val="accent1"/>
+          </a:fillRef>
+          <a:effectRef idx="0">
+            <a:schemeClr val="accent1"/>
+          </a:effectRef>
+          <a:fontRef idx="minor">
+            <a:schemeClr val="lt1"/>
+          </a:fontRef>
+        </p:style>
+        <p:txBody>
+          <a:bodyPr rtlCol="0" anchor="ctr"/>
+          <a:lstStyle/>
+          <a:p>
+            <a:pPr algn="ctr"/>
+            <a:r>
+              <a:rPr lang="en-US" sz="1200" dirty="0"/>
+              <a:t>Web Service Testing</a:t>
+            </a:r>
+            <a:endParaRPr lang="en-SG" sz="1200" dirty="0"/>
+          </a:p>
+        </p:txBody>
+      </p:sp>
+      <p:sp>
+        <p:nvSpPr>
+          <p:cNvPr id="24" name="Rectangle 23">
+            <a:extLst>
+              <a:ext uri="{FF2B5EF4-FFF2-40B4-BE49-F238E27FC236}">
+                <a16:creationId xmlns:a16="http://schemas.microsoft.com/office/drawing/2014/main" id="{AC7ED93A-4F34-48A2-B4C6-489B194750DC}"/>
+              </a:ext>
+            </a:extLst>
+          </p:cNvPr>
+          <p:cNvSpPr/>
+          <p:nvPr/>
+        </p:nvSpPr>
+        <p:spPr>
+          <a:xfrm>
+            <a:off x="4123821" y="3029621"/>
+            <a:ext cx="1154542" cy="700586"/>
+          </a:xfrm>
+          <a:prstGeom prst="rect">
+            <a:avLst/>
+          </a:prstGeom>
+        </p:spPr>
+        <p:style>
+          <a:lnRef idx="2">
+            <a:schemeClr val="accent1">
+              <a:shade val="50000"/>
+            </a:schemeClr>
+          </a:lnRef>
+          <a:fillRef idx="1">
+            <a:schemeClr val="accent1"/>
+          </a:fillRef>
+          <a:effectRef idx="0">
+            <a:schemeClr val="accent1"/>
+          </a:effectRef>
+          <a:fontRef idx="minor">
+            <a:schemeClr val="lt1"/>
+          </a:fontRef>
+        </p:style>
+        <p:txBody>
+          <a:bodyPr rtlCol="0" anchor="ctr"/>
+          <a:lstStyle/>
+          <a:p>
+            <a:pPr algn="ctr"/>
+            <a:r>
+              <a:rPr lang="en-US" sz="1200" dirty="0"/>
+              <a:t>Web Application</a:t>
+            </a:r>
+          </a:p>
+          <a:p>
+            <a:pPr algn="ctr"/>
+            <a:r>
+              <a:rPr lang="en-US" sz="1200" dirty="0"/>
+              <a:t>Testing </a:t>
+            </a:r>
+            <a:endParaRPr lang="en-SG" sz="1200" dirty="0"/>
+          </a:p>
+        </p:txBody>
+      </p:sp>
+      <p:cxnSp>
+        <p:nvCxnSpPr>
+          <p:cNvPr id="30" name="Straight Arrow Connector 29">
+            <a:extLst>
+              <a:ext uri="{FF2B5EF4-FFF2-40B4-BE49-F238E27FC236}">
+                <a16:creationId xmlns:a16="http://schemas.microsoft.com/office/drawing/2014/main" id="{59AE8B8D-F07B-42C9-BD2C-AB5074A21D25}"/>
+              </a:ext>
+            </a:extLst>
+          </p:cNvPr>
+          <p:cNvCxnSpPr>
+            <a:cxnSpLocks/>
+          </p:cNvCxnSpPr>
+          <p:nvPr/>
+        </p:nvCxnSpPr>
+        <p:spPr>
+          <a:xfrm>
+            <a:off x="9777410" y="3689918"/>
+            <a:ext cx="6824" cy="1088791"/>
+          </a:xfrm>
+          <a:prstGeom prst="straightConnector1">
+            <a:avLst/>
+          </a:prstGeom>
+          <a:ln w="19050">
+            <a:tailEnd type="triangle"/>
+          </a:ln>
+        </p:spPr>
+        <p:style>
+          <a:lnRef idx="1">
+            <a:schemeClr val="accent1"/>
+          </a:lnRef>
+          <a:fillRef idx="0">
+            <a:schemeClr val="accent1"/>
+          </a:fillRef>
+          <a:effectRef idx="0">
+            <a:schemeClr val="accent1"/>
+          </a:effectRef>
+          <a:fontRef idx="minor">
+            <a:schemeClr val="tx1"/>
+          </a:fontRef>
+        </p:style>
+      </p:cxnSp>
+      <p:sp>
+        <p:nvSpPr>
+          <p:cNvPr id="35" name="Title 1">
+            <a:extLst>
+              <a:ext uri="{FF2B5EF4-FFF2-40B4-BE49-F238E27FC236}">
+                <a16:creationId xmlns:a16="http://schemas.microsoft.com/office/drawing/2014/main" id="{D4596CBD-8D47-415C-8FA1-D3E3EF3C1501}"/>
+              </a:ext>
+            </a:extLst>
+          </p:cNvPr>
+          <p:cNvSpPr txBox="1">
+            <a:spLocks/>
+          </p:cNvSpPr>
+          <p:nvPr/>
+        </p:nvSpPr>
+        <p:spPr>
+          <a:xfrm>
+            <a:off x="1179074" y="975815"/>
+            <a:ext cx="9833548" cy="1325563"/>
+          </a:xfrm>
+          <a:prstGeom prst="rect">
+            <a:avLst/>
+          </a:prstGeom>
+        </p:spPr>
+        <p:txBody>
+          <a:bodyPr vert="horz" lIns="91440" tIns="45720" rIns="91440" bIns="45720" rtlCol="0" anchor="ctr">
+            <a:normAutofit/>
+          </a:bodyPr>
+          <a:lstStyle>
+            <a:lvl1pPr algn="l" defTabSz="914400" rtl="0" eaLnBrk="1" latinLnBrk="0" hangingPunct="1">
+              <a:lnSpc>
+                <a:spcPct val="90000"/>
+              </a:lnSpc>
+              <a:spcBef>
+                <a:spcPct val="0"/>
+              </a:spcBef>
+              <a:buNone/>
+              <a:defRPr sz="4400" kern="1200">
+                <a:solidFill>
+                  <a:schemeClr val="tx1"/>
+                </a:solidFill>
+                <a:latin typeface="+mj-lt"/>
+                <a:ea typeface="+mj-ea"/>
+                <a:cs typeface="+mj-cs"/>
+              </a:defRPr>
+            </a:lvl1pPr>
+          </a:lstStyle>
+          <a:p>
+            <a:pPr algn="ctr"/>
+            <a:r>
+              <a:rPr lang="en-US" sz="4000" b="1" dirty="0">
+                <a:solidFill>
+                  <a:srgbClr val="FFFFFF"/>
+                </a:solidFill>
+                <a:latin typeface="Gloss And Bloom" pitchFamily="2" charset="0"/>
+              </a:rPr>
+              <a:t>Critical Path (Iteration 4)</a:t>
+            </a:r>
+            <a:endParaRPr lang="en-SG" sz="4000" b="1" dirty="0">
+              <a:solidFill>
+                <a:srgbClr val="FFFFFF"/>
+              </a:solidFill>
+              <a:latin typeface="Gloss And Bloom" pitchFamily="2" charset="0"/>
+            </a:endParaRPr>
+          </a:p>
+        </p:txBody>
+      </p:sp>
+    </p:spTree>
+    <p:extLst>
+      <p:ext uri="{BB962C8B-B14F-4D97-AF65-F5344CB8AC3E}">
+        <p14:creationId xmlns:p14="http://schemas.microsoft.com/office/powerpoint/2010/main" val="1612106775"/>
+      </p:ext>
+    </p:extLst>
+  </p:cSld>
+  <p:clrMapOvr>
+    <a:masterClrMapping/>
+  </p:clrMapOvr>
+</p:sld>
+</file>
+
+<file path=ppt/slides/slide13.xml><?xml version="1.0" encoding="utf-8"?>
 <p:sld xmlns:a="http://schemas.openxmlformats.org/drawingml/2006/main" xmlns:r="http://schemas.openxmlformats.org/officeDocument/2006/relationships" xmlns:p="http://schemas.openxmlformats.org/presentationml/2006/main">
   <p:cSld>
     <p:bg>
@@ -4718,7 +8369,7 @@
         </p:nvSpPr>
         <p:spPr>
           <a:xfrm>
-            <a:off x="1179226" y="5105400"/>
+            <a:off x="681083" y="5570220"/>
             <a:ext cx="9833548" cy="1066802"/>
           </a:xfrm>
         </p:spPr>
@@ -4729,17 +8380,19 @@
           <a:lstStyle/>
           <a:p>
             <a:r>
-              <a:rPr lang="en-US" sz="4000" dirty="0">
+              <a:rPr lang="en-US" sz="4000" b="1" dirty="0">
                 <a:solidFill>
                   <a:srgbClr val="3F3F3F"/>
                 </a:solidFill>
+                <a:latin typeface="Gloss And Bloom" pitchFamily="2" charset="0"/>
               </a:rPr>
               <a:t>Bug Metrics </a:t>
             </a:r>
-            <a:endParaRPr lang="en-SG" sz="4000" dirty="0">
+            <a:endParaRPr lang="en-SG" sz="4000" b="1" dirty="0">
               <a:solidFill>
                 <a:srgbClr val="3F3F3F"/>
               </a:solidFill>
+              <a:latin typeface="Gloss And Bloom" pitchFamily="2" charset="0"/>
             </a:endParaRPr>
           </a:p>
         </p:txBody>
@@ -4946,7 +8599,7 @@
 </p:sld>
 </file>
 
-<file path=ppt/slides/slide11.xml><?xml version="1.0" encoding="utf-8"?>
+<file path=ppt/slides/slide14.xml><?xml version="1.0" encoding="utf-8"?>
 <p:sld xmlns:a="http://schemas.openxmlformats.org/drawingml/2006/main" xmlns:r="http://schemas.openxmlformats.org/officeDocument/2006/relationships" xmlns:p="http://schemas.openxmlformats.org/presentationml/2006/main">
   <p:cSld>
     <p:bg>
@@ -5119,7 +8772,7 @@
         </p:nvSpPr>
         <p:spPr>
           <a:xfrm>
-            <a:off x="1179226" y="826680"/>
+            <a:off x="1179226" y="995622"/>
             <a:ext cx="9833548" cy="1325563"/>
           </a:xfrm>
         </p:spPr>
@@ -5131,17 +8784,19 @@
           <a:p>
             <a:pPr algn="ctr"/>
             <a:r>
-              <a:rPr lang="en-US" sz="4000" dirty="0">
+              <a:rPr lang="en-US" sz="4000" b="1" dirty="0">
                 <a:solidFill>
                   <a:srgbClr val="FFFFFF"/>
                 </a:solidFill>
+                <a:latin typeface="Gloss And Bloom" pitchFamily="2" charset="0"/>
               </a:rPr>
               <a:t>Roles &amp; Responsibilities</a:t>
             </a:r>
-            <a:endParaRPr lang="en-SG" sz="4000" dirty="0">
+            <a:endParaRPr lang="en-SG" sz="4000" b="1" dirty="0">
               <a:solidFill>
                 <a:srgbClr val="FFFFFF"/>
               </a:solidFill>
+              <a:latin typeface="Gloss And Bloom" pitchFamily="2" charset="0"/>
             </a:endParaRPr>
           </a:p>
         </p:txBody>
@@ -5256,7 +8911,7 @@
         </p:nvSpPr>
         <p:spPr>
           <a:xfrm>
-            <a:off x="5145987" y="4728783"/>
+            <a:off x="5132824" y="4667215"/>
             <a:ext cx="1619858" cy="2031325"/>
           </a:xfrm>
           <a:prstGeom prst="rect">
@@ -5298,7 +8953,7 @@
         </p:nvSpPr>
         <p:spPr>
           <a:xfrm>
-            <a:off x="3162607" y="4830991"/>
+            <a:off x="3162607" y="4667215"/>
             <a:ext cx="1619857" cy="1477328"/>
           </a:xfrm>
           <a:prstGeom prst="rect">
@@ -5511,7 +9166,7 @@
         </p:nvSpPr>
         <p:spPr>
           <a:xfrm>
-            <a:off x="7129367" y="4808480"/>
+            <a:off x="7129367" y="4667215"/>
             <a:ext cx="1619857" cy="1477328"/>
           </a:xfrm>
           <a:prstGeom prst="rect">
@@ -5641,7 +9296,7 @@
 </p:sld>
 </file>
 
-<file path=ppt/slides/slide12.xml><?xml version="1.0" encoding="utf-8"?>
+<file path=ppt/slides/slide15.xml><?xml version="1.0" encoding="utf-8"?>
 <p:sld xmlns:a="http://schemas.openxmlformats.org/drawingml/2006/main" xmlns:r="http://schemas.openxmlformats.org/officeDocument/2006/relationships" xmlns:p="http://schemas.openxmlformats.org/presentationml/2006/main">
   <p:cSld>
     <p:bg>
@@ -5814,7 +9469,7 @@
         </p:nvSpPr>
         <p:spPr>
           <a:xfrm>
-            <a:off x="1179226" y="826680"/>
+            <a:off x="1179361" y="983630"/>
             <a:ext cx="9833548" cy="1325563"/>
           </a:xfrm>
         </p:spPr>
@@ -5826,17 +9481,19 @@
           <a:p>
             <a:pPr algn="ctr"/>
             <a:r>
-              <a:rPr lang="en-US" sz="4000" dirty="0">
+              <a:rPr lang="en-US" sz="4000" b="1" dirty="0">
                 <a:solidFill>
                   <a:srgbClr val="FFFFFF"/>
                 </a:solidFill>
+                <a:latin typeface="Gloss And Bloom" pitchFamily="2" charset="0"/>
               </a:rPr>
               <a:t>Paired Programming Rotation Plan</a:t>
             </a:r>
-            <a:endParaRPr lang="en-SG" sz="4000" dirty="0">
+            <a:endParaRPr lang="en-SG" sz="4000" b="1" dirty="0">
               <a:solidFill>
                 <a:srgbClr val="FFFFFF"/>
               </a:solidFill>
+              <a:latin typeface="Gloss And Bloom" pitchFamily="2" charset="0"/>
             </a:endParaRPr>
           </a:p>
         </p:txBody>
@@ -6406,7 +10063,7 @@
 </p:sld>
 </file>
 
-<file path=ppt/slides/slide2.xml><?xml version="1.0" encoding="utf-8"?>
+<file path=ppt/slides/slide16.xml><?xml version="1.0" encoding="utf-8"?>
 <p:sld xmlns:a="http://schemas.openxmlformats.org/drawingml/2006/main" xmlns:r="http://schemas.openxmlformats.org/officeDocument/2006/relationships" xmlns:p="http://schemas.openxmlformats.org/presentationml/2006/main">
   <p:cSld>
     <p:bg>
@@ -6436,7 +10093,7 @@
           <p:cNvPr id="8" name="Rectangle 7">
             <a:extLst>
               <a:ext uri="{FF2B5EF4-FFF2-40B4-BE49-F238E27FC236}">
-                <a16:creationId xmlns:a16="http://schemas.microsoft.com/office/drawing/2014/main" id="{4351DFE5-F63D-4BE0-BDA9-E3EB88F01AA5}"/>
+                <a16:creationId xmlns:a16="http://schemas.microsoft.com/office/drawing/2014/main" id="{23962611-DFD5-4092-AAFD-559E3DFCE2C9}"/>
               </a:ext>
               <a:ext uri="{C183D7F6-B498-43B3-948B-1728B52AA6E4}">
                 <adec:decorative xmlns:adec="http://schemas.microsoft.com/office/drawing/2017/decorative" val="1"/>
@@ -6456,8 +10113,8 @@
         </p:nvSpPr>
         <p:spPr>
           <a:xfrm>
-            <a:off x="355601" y="0"/>
-            <a:ext cx="11480494" cy="2753936"/>
+            <a:off x="475488" y="0"/>
+            <a:ext cx="10910292" cy="6858000"/>
           </a:xfrm>
           <a:prstGeom prst="rect">
             <a:avLst/>
@@ -6521,7 +10178,7 @@
           <p:cNvPr id="10" name="Picture 9">
             <a:extLst>
               <a:ext uri="{FF2B5EF4-FFF2-40B4-BE49-F238E27FC236}">
-                <a16:creationId xmlns:a16="http://schemas.microsoft.com/office/drawing/2014/main" id="{3AA16612-ACD2-4A16-8F2B-4514FD6BF28F}"/>
+                <a16:creationId xmlns:a16="http://schemas.microsoft.com/office/drawing/2014/main" id="{2270F1FA-0425-408F-9861-80BF5AFB276D}"/>
               </a:ext>
               <a:ext uri="{C183D7F6-B498-43B3-948B-1728B52AA6E4}">
                 <adec:decorative xmlns:adec="http://schemas.microsoft.com/office/drawing/2017/decorative" val="1"/>
@@ -6566,6 +10223,237 @@
           <p:cNvPr id="2" name="Title 1">
             <a:extLst>
               <a:ext uri="{FF2B5EF4-FFF2-40B4-BE49-F238E27FC236}">
+                <a16:creationId xmlns:a16="http://schemas.microsoft.com/office/drawing/2014/main" id="{88F63A44-1577-435C-AEFC-4C9691EEF705}"/>
+              </a:ext>
+            </a:extLst>
+          </p:cNvPr>
+          <p:cNvSpPr>
+            <a:spLocks noGrp="1"/>
+          </p:cNvSpPr>
+          <p:nvPr>
+            <p:ph type="ctrTitle"/>
+          </p:nvPr>
+        </p:nvSpPr>
+        <p:spPr>
+          <a:xfrm>
+            <a:off x="3043403" y="2024214"/>
+            <a:ext cx="6105194" cy="2809571"/>
+          </a:xfrm>
+        </p:spPr>
+        <p:txBody>
+          <a:bodyPr>
+            <a:noAutofit/>
+          </a:bodyPr>
+          <a:lstStyle/>
+          <a:p>
+            <a:r>
+              <a:rPr lang="en-US" sz="8000" b="1" dirty="0">
+                <a:solidFill>
+                  <a:srgbClr val="FFFFFF"/>
+                </a:solidFill>
+                <a:latin typeface="Gloss And Bloom" pitchFamily="2" charset="0"/>
+              </a:rPr>
+              <a:t>Thank</a:t>
+            </a:r>
+            <a:br>
+              <a:rPr lang="en-US" sz="8000" b="1" dirty="0">
+                <a:solidFill>
+                  <a:srgbClr val="FFFFFF"/>
+                </a:solidFill>
+                <a:latin typeface="Gloss And Bloom" pitchFamily="2" charset="0"/>
+              </a:rPr>
+            </a:br>
+            <a:r>
+              <a:rPr lang="en-US" sz="8000" b="1" dirty="0">
+                <a:solidFill>
+                  <a:srgbClr val="FFFFFF"/>
+                </a:solidFill>
+                <a:latin typeface="Gloss And Bloom" pitchFamily="2" charset="0"/>
+              </a:rPr>
+              <a:t>You </a:t>
+            </a:r>
+            <a:endParaRPr lang="en-SG" sz="8000" b="1" dirty="0">
+              <a:solidFill>
+                <a:srgbClr val="FFFFFF"/>
+              </a:solidFill>
+              <a:latin typeface="Gloss And Bloom" pitchFamily="2" charset="0"/>
+            </a:endParaRPr>
+          </a:p>
+        </p:txBody>
+      </p:sp>
+    </p:spTree>
+    <p:extLst>
+      <p:ext uri="{BB962C8B-B14F-4D97-AF65-F5344CB8AC3E}">
+        <p14:creationId xmlns:p14="http://schemas.microsoft.com/office/powerpoint/2010/main" val="673805837"/>
+      </p:ext>
+    </p:extLst>
+  </p:cSld>
+  <p:clrMapOvr>
+    <a:masterClrMapping/>
+  </p:clrMapOvr>
+</p:sld>
+</file>
+
+<file path=ppt/slides/slide2.xml><?xml version="1.0" encoding="utf-8"?>
+<p:sld xmlns:a="http://schemas.openxmlformats.org/drawingml/2006/main" xmlns:r="http://schemas.openxmlformats.org/officeDocument/2006/relationships" xmlns:p="http://schemas.openxmlformats.org/presentationml/2006/main">
+  <p:cSld>
+    <p:bg>
+      <p:bgPr>
+        <a:solidFill>
+          <a:schemeClr val="bg1"/>
+        </a:solidFill>
+        <a:effectLst/>
+      </p:bgPr>
+    </p:bg>
+    <p:spTree>
+      <p:nvGrpSpPr>
+        <p:cNvPr id="1" name=""/>
+        <p:cNvGrpSpPr/>
+        <p:nvPr/>
+      </p:nvGrpSpPr>
+      <p:grpSpPr>
+        <a:xfrm>
+          <a:off x="0" y="0"/>
+          <a:ext cx="0" cy="0"/>
+          <a:chOff x="0" y="0"/>
+          <a:chExt cx="0" cy="0"/>
+        </a:xfrm>
+      </p:grpSpPr>
+      <p:sp>
+        <p:nvSpPr>
+          <p:cNvPr id="8" name="Rectangle 7">
+            <a:extLst>
+              <a:ext uri="{FF2B5EF4-FFF2-40B4-BE49-F238E27FC236}">
+                <a16:creationId xmlns:a16="http://schemas.microsoft.com/office/drawing/2014/main" id="{4351DFE5-F63D-4BE0-BDA9-E3EB88F01AA5}"/>
+              </a:ext>
+              <a:ext uri="{C183D7F6-B498-43B3-948B-1728B52AA6E4}">
+                <adec:decorative xmlns:adec="http://schemas.microsoft.com/office/drawing/2017/decorative" val="1"/>
+              </a:ext>
+            </a:extLst>
+          </p:cNvPr>
+          <p:cNvSpPr>
+            <a:spLocks noGrp="1" noRot="1" noChangeAspect="1" noMove="1" noResize="1" noEditPoints="1" noAdjustHandles="1" noChangeArrowheads="1" noChangeShapeType="1" noTextEdit="1"/>
+          </p:cNvSpPr>
+          <p:nvPr>
+            <p:extLst>
+              <p:ext uri="{386F3935-93C4-4BCD-93E2-E3B085C9AB24}">
+                <p16:designElem xmlns:p16="http://schemas.microsoft.com/office/powerpoint/2015/main" val="1"/>
+              </p:ext>
+            </p:extLst>
+          </p:nvPr>
+        </p:nvSpPr>
+        <p:spPr>
+          <a:xfrm>
+            <a:off x="355601" y="0"/>
+            <a:ext cx="11480494" cy="2753936"/>
+          </a:xfrm>
+          <a:prstGeom prst="rect">
+            <a:avLst/>
+          </a:prstGeom>
+          <a:gradFill>
+            <a:gsLst>
+              <a:gs pos="0">
+                <a:schemeClr val="accent1">
+                  <a:lumMod val="90000"/>
+                </a:schemeClr>
+              </a:gs>
+              <a:gs pos="25000">
+                <a:schemeClr val="accent1">
+                  <a:lumMod val="90000"/>
+                </a:schemeClr>
+              </a:gs>
+              <a:gs pos="94000">
+                <a:schemeClr val="bg2">
+                  <a:lumMod val="25000"/>
+                </a:schemeClr>
+              </a:gs>
+              <a:gs pos="100000">
+                <a:schemeClr val="bg2">
+                  <a:lumMod val="25000"/>
+                </a:schemeClr>
+              </a:gs>
+            </a:gsLst>
+            <a:lin ang="4200000" scaled="0"/>
+          </a:gradFill>
+          <a:ln>
+            <a:noFill/>
+          </a:ln>
+        </p:spPr>
+        <p:style>
+          <a:lnRef idx="2">
+            <a:schemeClr val="accent1">
+              <a:shade val="50000"/>
+            </a:schemeClr>
+          </a:lnRef>
+          <a:fillRef idx="1">
+            <a:schemeClr val="accent1"/>
+          </a:fillRef>
+          <a:effectRef idx="0">
+            <a:schemeClr val="accent1"/>
+          </a:effectRef>
+          <a:fontRef idx="minor">
+            <a:schemeClr val="lt1"/>
+          </a:fontRef>
+        </p:style>
+        <p:txBody>
+          <a:bodyPr rtlCol="0" anchor="ctr"/>
+          <a:lstStyle/>
+          <a:p>
+            <a:pPr algn="ctr"/>
+            <a:endParaRPr lang="en-US"/>
+          </a:p>
+        </p:txBody>
+      </p:sp>
+      <p:pic>
+        <p:nvPicPr>
+          <p:cNvPr id="10" name="Picture 9">
+            <a:extLst>
+              <a:ext uri="{FF2B5EF4-FFF2-40B4-BE49-F238E27FC236}">
+                <a16:creationId xmlns:a16="http://schemas.microsoft.com/office/drawing/2014/main" id="{3AA16612-ACD2-4A16-8F2B-4514FD6BF28F}"/>
+              </a:ext>
+              <a:ext uri="{C183D7F6-B498-43B3-948B-1728B52AA6E4}">
+                <adec:decorative xmlns:adec="http://schemas.microsoft.com/office/drawing/2017/decorative" val="1"/>
+              </a:ext>
+            </a:extLst>
+          </p:cNvPr>
+          <p:cNvPicPr>
+            <a:picLocks noGrp="1" noRot="1" noChangeAspect="1" noMove="1" noResize="1" noEditPoints="1" noAdjustHandles="1" noChangeArrowheads="1" noChangeShapeType="1" noCrop="1"/>
+          </p:cNvPicPr>
+          <p:nvPr>
+            <p:extLst>
+              <p:ext uri="{386F3935-93C4-4BCD-93E2-E3B085C9AB24}">
+                <p16:designElem xmlns:p16="http://schemas.microsoft.com/office/powerpoint/2015/main" val="1"/>
+              </p:ext>
+            </p:extLst>
+          </p:nvPr>
+        </p:nvPicPr>
+        <p:blipFill>
+          <a:blip r:embed="rId2">
+            <a:extLst>
+              <a:ext uri="{28A0092B-C50C-407E-A947-70E740481C1C}">
+                <a14:useLocalDpi xmlns:a14="http://schemas.microsoft.com/office/drawing/2010/main" val="0"/>
+              </a:ext>
+            </a:extLst>
+          </a:blip>
+          <a:stretch>
+            <a:fillRect/>
+          </a:stretch>
+        </p:blipFill>
+        <p:spPr>
+          <a:xfrm>
+            <a:off x="0" y="0"/>
+            <a:ext cx="12192000" cy="6858000"/>
+          </a:xfrm>
+          <a:prstGeom prst="rect">
+            <a:avLst/>
+          </a:prstGeom>
+        </p:spPr>
+      </p:pic>
+      <p:sp>
+        <p:nvSpPr>
+          <p:cNvPr id="2" name="Title 1">
+            <a:extLst>
+              <a:ext uri="{FF2B5EF4-FFF2-40B4-BE49-F238E27FC236}">
                 <a16:creationId xmlns:a16="http://schemas.microsoft.com/office/drawing/2014/main" id="{CEB0CA4B-C5C8-4DD8-A3F0-37C7955ACB0D}"/>
               </a:ext>
             </a:extLst>
@@ -6579,8 +10467,8 @@
         </p:nvSpPr>
         <p:spPr>
           <a:xfrm>
-            <a:off x="1179226" y="826680"/>
-            <a:ext cx="9833548" cy="1325563"/>
+            <a:off x="1100266" y="806208"/>
+            <a:ext cx="9991467" cy="1773219"/>
           </a:xfrm>
         </p:spPr>
         <p:txBody>
@@ -6591,17 +10479,19 @@
           <a:p>
             <a:pPr algn="ctr"/>
             <a:r>
-              <a:rPr lang="en-US" sz="4000" dirty="0">
+              <a:rPr lang="en-US" sz="4000" b="1" dirty="0">
                 <a:solidFill>
                   <a:srgbClr val="FFFFFF"/>
                 </a:solidFill>
+                <a:latin typeface="Gloss And Bloom" pitchFamily="2" charset="0"/>
               </a:rPr>
               <a:t>Functionalities</a:t>
             </a:r>
-            <a:endParaRPr lang="en-SG" sz="4000" dirty="0">
+            <a:endParaRPr lang="en-SG" sz="4000" b="1" dirty="0">
               <a:solidFill>
                 <a:srgbClr val="FFFFFF"/>
               </a:solidFill>
+              <a:latin typeface="Gloss And Bloom" pitchFamily="2" charset="0"/>
             </a:endParaRPr>
           </a:p>
         </p:txBody>
@@ -7118,8 +11008,8 @@
         </p:nvSpPr>
         <p:spPr>
           <a:xfrm>
-            <a:off x="640079" y="2053641"/>
-            <a:ext cx="3669161" cy="2760098"/>
+            <a:off x="326181" y="2238059"/>
+            <a:ext cx="3986512" cy="2859553"/>
           </a:xfrm>
         </p:spPr>
         <p:txBody>
@@ -7129,17 +11019,19 @@
           <a:lstStyle/>
           <a:p>
             <a:r>
-              <a:rPr lang="en-US" dirty="0">
+              <a:rPr lang="en-US" sz="5400" b="1" dirty="0">
                 <a:solidFill>
                   <a:srgbClr val="FFFFFF"/>
                 </a:solidFill>
+                <a:latin typeface="Gloss And Bloom" pitchFamily="2" charset="0"/>
               </a:rPr>
               <a:t>Schedule Overview</a:t>
             </a:r>
-            <a:endParaRPr lang="en-SG" dirty="0">
+            <a:endParaRPr lang="en-SG" sz="5400" b="1" dirty="0">
               <a:solidFill>
                 <a:srgbClr val="FFFFFF"/>
               </a:solidFill>
+              <a:latin typeface="Gloss And Bloom" pitchFamily="2" charset="0"/>
             </a:endParaRPr>
           </a:p>
         </p:txBody>
@@ -7444,7 +11336,7 @@
         </p:nvSpPr>
         <p:spPr>
           <a:xfrm>
-            <a:off x="640079" y="2053641"/>
+            <a:off x="462658" y="2224238"/>
             <a:ext cx="3669161" cy="2760098"/>
           </a:xfrm>
         </p:spPr>
@@ -7455,17 +11347,19 @@
           <a:lstStyle/>
           <a:p>
             <a:r>
-              <a:rPr lang="en-US" dirty="0">
+              <a:rPr lang="en-US" sz="5400" b="1" dirty="0">
                 <a:solidFill>
                   <a:srgbClr val="FFFFFF"/>
                 </a:solidFill>
+                <a:latin typeface="Gloss And Bloom" pitchFamily="2" charset="0"/>
               </a:rPr>
               <a:t>Planned Iterations</a:t>
             </a:r>
-            <a:endParaRPr lang="en-SG" dirty="0">
+            <a:endParaRPr lang="en-SG" sz="5400" b="1" dirty="0">
               <a:solidFill>
                 <a:srgbClr val="FFFFFF"/>
               </a:solidFill>
+              <a:latin typeface="Gloss And Bloom" pitchFamily="2" charset="0"/>
             </a:endParaRPr>
           </a:p>
         </p:txBody>
@@ -7486,14 +11380,14 @@
             <p:ph idx="1"/>
             <p:extLst>
               <p:ext uri="{D42A27DB-BD31-4B8C-83A1-F6EECF244321}">
-                <p14:modId xmlns:p14="http://schemas.microsoft.com/office/powerpoint/2010/main" val="27887905"/>
+                <p14:modId xmlns:p14="http://schemas.microsoft.com/office/powerpoint/2010/main" val="2409548834"/>
               </p:ext>
             </p:extLst>
           </p:nvPr>
         </p:nvGraphicFramePr>
         <p:xfrm>
-          <a:off x="5678906" y="801688"/>
-          <a:ext cx="5717761" cy="4668520"/>
+          <a:off x="5678906" y="801687"/>
+          <a:ext cx="6208295" cy="5251094"/>
         </p:xfrm>
         <a:graphic>
           <a:graphicData uri="http://schemas.openxmlformats.org/drawingml/2006/table">
@@ -7502,28 +11396,28 @@
                 <a:tableStyleId>{5C22544A-7EE6-4342-B048-85BDC9FD1C3A}</a:tableStyleId>
               </a:tblPr>
               <a:tblGrid>
-                <a:gridCol w="1094427">
+                <a:gridCol w="1001673">
                   <a:extLst>
                     <a:ext uri="{9D8B030D-6E8A-4147-A177-3AD203B41FA5}">
                       <a16:colId xmlns:a16="http://schemas.microsoft.com/office/drawing/2014/main" val="3907656963"/>
                     </a:ext>
                   </a:extLst>
                 </a:gridCol>
-                <a:gridCol w="2166130">
+                <a:gridCol w="2538611">
                   <a:extLst>
                     <a:ext uri="{9D8B030D-6E8A-4147-A177-3AD203B41FA5}">
                       <a16:colId xmlns:a16="http://schemas.microsoft.com/office/drawing/2014/main" val="3827512975"/>
                     </a:ext>
                   </a:extLst>
                 </a:gridCol>
-                <a:gridCol w="1287379">
+                <a:gridCol w="1397825">
                   <a:extLst>
                     <a:ext uri="{9D8B030D-6E8A-4147-A177-3AD203B41FA5}">
                       <a16:colId xmlns:a16="http://schemas.microsoft.com/office/drawing/2014/main" val="1569515396"/>
                     </a:ext>
                   </a:extLst>
                 </a:gridCol>
-                <a:gridCol w="1169825">
+                <a:gridCol w="1270186">
                   <a:extLst>
                     <a:ext uri="{9D8B030D-6E8A-4147-A177-3AD203B41FA5}">
                       <a16:colId xmlns:a16="http://schemas.microsoft.com/office/drawing/2014/main" val="3657150714"/>
@@ -7531,7 +11425,7 @@
                   </a:extLst>
                 </a:gridCol>
               </a:tblGrid>
-              <a:tr h="370840">
+              <a:tr h="417116">
                 <a:tc>
                   <a:txBody>
                     <a:bodyPr/>
@@ -7594,17 +11488,18 @@
                   </a:ext>
                 </a:extLst>
               </a:tr>
-              <a:tr h="370840">
+              <a:tr h="1028506">
                 <a:tc>
                   <a:txBody>
                     <a:bodyPr/>
                     <a:lstStyle/>
                     <a:p>
+                      <a:pPr algn="ctr"/>
                       <a:r>
-                        <a:rPr lang="en-US" dirty="0"/>
+                        <a:rPr lang="en-US" b="1" dirty="0"/>
                         <a:t>1</a:t>
                       </a:r>
-                      <a:endParaRPr lang="en-SG" dirty="0"/>
+                      <a:endParaRPr lang="en-SG" b="1" dirty="0"/>
                     </a:p>
                   </a:txBody>
                   <a:tcPr/>
@@ -7657,17 +11552,18 @@
                   </a:ext>
                 </a:extLst>
               </a:tr>
-              <a:tr h="370840">
+              <a:tr h="1028506">
                 <a:tc>
                   <a:txBody>
                     <a:bodyPr/>
                     <a:lstStyle/>
                     <a:p>
+                      <a:pPr algn="ctr"/>
                       <a:r>
-                        <a:rPr lang="en-US" dirty="0"/>
+                        <a:rPr lang="en-US" b="1" dirty="0"/>
                         <a:t>2</a:t>
                       </a:r>
-                      <a:endParaRPr lang="en-SG" dirty="0"/>
+                      <a:endParaRPr lang="en-SG" b="1" dirty="0"/>
                     </a:p>
                   </a:txBody>
                   <a:tcPr/>
@@ -7720,17 +11616,18 @@
                   </a:ext>
                 </a:extLst>
               </a:tr>
-              <a:tr h="370840">
+              <a:tr h="719954">
                 <a:tc>
                   <a:txBody>
                     <a:bodyPr/>
                     <a:lstStyle/>
                     <a:p>
+                      <a:pPr algn="ctr"/>
                       <a:r>
-                        <a:rPr lang="en-US" dirty="0"/>
+                        <a:rPr lang="en-US" b="1" dirty="0"/>
                         <a:t>3</a:t>
                       </a:r>
-                      <a:endParaRPr lang="en-SG" dirty="0"/>
+                      <a:endParaRPr lang="en-SG" b="1" dirty="0"/>
                     </a:p>
                   </a:txBody>
                   <a:tcPr/>
@@ -7783,17 +11680,18 @@
                   </a:ext>
                 </a:extLst>
               </a:tr>
-              <a:tr h="370840">
+              <a:tr h="1337058">
                 <a:tc>
                   <a:txBody>
                     <a:bodyPr/>
                     <a:lstStyle/>
                     <a:p>
+                      <a:pPr algn="ctr"/>
                       <a:r>
-                        <a:rPr lang="en-US" dirty="0"/>
+                        <a:rPr lang="en-US" b="1" dirty="0"/>
                         <a:t>4</a:t>
                       </a:r>
-                      <a:endParaRPr lang="en-SG" dirty="0"/>
+                      <a:endParaRPr lang="en-SG" b="1" dirty="0"/>
                     </a:p>
                   </a:txBody>
                   <a:tcPr/>
@@ -7846,17 +11744,18 @@
                   </a:ext>
                 </a:extLst>
               </a:tr>
-              <a:tr h="370840">
+              <a:tr h="719954">
                 <a:tc>
                   <a:txBody>
                     <a:bodyPr/>
                     <a:lstStyle/>
                     <a:p>
+                      <a:pPr algn="ctr"/>
                       <a:r>
-                        <a:rPr lang="en-US" dirty="0"/>
+                        <a:rPr lang="en-US" b="1" dirty="0"/>
                         <a:t>5</a:t>
                       </a:r>
-                      <a:endParaRPr lang="en-SG" dirty="0"/>
+                      <a:endParaRPr lang="en-SG" b="1" dirty="0"/>
                     </a:p>
                   </a:txBody>
                   <a:tcPr/>
@@ -8099,7 +11998,7 @@
         </p:nvSpPr>
         <p:spPr>
           <a:xfrm>
-            <a:off x="1179226" y="826680"/>
+            <a:off x="1175779" y="971821"/>
             <a:ext cx="9833548" cy="1325563"/>
           </a:xfrm>
         </p:spPr>
@@ -8111,17 +12010,19 @@
           <a:p>
             <a:pPr algn="ctr"/>
             <a:r>
-              <a:rPr lang="en-US" sz="4000" dirty="0">
+              <a:rPr lang="en-US" sz="4000" b="1" dirty="0">
                 <a:solidFill>
                   <a:srgbClr val="FFFFFF"/>
                 </a:solidFill>
+                <a:latin typeface="Gloss And Bloom" pitchFamily="2" charset="0"/>
               </a:rPr>
               <a:t>Roles &amp; Task Allocation</a:t>
             </a:r>
-            <a:endParaRPr lang="en-SG" sz="4000" dirty="0">
+            <a:endParaRPr lang="en-SG" sz="4000" b="1" dirty="0">
               <a:solidFill>
                 <a:srgbClr val="FFFFFF"/>
               </a:solidFill>
+              <a:latin typeface="Gloss And Bloom" pitchFamily="2" charset="0"/>
             </a:endParaRPr>
           </a:p>
         </p:txBody>
@@ -8236,8 +12137,8 @@
         </p:nvSpPr>
         <p:spPr>
           <a:xfrm>
-            <a:off x="5145987" y="4728783"/>
-            <a:ext cx="1619858" cy="2031325"/>
+            <a:off x="5145986" y="4647835"/>
+            <a:ext cx="1619857" cy="2031325"/>
           </a:xfrm>
           <a:prstGeom prst="rect">
             <a:avLst/>
@@ -8278,7 +12179,7 @@
         </p:nvSpPr>
         <p:spPr>
           <a:xfrm>
-            <a:off x="3162607" y="4830991"/>
+            <a:off x="3162606" y="4647835"/>
             <a:ext cx="1619857" cy="1477328"/>
           </a:xfrm>
           <a:prstGeom prst="rect">
@@ -8491,7 +12392,7 @@
         </p:nvSpPr>
         <p:spPr>
           <a:xfrm>
-            <a:off x="7129367" y="4808480"/>
+            <a:off x="7129366" y="4647835"/>
             <a:ext cx="1619857" cy="1477328"/>
           </a:xfrm>
           <a:prstGeom prst="rect">
@@ -8580,8 +12481,8 @@
         </p:nvSpPr>
         <p:spPr>
           <a:xfrm>
-            <a:off x="9025195" y="4600234"/>
-            <a:ext cx="1619858" cy="1754326"/>
+            <a:off x="9112745" y="4600234"/>
+            <a:ext cx="1707410" cy="1477328"/>
           </a:xfrm>
           <a:prstGeom prst="rect">
             <a:avLst/>
@@ -8854,7 +12755,7 @@
         </p:nvSpPr>
         <p:spPr>
           <a:xfrm>
-            <a:off x="640079" y="2053641"/>
+            <a:off x="339829" y="2292477"/>
             <a:ext cx="3669161" cy="2760098"/>
           </a:xfrm>
         </p:spPr>
@@ -8865,17 +12766,19 @@
           <a:lstStyle/>
           <a:p>
             <a:r>
-              <a:rPr lang="en-US" dirty="0">
+              <a:rPr lang="en-US" sz="5400" b="1" dirty="0">
                 <a:solidFill>
                   <a:srgbClr val="FFFFFF"/>
                 </a:solidFill>
+                <a:latin typeface="Gloss And Bloom" pitchFamily="2" charset="0"/>
               </a:rPr>
               <a:t>Milestones</a:t>
             </a:r>
-            <a:endParaRPr lang="en-SG" dirty="0">
+            <a:endParaRPr lang="en-SG" sz="5400" b="1" dirty="0">
               <a:solidFill>
                 <a:srgbClr val="FFFFFF"/>
               </a:solidFill>
+              <a:latin typeface="Gloss And Bloom" pitchFamily="2" charset="0"/>
             </a:endParaRPr>
           </a:p>
         </p:txBody>
@@ -9162,7 +13065,7 @@
         </p:nvSpPr>
         <p:spPr>
           <a:xfrm>
-            <a:off x="1179226" y="826680"/>
+            <a:off x="1179074" y="963424"/>
             <a:ext cx="9833548" cy="1325563"/>
           </a:xfrm>
         </p:spPr>
@@ -9174,17 +13077,19 @@
           <a:p>
             <a:pPr algn="ctr"/>
             <a:r>
-              <a:rPr lang="en-US" sz="4000" dirty="0">
+              <a:rPr lang="en-US" sz="4000" b="1" dirty="0">
                 <a:solidFill>
                   <a:srgbClr val="FFFFFF"/>
                 </a:solidFill>
+                <a:latin typeface="Gloss And Bloom" pitchFamily="2" charset="0"/>
               </a:rPr>
-              <a:t>PM in-charge of Milestone</a:t>
-            </a:r>
-            <a:endParaRPr lang="en-SG" sz="4000" dirty="0">
+              <a:t>PM in-charge of Milestones</a:t>
+            </a:r>
+            <a:endParaRPr lang="en-SG" sz="4000" b="1" dirty="0">
               <a:solidFill>
                 <a:srgbClr val="FFFFFF"/>
               </a:solidFill>
+              <a:latin typeface="Gloss And Bloom" pitchFamily="2" charset="0"/>
             </a:endParaRPr>
           </a:p>
         </p:txBody>
@@ -9760,7 +13665,7 @@
         </p:nvSpPr>
         <p:spPr>
           <a:xfrm>
-            <a:off x="1179226" y="826680"/>
+            <a:off x="1179226" y="935109"/>
             <a:ext cx="9833548" cy="1325563"/>
           </a:xfrm>
         </p:spPr>
@@ -9772,17 +13677,19 @@
           <a:p>
             <a:pPr algn="ctr"/>
             <a:r>
-              <a:rPr lang="en-US" sz="4000" dirty="0">
+              <a:rPr lang="en-US" sz="4000" b="1" dirty="0">
                 <a:solidFill>
                   <a:srgbClr val="FFFFFF"/>
                 </a:solidFill>
+                <a:latin typeface="Gloss And Bloom" pitchFamily="2" charset="0"/>
               </a:rPr>
               <a:t>Buffer Time</a:t>
             </a:r>
-            <a:endParaRPr lang="en-SG" sz="4000" dirty="0">
+            <a:endParaRPr lang="en-SG" sz="4000" b="1" dirty="0">
               <a:solidFill>
                 <a:srgbClr val="FFFFFF"/>
               </a:solidFill>
+              <a:latin typeface="Gloss And Bloom" pitchFamily="2" charset="0"/>
             </a:endParaRPr>
           </a:p>
         </p:txBody>
@@ -10056,7 +13963,7 @@
         </p:nvSpPr>
         <p:spPr>
           <a:xfrm>
-            <a:off x="1179226" y="826680"/>
+            <a:off x="1179074" y="975815"/>
             <a:ext cx="9833548" cy="1325563"/>
           </a:xfrm>
         </p:spPr>
@@ -10068,17 +13975,19 @@
           <a:p>
             <a:pPr algn="ctr"/>
             <a:r>
-              <a:rPr lang="en-US" sz="4000" dirty="0">
+              <a:rPr lang="en-US" sz="4000" b="1" dirty="0">
                 <a:solidFill>
                   <a:srgbClr val="FFFFFF"/>
                 </a:solidFill>
+                <a:latin typeface="Gloss And Bloom" pitchFamily="2" charset="0"/>
               </a:rPr>
               <a:t>Critical Path (Iteration 1)</a:t>
             </a:r>
-            <a:endParaRPr lang="en-SG" sz="4000" dirty="0">
+            <a:endParaRPr lang="en-SG" sz="4000" b="1" dirty="0">
               <a:solidFill>
                 <a:srgbClr val="FFFFFF"/>
               </a:solidFill>
+              <a:latin typeface="Gloss And Bloom" pitchFamily="2" charset="0"/>
             </a:endParaRPr>
           </a:p>
         </p:txBody>

</xml_diff>